<commit_message>
added 3 literature review topics
</commit_message>
<xml_diff>
--- a/14.pptx
+++ b/14.pptx
@@ -5,10 +5,10 @@
     <p:sldMasterId id="2147483648" r:id="rId1"/>
   </p:sldMasterIdLst>
   <p:notesMasterIdLst>
-    <p:notesMasterId r:id="rId14"/>
+    <p:notesMasterId r:id="rId16"/>
   </p:notesMasterIdLst>
   <p:handoutMasterIdLst>
-    <p:handoutMasterId r:id="rId15"/>
+    <p:handoutMasterId r:id="rId17"/>
   </p:handoutMasterIdLst>
   <p:sldIdLst>
     <p:sldId id="256" r:id="rId2"/>
@@ -23,6 +23,8 @@
     <p:sldId id="265" r:id="rId11"/>
     <p:sldId id="266" r:id="rId12"/>
     <p:sldId id="267" r:id="rId13"/>
+    <p:sldId id="268" r:id="rId14"/>
+    <p:sldId id="269" r:id="rId15"/>
   </p:sldIdLst>
   <p:sldSz cx="10080625" cy="5670550"/>
   <p:notesSz cx="7559675" cy="10691813"/>
@@ -152,7 +154,7 @@
           <p:cNvPr id="2" name="Header Placeholder 1">
             <a:extLst>
               <a:ext uri="{FF2B5EF4-FFF2-40B4-BE49-F238E27FC236}">
-                <a16:creationId xmlns:a16="http://schemas.microsoft.com/office/drawing/2014/main" id="{79EC8B91-1DF0-4E05-BD4C-F38C160C169B}"/>
+                <a16:creationId xmlns:a16="http://schemas.microsoft.com/office/drawing/2014/main" id="{21E92A6A-A6E5-4E0B-A566-3EF907F2E0CC}"/>
               </a:ext>
             </a:extLst>
           </p:cNvPr>
@@ -200,7 +202,7 @@
               <a:ln>
                 <a:noFill/>
               </a:ln>
-              <a:latin typeface="Liberation Sans" pitchFamily="18"/>
+              <a:latin typeface="Times New Roman" pitchFamily="18"/>
               <a:ea typeface="DejaVu Sans" pitchFamily="2"/>
               <a:cs typeface="FreeSans" pitchFamily="2"/>
             </a:endParaRPr>
@@ -212,7 +214,7 @@
           <p:cNvPr id="3" name="Date Placeholder 2">
             <a:extLst>
               <a:ext uri="{FF2B5EF4-FFF2-40B4-BE49-F238E27FC236}">
-                <a16:creationId xmlns:a16="http://schemas.microsoft.com/office/drawing/2014/main" id="{71F0B7E5-5805-4D1C-97DD-856A3D9D8972}"/>
+                <a16:creationId xmlns:a16="http://schemas.microsoft.com/office/drawing/2014/main" id="{794EDC7A-C557-4AF7-9729-D6DEACFEB6F7}"/>
               </a:ext>
             </a:extLst>
           </p:cNvPr>
@@ -260,7 +262,7 @@
               <a:ln>
                 <a:noFill/>
               </a:ln>
-              <a:latin typeface="Liberation Sans" pitchFamily="18"/>
+              <a:latin typeface="Times New Roman" pitchFamily="18"/>
               <a:ea typeface="DejaVu Sans" pitchFamily="2"/>
               <a:cs typeface="FreeSans" pitchFamily="2"/>
             </a:endParaRPr>
@@ -272,7 +274,7 @@
           <p:cNvPr id="4" name="Footer Placeholder 3">
             <a:extLst>
               <a:ext uri="{FF2B5EF4-FFF2-40B4-BE49-F238E27FC236}">
-                <a16:creationId xmlns:a16="http://schemas.microsoft.com/office/drawing/2014/main" id="{9DFD3EDC-A2E1-411C-AA28-1FEAE0630288}"/>
+                <a16:creationId xmlns:a16="http://schemas.microsoft.com/office/drawing/2014/main" id="{7CE90EBD-4CC8-48E4-B214-694CE9D11F15}"/>
               </a:ext>
             </a:extLst>
           </p:cNvPr>
@@ -320,7 +322,7 @@
               <a:ln>
                 <a:noFill/>
               </a:ln>
-              <a:latin typeface="Liberation Sans" pitchFamily="18"/>
+              <a:latin typeface="Times New Roman" pitchFamily="18"/>
               <a:ea typeface="DejaVu Sans" pitchFamily="2"/>
               <a:cs typeface="FreeSans" pitchFamily="2"/>
             </a:endParaRPr>
@@ -332,7 +334,7 @@
           <p:cNvPr id="5" name="Slide Number Placeholder 4">
             <a:extLst>
               <a:ext uri="{FF2B5EF4-FFF2-40B4-BE49-F238E27FC236}">
-                <a16:creationId xmlns:a16="http://schemas.microsoft.com/office/drawing/2014/main" id="{000B256B-BC51-4126-A6AE-3698B9EFDE4A}"/>
+                <a16:creationId xmlns:a16="http://schemas.microsoft.com/office/drawing/2014/main" id="{EAC6BB7A-02F4-471A-965B-04F42DA0AE73}"/>
               </a:ext>
             </a:extLst>
           </p:cNvPr>
@@ -376,14 +378,14 @@
               <a:tabLst/>
               <a:defRPr sz="1400"/>
             </a:pPr>
-            <a:fld id="{E524E1E9-13ED-400F-9373-7794DBCB088A}" type="slidenum">
+            <a:fld id="{5A25FA1A-98F2-40EE-963C-2FC962194A37}" type="slidenum">
               <a:t>‹#›</a:t>
             </a:fld>
             <a:endParaRPr lang="en-IN" sz="1400" b="0" i="0" u="none" strike="noStrike" kern="1200" cap="none">
               <a:ln>
                 <a:noFill/>
               </a:ln>
-              <a:latin typeface="Liberation Sans" pitchFamily="18"/>
+              <a:latin typeface="Times New Roman" pitchFamily="18"/>
               <a:ea typeface="DejaVu Sans" pitchFamily="2"/>
               <a:cs typeface="FreeSans" pitchFamily="2"/>
             </a:endParaRPr>
@@ -393,7 +395,7 @@
     </p:spTree>
     <p:extLst>
       <p:ext uri="{BB962C8B-B14F-4D97-AF65-F5344CB8AC3E}">
-        <p14:creationId xmlns:p14="http://schemas.microsoft.com/office/powerpoint/2010/main" val="2744828786"/>
+        <p14:creationId xmlns:p14="http://schemas.microsoft.com/office/powerpoint/2010/main" val="447102630"/>
       </p:ext>
     </p:extLst>
   </p:cSld>
@@ -428,7 +430,7 @@
           <p:cNvPr id="2" name="Slide Image Placeholder 1">
             <a:extLst>
               <a:ext uri="{FF2B5EF4-FFF2-40B4-BE49-F238E27FC236}">
-                <a16:creationId xmlns:a16="http://schemas.microsoft.com/office/drawing/2014/main" id="{5808411F-E99A-44AC-9967-0516304B47A0}"/>
+                <a16:creationId xmlns:a16="http://schemas.microsoft.com/office/drawing/2014/main" id="{02FDCDD3-2717-46CB-BCEE-45008267F4D1}"/>
               </a:ext>
             </a:extLst>
           </p:cNvPr>
@@ -459,7 +461,7 @@
           <p:cNvPr id="3" name="Notes Placeholder 2">
             <a:extLst>
               <a:ext uri="{FF2B5EF4-FFF2-40B4-BE49-F238E27FC236}">
-                <a16:creationId xmlns:a16="http://schemas.microsoft.com/office/drawing/2014/main" id="{D4C379E2-45DC-46CE-BED3-F9090B795E97}"/>
+                <a16:creationId xmlns:a16="http://schemas.microsoft.com/office/drawing/2014/main" id="{1DCCF82C-1783-44B3-AF05-BE73610BFDA4}"/>
               </a:ext>
             </a:extLst>
           </p:cNvPr>
@@ -496,7 +498,7 @@
           <p:cNvPr id="4" name="Header Placeholder 3">
             <a:extLst>
               <a:ext uri="{FF2B5EF4-FFF2-40B4-BE49-F238E27FC236}">
-                <a16:creationId xmlns:a16="http://schemas.microsoft.com/office/drawing/2014/main" id="{D4E5646A-1621-49E7-BE42-02E4403AA1AF}"/>
+                <a16:creationId xmlns:a16="http://schemas.microsoft.com/office/drawing/2014/main" id="{936C1A75-2230-47D4-A73C-C2ED4FA38957}"/>
               </a:ext>
             </a:extLst>
           </p:cNvPr>
@@ -546,7 +548,7 @@
           <p:cNvPr id="5" name="Date Placeholder 4">
             <a:extLst>
               <a:ext uri="{FF2B5EF4-FFF2-40B4-BE49-F238E27FC236}">
-                <a16:creationId xmlns:a16="http://schemas.microsoft.com/office/drawing/2014/main" id="{85CEFE21-84BE-4C3A-B6F1-3D4F4DC0699C}"/>
+                <a16:creationId xmlns:a16="http://schemas.microsoft.com/office/drawing/2014/main" id="{269EE97D-37C3-4E4F-B634-3D7CAA865D3E}"/>
               </a:ext>
             </a:extLst>
           </p:cNvPr>
@@ -596,7 +598,7 @@
           <p:cNvPr id="6" name="Footer Placeholder 5">
             <a:extLst>
               <a:ext uri="{FF2B5EF4-FFF2-40B4-BE49-F238E27FC236}">
-                <a16:creationId xmlns:a16="http://schemas.microsoft.com/office/drawing/2014/main" id="{7F9EA0CC-E345-49AF-B41D-B8AC0138EFB4}"/>
+                <a16:creationId xmlns:a16="http://schemas.microsoft.com/office/drawing/2014/main" id="{A7D4932D-CCD5-4F22-A91A-6AED4A86BD32}"/>
               </a:ext>
             </a:extLst>
           </p:cNvPr>
@@ -646,7 +648,7 @@
           <p:cNvPr id="7" name="Slide Number Placeholder 6">
             <a:extLst>
               <a:ext uri="{FF2B5EF4-FFF2-40B4-BE49-F238E27FC236}">
-                <a16:creationId xmlns:a16="http://schemas.microsoft.com/office/drawing/2014/main" id="{80F4CF18-CE9F-45AF-BC65-92A5C398AA03}"/>
+                <a16:creationId xmlns:a16="http://schemas.microsoft.com/office/drawing/2014/main" id="{0580ED97-C26D-4667-A186-5BAC24ED9A05}"/>
               </a:ext>
             </a:extLst>
           </p:cNvPr>
@@ -687,7 +689,7 @@
           </a:lstStyle>
           <a:p>
             <a:pPr lvl="0"/>
-            <a:fld id="{C7630700-81BB-4776-9075-BE9EB557D1C7}" type="slidenum">
+            <a:fld id="{C26692CD-B8C3-4ABA-A13B-946F40F799E9}" type="slidenum">
               <a:t>‹#›</a:t>
             </a:fld>
             <a:endParaRPr lang="en-IN"/>
@@ -697,13 +699,13 @@
     </p:spTree>
     <p:extLst>
       <p:ext uri="{BB962C8B-B14F-4D97-AF65-F5344CB8AC3E}">
-        <p14:creationId xmlns:p14="http://schemas.microsoft.com/office/powerpoint/2010/main" val="808102815"/>
+        <p14:creationId xmlns:p14="http://schemas.microsoft.com/office/powerpoint/2010/main" val="1771653018"/>
       </p:ext>
     </p:extLst>
   </p:cSld>
   <p:clrMap bg1="lt1" tx1="dk1" bg2="lt2" tx2="dk2" accent1="accent1" accent2="accent2" accent3="accent3" accent4="accent4" accent5="accent5" accent6="accent6" hlink="hlink" folHlink="folHlink"/>
   <p:notesStyle>
-    <a:lvl1pPr marL="216000" marR="0" indent="-216000" rtl="0" hangingPunct="0">
+    <a:lvl1pPr marL="216000" marR="0" indent="-216000" hangingPunct="0">
       <a:tabLst/>
       <a:defRPr lang="en-IN" sz="2000" b="0" i="0" u="none" strike="noStrike" kern="1200" cap="none">
         <a:ln>
@@ -823,7 +825,7 @@
           <p:cNvPr id="7" name="Slide Number Placeholder 6">
             <a:extLst>
               <a:ext uri="{FF2B5EF4-FFF2-40B4-BE49-F238E27FC236}">
-                <a16:creationId xmlns:a16="http://schemas.microsoft.com/office/drawing/2014/main" id="{835B3343-B849-4B9A-95FC-74E4A02BA3A5}"/>
+                <a16:creationId xmlns:a16="http://schemas.microsoft.com/office/drawing/2014/main" id="{DEC2BB18-A8F5-4601-BD23-A2E6AA1D74B0}"/>
               </a:ext>
             </a:extLst>
           </p:cNvPr>
@@ -844,7 +846,7 @@
           <a:lstStyle/>
           <a:p>
             <a:pPr lvl="0"/>
-            <a:fld id="{45923055-0B7D-403F-A93A-AA36654DB9FB}" type="slidenum">
+            <a:fld id="{8916CEF9-9A43-4A9D-BB57-202EA3A72E46}" type="slidenum">
               <a:t>1</a:t>
             </a:fld>
             <a:endParaRPr lang="en-IN"/>
@@ -856,7 +858,7 @@
           <p:cNvPr id="2" name="Slide Image Placeholder 1">
             <a:extLst>
               <a:ext uri="{FF2B5EF4-FFF2-40B4-BE49-F238E27FC236}">
-                <a16:creationId xmlns:a16="http://schemas.microsoft.com/office/drawing/2014/main" id="{E328FDA8-BD0E-49AC-95E8-EB72A7AD7185}"/>
+                <a16:creationId xmlns:a16="http://schemas.microsoft.com/office/drawing/2014/main" id="{7AA6B276-AFEE-4528-9767-7B04DCDCCE26}"/>
               </a:ext>
             </a:extLst>
           </p:cNvPr>
@@ -888,7 +890,7 @@
           <p:cNvPr id="3" name="Notes Placeholder 2">
             <a:extLst>
               <a:ext uri="{FF2B5EF4-FFF2-40B4-BE49-F238E27FC236}">
-                <a16:creationId xmlns:a16="http://schemas.microsoft.com/office/drawing/2014/main" id="{630DD51D-6464-4007-A6CA-BF1099ACE084}"/>
+                <a16:creationId xmlns:a16="http://schemas.microsoft.com/office/drawing/2014/main" id="{F2961F08-E279-4D64-B331-06935DEBBF28}"/>
               </a:ext>
             </a:extLst>
           </p:cNvPr>
@@ -904,6 +906,7 @@
           <a:bodyPr vert="horz"/>
           <a:lstStyle/>
           <a:p>
+            <a:pPr rtl="0"/>
             <a:endParaRPr lang="en-IN"/>
           </a:p>
         </p:txBody>
@@ -938,7 +941,7 @@
           <p:cNvPr id="7" name="Slide Number Placeholder 6">
             <a:extLst>
               <a:ext uri="{FF2B5EF4-FFF2-40B4-BE49-F238E27FC236}">
-                <a16:creationId xmlns:a16="http://schemas.microsoft.com/office/drawing/2014/main" id="{8E6E5FD4-22B2-47FC-832A-859D7EB3E2A8}"/>
+                <a16:creationId xmlns:a16="http://schemas.microsoft.com/office/drawing/2014/main" id="{ABFFFF3D-7093-49EC-A046-20F1A1DC7DFB}"/>
               </a:ext>
             </a:extLst>
           </p:cNvPr>
@@ -959,7 +962,7 @@
           <a:lstStyle/>
           <a:p>
             <a:pPr lvl="0"/>
-            <a:fld id="{96A801B9-3D24-4C96-A853-E132E04C4FCF}" type="slidenum">
+            <a:fld id="{D02F3983-EDA7-4974-BC36-BDDEA251E81E}" type="slidenum">
               <a:t>10</a:t>
             </a:fld>
             <a:endParaRPr lang="en-IN"/>
@@ -971,7 +974,7 @@
           <p:cNvPr id="2" name="Slide Image Placeholder 1">
             <a:extLst>
               <a:ext uri="{FF2B5EF4-FFF2-40B4-BE49-F238E27FC236}">
-                <a16:creationId xmlns:a16="http://schemas.microsoft.com/office/drawing/2014/main" id="{C4D891A0-783F-49BA-A5AB-9DD298BCF55D}"/>
+                <a16:creationId xmlns:a16="http://schemas.microsoft.com/office/drawing/2014/main" id="{8DA9E8AA-BFB1-468D-A25E-493F707B3D9A}"/>
               </a:ext>
             </a:extLst>
           </p:cNvPr>
@@ -1003,7 +1006,7 @@
           <p:cNvPr id="3" name="Notes Placeholder 2">
             <a:extLst>
               <a:ext uri="{FF2B5EF4-FFF2-40B4-BE49-F238E27FC236}">
-                <a16:creationId xmlns:a16="http://schemas.microsoft.com/office/drawing/2014/main" id="{E95E8731-8D27-40E0-988F-FB0A973CEF60}"/>
+                <a16:creationId xmlns:a16="http://schemas.microsoft.com/office/drawing/2014/main" id="{D4A1468D-D171-4236-BACB-9B2972F85C26}"/>
               </a:ext>
             </a:extLst>
           </p:cNvPr>
@@ -1019,6 +1022,7 @@
           <a:bodyPr vert="horz"/>
           <a:lstStyle/>
           <a:p>
+            <a:pPr rtl="0"/>
             <a:endParaRPr lang="en-IN"/>
           </a:p>
         </p:txBody>
@@ -1053,7 +1057,7 @@
           <p:cNvPr id="7" name="Slide Number Placeholder 6">
             <a:extLst>
               <a:ext uri="{FF2B5EF4-FFF2-40B4-BE49-F238E27FC236}">
-                <a16:creationId xmlns:a16="http://schemas.microsoft.com/office/drawing/2014/main" id="{94C8E1FF-2462-496C-A17D-BAC221023017}"/>
+                <a16:creationId xmlns:a16="http://schemas.microsoft.com/office/drawing/2014/main" id="{1B37968D-B22A-4187-8F3C-6945AA4F015D}"/>
               </a:ext>
             </a:extLst>
           </p:cNvPr>
@@ -1074,7 +1078,7 @@
           <a:lstStyle/>
           <a:p>
             <a:pPr lvl="0"/>
-            <a:fld id="{7C0CC1E2-967E-4B3C-A505-8ADB4BC1617D}" type="slidenum">
+            <a:fld id="{3535DAE6-5E74-4F81-9E99-75B27F8EC915}" type="slidenum">
               <a:t>11</a:t>
             </a:fld>
             <a:endParaRPr lang="en-IN"/>
@@ -1086,7 +1090,7 @@
           <p:cNvPr id="2" name="Slide Image Placeholder 1">
             <a:extLst>
               <a:ext uri="{FF2B5EF4-FFF2-40B4-BE49-F238E27FC236}">
-                <a16:creationId xmlns:a16="http://schemas.microsoft.com/office/drawing/2014/main" id="{380D82A5-3693-4FAC-A21A-F423AD5AF699}"/>
+                <a16:creationId xmlns:a16="http://schemas.microsoft.com/office/drawing/2014/main" id="{320CB2CF-A62A-4198-93F3-2D18BF4F1FC3}"/>
               </a:ext>
             </a:extLst>
           </p:cNvPr>
@@ -1118,7 +1122,7 @@
           <p:cNvPr id="3" name="Notes Placeholder 2">
             <a:extLst>
               <a:ext uri="{FF2B5EF4-FFF2-40B4-BE49-F238E27FC236}">
-                <a16:creationId xmlns:a16="http://schemas.microsoft.com/office/drawing/2014/main" id="{747B946E-894D-4DC2-8D3D-C1E263E23D1C}"/>
+                <a16:creationId xmlns:a16="http://schemas.microsoft.com/office/drawing/2014/main" id="{2A52F564-B1F5-48D4-9DD1-4935596BA081}"/>
               </a:ext>
             </a:extLst>
           </p:cNvPr>
@@ -1134,6 +1138,7 @@
           <a:bodyPr vert="horz"/>
           <a:lstStyle/>
           <a:p>
+            <a:pPr rtl="0"/>
             <a:endParaRPr lang="en-IN"/>
           </a:p>
         </p:txBody>
@@ -1168,7 +1173,7 @@
           <p:cNvPr id="7" name="Slide Number Placeholder 6">
             <a:extLst>
               <a:ext uri="{FF2B5EF4-FFF2-40B4-BE49-F238E27FC236}">
-                <a16:creationId xmlns:a16="http://schemas.microsoft.com/office/drawing/2014/main" id="{0EB5D432-2109-408B-B18C-9EAAAB2EA1B2}"/>
+                <a16:creationId xmlns:a16="http://schemas.microsoft.com/office/drawing/2014/main" id="{60F07FB1-A800-4F27-925E-2E22016E077A}"/>
               </a:ext>
             </a:extLst>
           </p:cNvPr>
@@ -1189,7 +1194,7 @@
           <a:lstStyle/>
           <a:p>
             <a:pPr lvl="0"/>
-            <a:fld id="{50519460-E343-4199-A398-FA11A5435D38}" type="slidenum">
+            <a:fld id="{12093A7D-657B-48D0-BFCF-2CC7B3EF5328}" type="slidenum">
               <a:t>12</a:t>
             </a:fld>
             <a:endParaRPr lang="en-IN"/>
@@ -1201,7 +1206,7 @@
           <p:cNvPr id="2" name="Slide Image Placeholder 1">
             <a:extLst>
               <a:ext uri="{FF2B5EF4-FFF2-40B4-BE49-F238E27FC236}">
-                <a16:creationId xmlns:a16="http://schemas.microsoft.com/office/drawing/2014/main" id="{6A44510A-46DC-4D24-90F8-F5EFC57A4B87}"/>
+                <a16:creationId xmlns:a16="http://schemas.microsoft.com/office/drawing/2014/main" id="{F359CE08-7C05-48E7-B08B-E71DF6BD1D96}"/>
               </a:ext>
             </a:extLst>
           </p:cNvPr>
@@ -1233,7 +1238,7 @@
           <p:cNvPr id="3" name="Notes Placeholder 2">
             <a:extLst>
               <a:ext uri="{FF2B5EF4-FFF2-40B4-BE49-F238E27FC236}">
-                <a16:creationId xmlns:a16="http://schemas.microsoft.com/office/drawing/2014/main" id="{0FAA5A1A-E951-42E3-942B-9327EEB1B049}"/>
+                <a16:creationId xmlns:a16="http://schemas.microsoft.com/office/drawing/2014/main" id="{00597100-426E-4003-8BAF-2EAA2D18BEE1}"/>
               </a:ext>
             </a:extLst>
           </p:cNvPr>
@@ -1249,6 +1254,239 @@
           <a:bodyPr vert="horz"/>
           <a:lstStyle/>
           <a:p>
+            <a:pPr rtl="0"/>
+            <a:endParaRPr lang="en-IN"/>
+          </a:p>
+        </p:txBody>
+      </p:sp>
+    </p:spTree>
+  </p:cSld>
+  <p:clrMapOvr>
+    <a:masterClrMapping/>
+  </p:clrMapOvr>
+</p:notes>
+</file>
+
+<file path=ppt/notesSlides/notesSlide13.xml><?xml version="1.0" encoding="utf-8"?>
+<p:notes xmlns:a="http://schemas.openxmlformats.org/drawingml/2006/main" xmlns:r="http://schemas.openxmlformats.org/officeDocument/2006/relationships" xmlns:p="http://schemas.openxmlformats.org/presentationml/2006/main">
+  <p:cSld>
+    <p:spTree>
+      <p:nvGrpSpPr>
+        <p:cNvPr id="1" name=""/>
+        <p:cNvGrpSpPr/>
+        <p:nvPr/>
+      </p:nvGrpSpPr>
+      <p:grpSpPr>
+        <a:xfrm>
+          <a:off x="0" y="0"/>
+          <a:ext cx="0" cy="0"/>
+          <a:chOff x="0" y="0"/>
+          <a:chExt cx="0" cy="0"/>
+        </a:xfrm>
+      </p:grpSpPr>
+      <p:sp>
+        <p:nvSpPr>
+          <p:cNvPr id="7" name="Slide Number Placeholder 6">
+            <a:extLst>
+              <a:ext uri="{FF2B5EF4-FFF2-40B4-BE49-F238E27FC236}">
+                <a16:creationId xmlns:a16="http://schemas.microsoft.com/office/drawing/2014/main" id="{427DD4E4-3512-4E21-8250-A9ED0F7FB888}"/>
+              </a:ext>
+            </a:extLst>
+          </p:cNvPr>
+          <p:cNvSpPr txBox="1">
+            <a:spLocks noGrp="1"/>
+          </p:cNvSpPr>
+          <p:nvPr>
+            <p:ph type="sldNum" sz="quarter" idx="5"/>
+          </p:nvPr>
+        </p:nvSpPr>
+        <p:spPr>
+          <a:ln/>
+        </p:spPr>
+        <p:txBody>
+          <a:bodyPr vert="horz" lIns="0" tIns="0" rIns="0" bIns="0" anchor="b" anchorCtr="0">
+            <a:noAutofit/>
+          </a:bodyPr>
+          <a:lstStyle/>
+          <a:p>
+            <a:pPr lvl="0"/>
+            <a:fld id="{208BB866-C1E4-413A-8289-8C755BB0A1C2}" type="slidenum">
+              <a:t>13</a:t>
+            </a:fld>
+            <a:endParaRPr lang="en-IN"/>
+          </a:p>
+        </p:txBody>
+      </p:sp>
+      <p:sp>
+        <p:nvSpPr>
+          <p:cNvPr id="2" name="Slide Image Placeholder 1">
+            <a:extLst>
+              <a:ext uri="{FF2B5EF4-FFF2-40B4-BE49-F238E27FC236}">
+                <a16:creationId xmlns:a16="http://schemas.microsoft.com/office/drawing/2014/main" id="{D6173BE1-7C13-44CE-8222-96293F6991A5}"/>
+              </a:ext>
+            </a:extLst>
+          </p:cNvPr>
+          <p:cNvSpPr>
+            <a:spLocks noGrp="1" noRot="1" noChangeAspect="1" noResize="1"/>
+          </p:cNvSpPr>
+          <p:nvPr>
+            <p:ph type="sldImg"/>
+          </p:nvPr>
+        </p:nvSpPr>
+        <p:spPr>
+          <a:xfrm>
+            <a:off x="217488" y="812800"/>
+            <a:ext cx="7124700" cy="4008438"/>
+          </a:xfrm>
+          <a:solidFill>
+            <a:srgbClr val="729FCF"/>
+          </a:solidFill>
+          <a:ln w="25400">
+            <a:solidFill>
+              <a:srgbClr val="3465A4"/>
+            </a:solidFill>
+            <a:prstDash val="solid"/>
+          </a:ln>
+        </p:spPr>
+      </p:sp>
+      <p:sp>
+        <p:nvSpPr>
+          <p:cNvPr id="3" name="Notes Placeholder 2">
+            <a:extLst>
+              <a:ext uri="{FF2B5EF4-FFF2-40B4-BE49-F238E27FC236}">
+                <a16:creationId xmlns:a16="http://schemas.microsoft.com/office/drawing/2014/main" id="{0EE1E9D2-1766-4719-8C02-6C2C4CD1CD6A}"/>
+              </a:ext>
+            </a:extLst>
+          </p:cNvPr>
+          <p:cNvSpPr txBox="1">
+            <a:spLocks noGrp="1"/>
+          </p:cNvSpPr>
+          <p:nvPr>
+            <p:ph type="body" sz="quarter" idx="1"/>
+          </p:nvPr>
+        </p:nvSpPr>
+        <p:spPr/>
+        <p:txBody>
+          <a:bodyPr vert="horz"/>
+          <a:lstStyle/>
+          <a:p>
+            <a:pPr rtl="0"/>
+            <a:endParaRPr lang="en-IN"/>
+          </a:p>
+        </p:txBody>
+      </p:sp>
+    </p:spTree>
+  </p:cSld>
+  <p:clrMapOvr>
+    <a:masterClrMapping/>
+  </p:clrMapOvr>
+</p:notes>
+</file>
+
+<file path=ppt/notesSlides/notesSlide14.xml><?xml version="1.0" encoding="utf-8"?>
+<p:notes xmlns:a="http://schemas.openxmlformats.org/drawingml/2006/main" xmlns:r="http://schemas.openxmlformats.org/officeDocument/2006/relationships" xmlns:p="http://schemas.openxmlformats.org/presentationml/2006/main">
+  <p:cSld>
+    <p:spTree>
+      <p:nvGrpSpPr>
+        <p:cNvPr id="1" name=""/>
+        <p:cNvGrpSpPr/>
+        <p:nvPr/>
+      </p:nvGrpSpPr>
+      <p:grpSpPr>
+        <a:xfrm>
+          <a:off x="0" y="0"/>
+          <a:ext cx="0" cy="0"/>
+          <a:chOff x="0" y="0"/>
+          <a:chExt cx="0" cy="0"/>
+        </a:xfrm>
+      </p:grpSpPr>
+      <p:sp>
+        <p:nvSpPr>
+          <p:cNvPr id="7" name="Slide Number Placeholder 6">
+            <a:extLst>
+              <a:ext uri="{FF2B5EF4-FFF2-40B4-BE49-F238E27FC236}">
+                <a16:creationId xmlns:a16="http://schemas.microsoft.com/office/drawing/2014/main" id="{55A6FBEB-FD33-4514-98AB-B71A16D5AA8C}"/>
+              </a:ext>
+            </a:extLst>
+          </p:cNvPr>
+          <p:cNvSpPr txBox="1">
+            <a:spLocks noGrp="1"/>
+          </p:cNvSpPr>
+          <p:nvPr>
+            <p:ph type="sldNum" sz="quarter" idx="5"/>
+          </p:nvPr>
+        </p:nvSpPr>
+        <p:spPr>
+          <a:ln/>
+        </p:spPr>
+        <p:txBody>
+          <a:bodyPr vert="horz" lIns="0" tIns="0" rIns="0" bIns="0" anchor="b" anchorCtr="0">
+            <a:noAutofit/>
+          </a:bodyPr>
+          <a:lstStyle/>
+          <a:p>
+            <a:pPr lvl="0"/>
+            <a:fld id="{6825E340-AB25-467E-BFA2-D14A51554AED}" type="slidenum">
+              <a:t>14</a:t>
+            </a:fld>
+            <a:endParaRPr lang="en-IN"/>
+          </a:p>
+        </p:txBody>
+      </p:sp>
+      <p:sp>
+        <p:nvSpPr>
+          <p:cNvPr id="2" name="Slide Image Placeholder 1">
+            <a:extLst>
+              <a:ext uri="{FF2B5EF4-FFF2-40B4-BE49-F238E27FC236}">
+                <a16:creationId xmlns:a16="http://schemas.microsoft.com/office/drawing/2014/main" id="{963D686C-BCED-4987-9589-EFB5D9B5AD3A}"/>
+              </a:ext>
+            </a:extLst>
+          </p:cNvPr>
+          <p:cNvSpPr>
+            <a:spLocks noGrp="1" noRot="1" noChangeAspect="1" noResize="1"/>
+          </p:cNvSpPr>
+          <p:nvPr>
+            <p:ph type="sldImg"/>
+          </p:nvPr>
+        </p:nvSpPr>
+        <p:spPr>
+          <a:xfrm>
+            <a:off x="217488" y="812800"/>
+            <a:ext cx="7124700" cy="4008438"/>
+          </a:xfrm>
+          <a:solidFill>
+            <a:srgbClr val="729FCF"/>
+          </a:solidFill>
+          <a:ln w="25400">
+            <a:solidFill>
+              <a:srgbClr val="3465A4"/>
+            </a:solidFill>
+            <a:prstDash val="solid"/>
+          </a:ln>
+        </p:spPr>
+      </p:sp>
+      <p:sp>
+        <p:nvSpPr>
+          <p:cNvPr id="3" name="Notes Placeholder 2">
+            <a:extLst>
+              <a:ext uri="{FF2B5EF4-FFF2-40B4-BE49-F238E27FC236}">
+                <a16:creationId xmlns:a16="http://schemas.microsoft.com/office/drawing/2014/main" id="{DFEDCFC5-4AA5-4428-AEF6-9C5C79951F86}"/>
+              </a:ext>
+            </a:extLst>
+          </p:cNvPr>
+          <p:cNvSpPr txBox="1">
+            <a:spLocks noGrp="1"/>
+          </p:cNvSpPr>
+          <p:nvPr>
+            <p:ph type="body" sz="quarter" idx="1"/>
+          </p:nvPr>
+        </p:nvSpPr>
+        <p:spPr/>
+        <p:txBody>
+          <a:bodyPr vert="horz"/>
+          <a:lstStyle/>
+          <a:p>
+            <a:pPr rtl="0"/>
             <a:endParaRPr lang="en-IN"/>
           </a:p>
         </p:txBody>
@@ -1283,7 +1521,7 @@
           <p:cNvPr id="7" name="Slide Number Placeholder 6">
             <a:extLst>
               <a:ext uri="{FF2B5EF4-FFF2-40B4-BE49-F238E27FC236}">
-                <a16:creationId xmlns:a16="http://schemas.microsoft.com/office/drawing/2014/main" id="{A9859197-CB13-46A2-A28B-370CDB4A84A0}"/>
+                <a16:creationId xmlns:a16="http://schemas.microsoft.com/office/drawing/2014/main" id="{1B6235F9-CB52-414A-AC55-F83E90B4D6F3}"/>
               </a:ext>
             </a:extLst>
           </p:cNvPr>
@@ -1304,7 +1542,7 @@
           <a:lstStyle/>
           <a:p>
             <a:pPr lvl="0"/>
-            <a:fld id="{69C701E2-3EA4-4D1A-AACB-30ED14A16DE5}" type="slidenum">
+            <a:fld id="{8FDC31EF-8A2A-4EAB-B2C7-8BB2C436FCFE}" type="slidenum">
               <a:t>2</a:t>
             </a:fld>
             <a:endParaRPr lang="en-IN"/>
@@ -1316,7 +1554,7 @@
           <p:cNvPr id="2" name="Slide Image Placeholder 1">
             <a:extLst>
               <a:ext uri="{FF2B5EF4-FFF2-40B4-BE49-F238E27FC236}">
-                <a16:creationId xmlns:a16="http://schemas.microsoft.com/office/drawing/2014/main" id="{EE3A4E8C-C5CE-4432-87E3-88756DE51C92}"/>
+                <a16:creationId xmlns:a16="http://schemas.microsoft.com/office/drawing/2014/main" id="{54CBAECF-0F7D-4615-B41B-695C2CD979F0}"/>
               </a:ext>
             </a:extLst>
           </p:cNvPr>
@@ -1348,7 +1586,7 @@
           <p:cNvPr id="3" name="Notes Placeholder 2">
             <a:extLst>
               <a:ext uri="{FF2B5EF4-FFF2-40B4-BE49-F238E27FC236}">
-                <a16:creationId xmlns:a16="http://schemas.microsoft.com/office/drawing/2014/main" id="{CD28F20F-C4B8-44CB-9CBA-22045E2DC4A1}"/>
+                <a16:creationId xmlns:a16="http://schemas.microsoft.com/office/drawing/2014/main" id="{FEB6E00F-FC7D-4B7F-8F9C-C29DF5B2645D}"/>
               </a:ext>
             </a:extLst>
           </p:cNvPr>
@@ -1364,6 +1602,7 @@
           <a:bodyPr vert="horz"/>
           <a:lstStyle/>
           <a:p>
+            <a:pPr rtl="0"/>
             <a:endParaRPr lang="en-IN"/>
           </a:p>
         </p:txBody>
@@ -1398,7 +1637,7 @@
           <p:cNvPr id="7" name="Slide Number Placeholder 6">
             <a:extLst>
               <a:ext uri="{FF2B5EF4-FFF2-40B4-BE49-F238E27FC236}">
-                <a16:creationId xmlns:a16="http://schemas.microsoft.com/office/drawing/2014/main" id="{118FD37F-320C-4846-BC57-6D292E1A3B76}"/>
+                <a16:creationId xmlns:a16="http://schemas.microsoft.com/office/drawing/2014/main" id="{F40E8770-F2BB-42A6-BBDD-0B3181C8F7E3}"/>
               </a:ext>
             </a:extLst>
           </p:cNvPr>
@@ -1419,7 +1658,7 @@
           <a:lstStyle/>
           <a:p>
             <a:pPr lvl="0"/>
-            <a:fld id="{5281FE0C-1040-4726-82D6-25309072D7DB}" type="slidenum">
+            <a:fld id="{E5EBB7EA-E990-4643-A64A-4883CDAC462E}" type="slidenum">
               <a:t>3</a:t>
             </a:fld>
             <a:endParaRPr lang="en-IN"/>
@@ -1431,7 +1670,7 @@
           <p:cNvPr id="2" name="Slide Image Placeholder 1">
             <a:extLst>
               <a:ext uri="{FF2B5EF4-FFF2-40B4-BE49-F238E27FC236}">
-                <a16:creationId xmlns:a16="http://schemas.microsoft.com/office/drawing/2014/main" id="{1BCE0BD0-FFE0-42C0-941F-A1B9DF0D94F3}"/>
+                <a16:creationId xmlns:a16="http://schemas.microsoft.com/office/drawing/2014/main" id="{66A9458F-C7BF-430F-A068-ACE2D64C6856}"/>
               </a:ext>
             </a:extLst>
           </p:cNvPr>
@@ -1463,7 +1702,7 @@
           <p:cNvPr id="3" name="Notes Placeholder 2">
             <a:extLst>
               <a:ext uri="{FF2B5EF4-FFF2-40B4-BE49-F238E27FC236}">
-                <a16:creationId xmlns:a16="http://schemas.microsoft.com/office/drawing/2014/main" id="{5CB749BB-D355-4BA3-B464-7E51490A6260}"/>
+                <a16:creationId xmlns:a16="http://schemas.microsoft.com/office/drawing/2014/main" id="{5E0BE253-865B-49B0-B33A-CB1627BC1075}"/>
               </a:ext>
             </a:extLst>
           </p:cNvPr>
@@ -1479,6 +1718,7 @@
           <a:bodyPr vert="horz"/>
           <a:lstStyle/>
           <a:p>
+            <a:pPr rtl="0"/>
             <a:endParaRPr lang="en-IN"/>
           </a:p>
         </p:txBody>
@@ -1513,7 +1753,7 @@
           <p:cNvPr id="7" name="Slide Number Placeholder 6">
             <a:extLst>
               <a:ext uri="{FF2B5EF4-FFF2-40B4-BE49-F238E27FC236}">
-                <a16:creationId xmlns:a16="http://schemas.microsoft.com/office/drawing/2014/main" id="{A300D98E-29EB-411A-91D0-6AAABB251473}"/>
+                <a16:creationId xmlns:a16="http://schemas.microsoft.com/office/drawing/2014/main" id="{50BE8926-2BB6-4993-9C2F-C8A7F011DEA2}"/>
               </a:ext>
             </a:extLst>
           </p:cNvPr>
@@ -1534,7 +1774,7 @@
           <a:lstStyle/>
           <a:p>
             <a:pPr lvl="0"/>
-            <a:fld id="{F8DBF439-C065-46E2-A2C8-D84FF1F6DBBD}" type="slidenum">
+            <a:fld id="{D0DE26FC-D566-4A5A-B92A-F609623AC059}" type="slidenum">
               <a:t>4</a:t>
             </a:fld>
             <a:endParaRPr lang="en-IN"/>
@@ -1546,7 +1786,7 @@
           <p:cNvPr id="2" name="Slide Image Placeholder 1">
             <a:extLst>
               <a:ext uri="{FF2B5EF4-FFF2-40B4-BE49-F238E27FC236}">
-                <a16:creationId xmlns:a16="http://schemas.microsoft.com/office/drawing/2014/main" id="{C0EC4837-9BF3-4356-9B1F-3BF386291E42}"/>
+                <a16:creationId xmlns:a16="http://schemas.microsoft.com/office/drawing/2014/main" id="{DA1E294D-BFF8-4A33-A6A8-2F2B31E85557}"/>
               </a:ext>
             </a:extLst>
           </p:cNvPr>
@@ -1578,7 +1818,7 @@
           <p:cNvPr id="3" name="Notes Placeholder 2">
             <a:extLst>
               <a:ext uri="{FF2B5EF4-FFF2-40B4-BE49-F238E27FC236}">
-                <a16:creationId xmlns:a16="http://schemas.microsoft.com/office/drawing/2014/main" id="{E9A3528B-FB7D-4359-8F6C-D0BC7AD3F04B}"/>
+                <a16:creationId xmlns:a16="http://schemas.microsoft.com/office/drawing/2014/main" id="{ED976FD1-2FEF-45D6-B0DB-F0E40DDFE435}"/>
               </a:ext>
             </a:extLst>
           </p:cNvPr>
@@ -1594,6 +1834,7 @@
           <a:bodyPr vert="horz"/>
           <a:lstStyle/>
           <a:p>
+            <a:pPr rtl="0"/>
             <a:endParaRPr lang="en-IN"/>
           </a:p>
         </p:txBody>
@@ -1628,7 +1869,7 @@
           <p:cNvPr id="7" name="Slide Number Placeholder 6">
             <a:extLst>
               <a:ext uri="{FF2B5EF4-FFF2-40B4-BE49-F238E27FC236}">
-                <a16:creationId xmlns:a16="http://schemas.microsoft.com/office/drawing/2014/main" id="{5F3B88BA-0E18-4C49-93AE-E044E8CE64A3}"/>
+                <a16:creationId xmlns:a16="http://schemas.microsoft.com/office/drawing/2014/main" id="{E2A9FB03-619E-4364-B3A2-3091DC8C689D}"/>
               </a:ext>
             </a:extLst>
           </p:cNvPr>
@@ -1649,7 +1890,7 @@
           <a:lstStyle/>
           <a:p>
             <a:pPr lvl="0"/>
-            <a:fld id="{1C8DF61A-6B1C-4C53-AE78-CE6069EE22FE}" type="slidenum">
+            <a:fld id="{A6DFDA26-D3D0-4463-A087-AACC7FA4DE4E}" type="slidenum">
               <a:t>5</a:t>
             </a:fld>
             <a:endParaRPr lang="en-IN"/>
@@ -1661,7 +1902,7 @@
           <p:cNvPr id="2" name="Slide Image Placeholder 1">
             <a:extLst>
               <a:ext uri="{FF2B5EF4-FFF2-40B4-BE49-F238E27FC236}">
-                <a16:creationId xmlns:a16="http://schemas.microsoft.com/office/drawing/2014/main" id="{B67513EE-BFBB-4220-AE45-96A38D8AC0B6}"/>
+                <a16:creationId xmlns:a16="http://schemas.microsoft.com/office/drawing/2014/main" id="{B70E1A77-20C8-4CD4-A816-6224A6180DD5}"/>
               </a:ext>
             </a:extLst>
           </p:cNvPr>
@@ -1693,7 +1934,7 @@
           <p:cNvPr id="3" name="Notes Placeholder 2">
             <a:extLst>
               <a:ext uri="{FF2B5EF4-FFF2-40B4-BE49-F238E27FC236}">
-                <a16:creationId xmlns:a16="http://schemas.microsoft.com/office/drawing/2014/main" id="{A149C864-DAA8-4F83-85FA-1CF70AC139D1}"/>
+                <a16:creationId xmlns:a16="http://schemas.microsoft.com/office/drawing/2014/main" id="{28B772C2-DB4E-42B8-A1D8-844D1F36149E}"/>
               </a:ext>
             </a:extLst>
           </p:cNvPr>
@@ -1709,6 +1950,7 @@
           <a:bodyPr vert="horz"/>
           <a:lstStyle/>
           <a:p>
+            <a:pPr rtl="0"/>
             <a:endParaRPr lang="en-IN"/>
           </a:p>
         </p:txBody>
@@ -1743,7 +1985,7 @@
           <p:cNvPr id="7" name="Slide Number Placeholder 6">
             <a:extLst>
               <a:ext uri="{FF2B5EF4-FFF2-40B4-BE49-F238E27FC236}">
-                <a16:creationId xmlns:a16="http://schemas.microsoft.com/office/drawing/2014/main" id="{6F9F75AB-F64C-4598-89E9-A1815F232660}"/>
+                <a16:creationId xmlns:a16="http://schemas.microsoft.com/office/drawing/2014/main" id="{BA242075-DA32-4618-98EA-931A33529E9F}"/>
               </a:ext>
             </a:extLst>
           </p:cNvPr>
@@ -1764,7 +2006,7 @@
           <a:lstStyle/>
           <a:p>
             <a:pPr lvl="0"/>
-            <a:fld id="{362035B7-33DF-4EA3-811B-7E417E1090DA}" type="slidenum">
+            <a:fld id="{9E1B38B0-AA86-42A3-8DFB-5D2421B81196}" type="slidenum">
               <a:t>6</a:t>
             </a:fld>
             <a:endParaRPr lang="en-IN"/>
@@ -1776,7 +2018,7 @@
           <p:cNvPr id="2" name="Slide Image Placeholder 1">
             <a:extLst>
               <a:ext uri="{FF2B5EF4-FFF2-40B4-BE49-F238E27FC236}">
-                <a16:creationId xmlns:a16="http://schemas.microsoft.com/office/drawing/2014/main" id="{E6B56A62-4352-4E11-8C25-30317C56737B}"/>
+                <a16:creationId xmlns:a16="http://schemas.microsoft.com/office/drawing/2014/main" id="{62E93389-9383-471D-BAE2-4E0DE6F66FF4}"/>
               </a:ext>
             </a:extLst>
           </p:cNvPr>
@@ -1808,7 +2050,7 @@
           <p:cNvPr id="3" name="Notes Placeholder 2">
             <a:extLst>
               <a:ext uri="{FF2B5EF4-FFF2-40B4-BE49-F238E27FC236}">
-                <a16:creationId xmlns:a16="http://schemas.microsoft.com/office/drawing/2014/main" id="{8494DB26-7304-4D77-9D21-BD24AF61560C}"/>
+                <a16:creationId xmlns:a16="http://schemas.microsoft.com/office/drawing/2014/main" id="{4F82815B-8038-4ABF-9E09-1FF3DEF2737B}"/>
               </a:ext>
             </a:extLst>
           </p:cNvPr>
@@ -1824,6 +2066,7 @@
           <a:bodyPr vert="horz"/>
           <a:lstStyle/>
           <a:p>
+            <a:pPr rtl="0"/>
             <a:endParaRPr lang="en-IN"/>
           </a:p>
         </p:txBody>
@@ -1858,7 +2101,7 @@
           <p:cNvPr id="7" name="Slide Number Placeholder 6">
             <a:extLst>
               <a:ext uri="{FF2B5EF4-FFF2-40B4-BE49-F238E27FC236}">
-                <a16:creationId xmlns:a16="http://schemas.microsoft.com/office/drawing/2014/main" id="{043408C3-4C67-4B6E-B068-BD7CFD314FD3}"/>
+                <a16:creationId xmlns:a16="http://schemas.microsoft.com/office/drawing/2014/main" id="{0BECF65D-CA3D-4578-A5FD-0518914E3CB1}"/>
               </a:ext>
             </a:extLst>
           </p:cNvPr>
@@ -1879,7 +2122,7 @@
           <a:lstStyle/>
           <a:p>
             <a:pPr lvl="0"/>
-            <a:fld id="{A87687F5-0369-4141-91A1-EA8228119F4C}" type="slidenum">
+            <a:fld id="{46D7E9F1-A4FE-4F70-8BBE-0CF58890B24D}" type="slidenum">
               <a:t>7</a:t>
             </a:fld>
             <a:endParaRPr lang="en-IN"/>
@@ -1891,7 +2134,7 @@
           <p:cNvPr id="2" name="Slide Image Placeholder 1">
             <a:extLst>
               <a:ext uri="{FF2B5EF4-FFF2-40B4-BE49-F238E27FC236}">
-                <a16:creationId xmlns:a16="http://schemas.microsoft.com/office/drawing/2014/main" id="{BA9B9002-F2F6-42C9-B828-9CCC5EE0A4D4}"/>
+                <a16:creationId xmlns:a16="http://schemas.microsoft.com/office/drawing/2014/main" id="{AB35FB0F-8E3E-4F6B-BDA7-E17A28630331}"/>
               </a:ext>
             </a:extLst>
           </p:cNvPr>
@@ -1923,7 +2166,7 @@
           <p:cNvPr id="3" name="Notes Placeholder 2">
             <a:extLst>
               <a:ext uri="{FF2B5EF4-FFF2-40B4-BE49-F238E27FC236}">
-                <a16:creationId xmlns:a16="http://schemas.microsoft.com/office/drawing/2014/main" id="{D3E50306-7C5C-46CF-B300-D349BD94CD21}"/>
+                <a16:creationId xmlns:a16="http://schemas.microsoft.com/office/drawing/2014/main" id="{847D2729-98F1-4710-8124-BAF09FBF28C8}"/>
               </a:ext>
             </a:extLst>
           </p:cNvPr>
@@ -1939,6 +2182,7 @@
           <a:bodyPr vert="horz"/>
           <a:lstStyle/>
           <a:p>
+            <a:pPr rtl="0"/>
             <a:endParaRPr lang="en-IN"/>
           </a:p>
         </p:txBody>
@@ -1973,7 +2217,7 @@
           <p:cNvPr id="7" name="Slide Number Placeholder 6">
             <a:extLst>
               <a:ext uri="{FF2B5EF4-FFF2-40B4-BE49-F238E27FC236}">
-                <a16:creationId xmlns:a16="http://schemas.microsoft.com/office/drawing/2014/main" id="{A2DE9304-E38F-4C37-B9B8-9E164C6CD666}"/>
+                <a16:creationId xmlns:a16="http://schemas.microsoft.com/office/drawing/2014/main" id="{0D835C42-70FF-45AB-A117-4FF3BED41E2F}"/>
               </a:ext>
             </a:extLst>
           </p:cNvPr>
@@ -1994,7 +2238,7 @@
           <a:lstStyle/>
           <a:p>
             <a:pPr lvl="0"/>
-            <a:fld id="{42468CDB-8565-4A72-935B-90C692744A90}" type="slidenum">
+            <a:fld id="{83E3BE13-53EF-4733-87DD-DA2DC31AF435}" type="slidenum">
               <a:t>8</a:t>
             </a:fld>
             <a:endParaRPr lang="en-IN"/>
@@ -2006,7 +2250,7 @@
           <p:cNvPr id="2" name="Slide Image Placeholder 1">
             <a:extLst>
               <a:ext uri="{FF2B5EF4-FFF2-40B4-BE49-F238E27FC236}">
-                <a16:creationId xmlns:a16="http://schemas.microsoft.com/office/drawing/2014/main" id="{9FFF36E9-90A3-40A4-911E-AFFFD016A81A}"/>
+                <a16:creationId xmlns:a16="http://schemas.microsoft.com/office/drawing/2014/main" id="{D290E6BC-451B-4AE8-AFB4-2077315C7ACA}"/>
               </a:ext>
             </a:extLst>
           </p:cNvPr>
@@ -2038,7 +2282,7 @@
           <p:cNvPr id="3" name="Notes Placeholder 2">
             <a:extLst>
               <a:ext uri="{FF2B5EF4-FFF2-40B4-BE49-F238E27FC236}">
-                <a16:creationId xmlns:a16="http://schemas.microsoft.com/office/drawing/2014/main" id="{65DA07C8-1040-49F9-9D8B-BA59CC7DEC11}"/>
+                <a16:creationId xmlns:a16="http://schemas.microsoft.com/office/drawing/2014/main" id="{BCF8BE35-903C-45F7-A3D3-D956DEE9C113}"/>
               </a:ext>
             </a:extLst>
           </p:cNvPr>
@@ -2054,6 +2298,7 @@
           <a:bodyPr vert="horz"/>
           <a:lstStyle/>
           <a:p>
+            <a:pPr rtl="0"/>
             <a:endParaRPr lang="en-IN"/>
           </a:p>
         </p:txBody>
@@ -2088,7 +2333,7 @@
           <p:cNvPr id="7" name="Slide Number Placeholder 6">
             <a:extLst>
               <a:ext uri="{FF2B5EF4-FFF2-40B4-BE49-F238E27FC236}">
-                <a16:creationId xmlns:a16="http://schemas.microsoft.com/office/drawing/2014/main" id="{F0378817-29F4-4EDC-92E9-9F261C748E36}"/>
+                <a16:creationId xmlns:a16="http://schemas.microsoft.com/office/drawing/2014/main" id="{5B2F3738-C02C-4F4B-AC47-E36C32D11311}"/>
               </a:ext>
             </a:extLst>
           </p:cNvPr>
@@ -2109,7 +2354,7 @@
           <a:lstStyle/>
           <a:p>
             <a:pPr lvl="0"/>
-            <a:fld id="{F3E4DF5A-576A-42C9-AC7E-CDCE085B4BBA}" type="slidenum">
+            <a:fld id="{48302267-9616-4E39-8B09-538BD2E6AB72}" type="slidenum">
               <a:t>9</a:t>
             </a:fld>
             <a:endParaRPr lang="en-IN"/>
@@ -2121,7 +2366,7 @@
           <p:cNvPr id="2" name="Slide Image Placeholder 1">
             <a:extLst>
               <a:ext uri="{FF2B5EF4-FFF2-40B4-BE49-F238E27FC236}">
-                <a16:creationId xmlns:a16="http://schemas.microsoft.com/office/drawing/2014/main" id="{C0C22604-0DC0-44A0-B2D3-66D8EA6E3855}"/>
+                <a16:creationId xmlns:a16="http://schemas.microsoft.com/office/drawing/2014/main" id="{93562A95-F633-4191-AEC0-212D654B9233}"/>
               </a:ext>
             </a:extLst>
           </p:cNvPr>
@@ -2153,7 +2398,7 @@
           <p:cNvPr id="3" name="Notes Placeholder 2">
             <a:extLst>
               <a:ext uri="{FF2B5EF4-FFF2-40B4-BE49-F238E27FC236}">
-                <a16:creationId xmlns:a16="http://schemas.microsoft.com/office/drawing/2014/main" id="{A8DF2045-744E-4DFD-9391-BE7F6C2B06E5}"/>
+                <a16:creationId xmlns:a16="http://schemas.microsoft.com/office/drawing/2014/main" id="{12D94621-27EF-4F9F-8FB1-BF78BA3DBAC8}"/>
               </a:ext>
             </a:extLst>
           </p:cNvPr>
@@ -2169,6 +2414,7 @@
           <a:bodyPr vert="horz"/>
           <a:lstStyle/>
           <a:p>
+            <a:pPr rtl="0"/>
             <a:endParaRPr lang="en-IN"/>
           </a:p>
         </p:txBody>
@@ -2203,7 +2449,7 @@
           <p:cNvPr id="2" name="Title 1">
             <a:extLst>
               <a:ext uri="{FF2B5EF4-FFF2-40B4-BE49-F238E27FC236}">
-                <a16:creationId xmlns:a16="http://schemas.microsoft.com/office/drawing/2014/main" id="{7D1914C3-B01A-4D20-8A99-CD5AF78466B2}"/>
+                <a16:creationId xmlns:a16="http://schemas.microsoft.com/office/drawing/2014/main" id="{6BEA69E6-2FB1-498A-98B6-C7517A047A9D}"/>
               </a:ext>
             </a:extLst>
           </p:cNvPr>
@@ -2240,7 +2486,7 @@
           <p:cNvPr id="3" name="Subtitle 2">
             <a:extLst>
               <a:ext uri="{FF2B5EF4-FFF2-40B4-BE49-F238E27FC236}">
-                <a16:creationId xmlns:a16="http://schemas.microsoft.com/office/drawing/2014/main" id="{461FAAA4-3EBA-447A-AD51-BB3D0AD9430D}"/>
+                <a16:creationId xmlns:a16="http://schemas.microsoft.com/office/drawing/2014/main" id="{780E13E0-00AA-4D6B-8CEC-05323E25D188}"/>
               </a:ext>
             </a:extLst>
           </p:cNvPr>
@@ -2310,7 +2556,7 @@
           <p:cNvPr id="4" name="Date Placeholder 3">
             <a:extLst>
               <a:ext uri="{FF2B5EF4-FFF2-40B4-BE49-F238E27FC236}">
-                <a16:creationId xmlns:a16="http://schemas.microsoft.com/office/drawing/2014/main" id="{7D2683C5-45E2-4B8F-A02B-D911578695D3}"/>
+                <a16:creationId xmlns:a16="http://schemas.microsoft.com/office/drawing/2014/main" id="{CB3F694F-3EDC-4112-BDA8-D0DB0354B940}"/>
               </a:ext>
             </a:extLst>
           </p:cNvPr>
@@ -2336,7 +2582,7 @@
           <p:cNvPr id="5" name="Footer Placeholder 4">
             <a:extLst>
               <a:ext uri="{FF2B5EF4-FFF2-40B4-BE49-F238E27FC236}">
-                <a16:creationId xmlns:a16="http://schemas.microsoft.com/office/drawing/2014/main" id="{CA20E430-8325-4ABF-819C-67A22EB6DCF3}"/>
+                <a16:creationId xmlns:a16="http://schemas.microsoft.com/office/drawing/2014/main" id="{EAC744AD-A1AE-49D8-92EB-56C9E5BB9F55}"/>
               </a:ext>
             </a:extLst>
           </p:cNvPr>
@@ -2362,7 +2608,7 @@
           <p:cNvPr id="6" name="Slide Number Placeholder 5">
             <a:extLst>
               <a:ext uri="{FF2B5EF4-FFF2-40B4-BE49-F238E27FC236}">
-                <a16:creationId xmlns:a16="http://schemas.microsoft.com/office/drawing/2014/main" id="{516F8E4C-9DD7-427A-A910-04DDC4C40256}"/>
+                <a16:creationId xmlns:a16="http://schemas.microsoft.com/office/drawing/2014/main" id="{4F35210F-024B-4DE3-9D0C-069180325CBF}"/>
               </a:ext>
             </a:extLst>
           </p:cNvPr>
@@ -2379,7 +2625,7 @@
           <a:lstStyle/>
           <a:p>
             <a:pPr lvl="0"/>
-            <a:fld id="{6CEEBE04-0F9F-4337-8921-B61846231647}" type="slidenum">
+            <a:fld id="{8EBA4EB0-13B3-4324-9876-64EC37E7C3CA}" type="slidenum">
               <a:t>‹#›</a:t>
             </a:fld>
             <a:endParaRPr lang="en-IN"/>
@@ -2389,7 +2635,7 @@
     </p:spTree>
     <p:extLst>
       <p:ext uri="{BB962C8B-B14F-4D97-AF65-F5344CB8AC3E}">
-        <p14:creationId xmlns:p14="http://schemas.microsoft.com/office/powerpoint/2010/main" val="1119983022"/>
+        <p14:creationId xmlns:p14="http://schemas.microsoft.com/office/powerpoint/2010/main" val="1077701796"/>
       </p:ext>
     </p:extLst>
   </p:cSld>
@@ -2421,7 +2667,7 @@
           <p:cNvPr id="2" name="Title 1">
             <a:extLst>
               <a:ext uri="{FF2B5EF4-FFF2-40B4-BE49-F238E27FC236}">
-                <a16:creationId xmlns:a16="http://schemas.microsoft.com/office/drawing/2014/main" id="{D67ADAED-6BFA-4DFB-A693-20CBAF1F59DF}"/>
+                <a16:creationId xmlns:a16="http://schemas.microsoft.com/office/drawing/2014/main" id="{E13FADFE-6872-49E4-9221-4D1C99BC8596}"/>
               </a:ext>
             </a:extLst>
           </p:cNvPr>
@@ -2449,7 +2695,7 @@
           <p:cNvPr id="3" name="Vertical Text Placeholder 2">
             <a:extLst>
               <a:ext uri="{FF2B5EF4-FFF2-40B4-BE49-F238E27FC236}">
-                <a16:creationId xmlns:a16="http://schemas.microsoft.com/office/drawing/2014/main" id="{36EB9ECE-3A3A-4AF1-BD9B-461B94504243}"/>
+                <a16:creationId xmlns:a16="http://schemas.microsoft.com/office/drawing/2014/main" id="{88F43389-9D44-4065-BEBF-3CCFDB55049A}"/>
               </a:ext>
             </a:extLst>
           </p:cNvPr>
@@ -2506,7 +2752,7 @@
           <p:cNvPr id="4" name="Date Placeholder 3">
             <a:extLst>
               <a:ext uri="{FF2B5EF4-FFF2-40B4-BE49-F238E27FC236}">
-                <a16:creationId xmlns:a16="http://schemas.microsoft.com/office/drawing/2014/main" id="{A5E23333-2703-4FCA-90FA-F603DF670192}"/>
+                <a16:creationId xmlns:a16="http://schemas.microsoft.com/office/drawing/2014/main" id="{E9A611F5-198A-4F83-8846-E55C9C3CA32B}"/>
               </a:ext>
             </a:extLst>
           </p:cNvPr>
@@ -2532,7 +2778,7 @@
           <p:cNvPr id="5" name="Footer Placeholder 4">
             <a:extLst>
               <a:ext uri="{FF2B5EF4-FFF2-40B4-BE49-F238E27FC236}">
-                <a16:creationId xmlns:a16="http://schemas.microsoft.com/office/drawing/2014/main" id="{0FD64CE3-8704-4F39-BF51-B120C792A3C7}"/>
+                <a16:creationId xmlns:a16="http://schemas.microsoft.com/office/drawing/2014/main" id="{B273A127-ED3B-4BF0-9E2E-831F3580C711}"/>
               </a:ext>
             </a:extLst>
           </p:cNvPr>
@@ -2558,7 +2804,7 @@
           <p:cNvPr id="6" name="Slide Number Placeholder 5">
             <a:extLst>
               <a:ext uri="{FF2B5EF4-FFF2-40B4-BE49-F238E27FC236}">
-                <a16:creationId xmlns:a16="http://schemas.microsoft.com/office/drawing/2014/main" id="{756E5EB0-774A-4AC5-B830-73AD07A281B5}"/>
+                <a16:creationId xmlns:a16="http://schemas.microsoft.com/office/drawing/2014/main" id="{E1E3303B-CDC1-4F7E-920D-1A1F37919521}"/>
               </a:ext>
             </a:extLst>
           </p:cNvPr>
@@ -2575,7 +2821,7 @@
           <a:lstStyle/>
           <a:p>
             <a:pPr lvl="0"/>
-            <a:fld id="{5B9A457A-C365-4DC3-B2AA-3B78026424E7}" type="slidenum">
+            <a:fld id="{13999042-2757-4F57-9C88-25A6AB0ECD84}" type="slidenum">
               <a:t>‹#›</a:t>
             </a:fld>
             <a:endParaRPr lang="en-IN"/>
@@ -2585,7 +2831,7 @@
     </p:spTree>
     <p:extLst>
       <p:ext uri="{BB962C8B-B14F-4D97-AF65-F5344CB8AC3E}">
-        <p14:creationId xmlns:p14="http://schemas.microsoft.com/office/powerpoint/2010/main" val="3890561843"/>
+        <p14:creationId xmlns:p14="http://schemas.microsoft.com/office/powerpoint/2010/main" val="4103670726"/>
       </p:ext>
     </p:extLst>
   </p:cSld>
@@ -2617,7 +2863,7 @@
           <p:cNvPr id="2" name="Vertical Title 1">
             <a:extLst>
               <a:ext uri="{FF2B5EF4-FFF2-40B4-BE49-F238E27FC236}">
-                <a16:creationId xmlns:a16="http://schemas.microsoft.com/office/drawing/2014/main" id="{EF050444-8B2E-49BF-B5DB-596D1CF7FD99}"/>
+                <a16:creationId xmlns:a16="http://schemas.microsoft.com/office/drawing/2014/main" id="{2A0AEC52-0985-4F0E-8005-86D136D85ED8}"/>
               </a:ext>
             </a:extLst>
           </p:cNvPr>
@@ -2650,7 +2896,7 @@
           <p:cNvPr id="3" name="Vertical Text Placeholder 2">
             <a:extLst>
               <a:ext uri="{FF2B5EF4-FFF2-40B4-BE49-F238E27FC236}">
-                <a16:creationId xmlns:a16="http://schemas.microsoft.com/office/drawing/2014/main" id="{72327626-8917-4D14-9582-C012708766B0}"/>
+                <a16:creationId xmlns:a16="http://schemas.microsoft.com/office/drawing/2014/main" id="{C874B8E7-40B2-42AB-A866-DEE5F6BA67C8}"/>
               </a:ext>
             </a:extLst>
           </p:cNvPr>
@@ -2712,7 +2958,7 @@
           <p:cNvPr id="4" name="Date Placeholder 3">
             <a:extLst>
               <a:ext uri="{FF2B5EF4-FFF2-40B4-BE49-F238E27FC236}">
-                <a16:creationId xmlns:a16="http://schemas.microsoft.com/office/drawing/2014/main" id="{55B903F3-1522-4EA8-9B09-2CFD029C5E8D}"/>
+                <a16:creationId xmlns:a16="http://schemas.microsoft.com/office/drawing/2014/main" id="{94640150-E6EB-4098-A6CC-9ED65A83A1B4}"/>
               </a:ext>
             </a:extLst>
           </p:cNvPr>
@@ -2738,7 +2984,7 @@
           <p:cNvPr id="5" name="Footer Placeholder 4">
             <a:extLst>
               <a:ext uri="{FF2B5EF4-FFF2-40B4-BE49-F238E27FC236}">
-                <a16:creationId xmlns:a16="http://schemas.microsoft.com/office/drawing/2014/main" id="{5B9B8EC8-DA4F-4540-AC86-0003B6256C33}"/>
+                <a16:creationId xmlns:a16="http://schemas.microsoft.com/office/drawing/2014/main" id="{BE96642B-5EB2-4FFA-B7C1-F70E3B60A73B}"/>
               </a:ext>
             </a:extLst>
           </p:cNvPr>
@@ -2764,7 +3010,7 @@
           <p:cNvPr id="6" name="Slide Number Placeholder 5">
             <a:extLst>
               <a:ext uri="{FF2B5EF4-FFF2-40B4-BE49-F238E27FC236}">
-                <a16:creationId xmlns:a16="http://schemas.microsoft.com/office/drawing/2014/main" id="{B6516B38-5604-4F6A-84A4-4E7DBC4EA026}"/>
+                <a16:creationId xmlns:a16="http://schemas.microsoft.com/office/drawing/2014/main" id="{F2772F29-BE32-45D9-9D3E-9C72ECFACE5A}"/>
               </a:ext>
             </a:extLst>
           </p:cNvPr>
@@ -2781,7 +3027,7 @@
           <a:lstStyle/>
           <a:p>
             <a:pPr lvl="0"/>
-            <a:fld id="{0CF6E371-EB03-454B-85B3-6085A9EA3D70}" type="slidenum">
+            <a:fld id="{BC212587-FBF0-49E9-8263-86FE71EE3CD8}" type="slidenum">
               <a:t>‹#›</a:t>
             </a:fld>
             <a:endParaRPr lang="en-IN"/>
@@ -2791,7 +3037,7 @@
     </p:spTree>
     <p:extLst>
       <p:ext uri="{BB962C8B-B14F-4D97-AF65-F5344CB8AC3E}">
-        <p14:creationId xmlns:p14="http://schemas.microsoft.com/office/powerpoint/2010/main" val="2464873294"/>
+        <p14:creationId xmlns:p14="http://schemas.microsoft.com/office/powerpoint/2010/main" val="992388804"/>
       </p:ext>
     </p:extLst>
   </p:cSld>
@@ -2823,7 +3069,7 @@
           <p:cNvPr id="2" name="Title 1">
             <a:extLst>
               <a:ext uri="{FF2B5EF4-FFF2-40B4-BE49-F238E27FC236}">
-                <a16:creationId xmlns:a16="http://schemas.microsoft.com/office/drawing/2014/main" id="{32518D85-1C80-4C7E-B482-AC4ED5123727}"/>
+                <a16:creationId xmlns:a16="http://schemas.microsoft.com/office/drawing/2014/main" id="{CF85B7A8-527B-415D-9442-8FD31FADDC45}"/>
               </a:ext>
             </a:extLst>
           </p:cNvPr>
@@ -2851,7 +3097,7 @@
           <p:cNvPr id="3" name="Content Placeholder 2">
             <a:extLst>
               <a:ext uri="{FF2B5EF4-FFF2-40B4-BE49-F238E27FC236}">
-                <a16:creationId xmlns:a16="http://schemas.microsoft.com/office/drawing/2014/main" id="{5B82D9AB-0DC0-4C3E-9887-41ACB7F021CD}"/>
+                <a16:creationId xmlns:a16="http://schemas.microsoft.com/office/drawing/2014/main" id="{30B45F32-D865-4558-B64F-5A5461543B25}"/>
               </a:ext>
             </a:extLst>
           </p:cNvPr>
@@ -2908,7 +3154,7 @@
           <p:cNvPr id="4" name="Date Placeholder 3">
             <a:extLst>
               <a:ext uri="{FF2B5EF4-FFF2-40B4-BE49-F238E27FC236}">
-                <a16:creationId xmlns:a16="http://schemas.microsoft.com/office/drawing/2014/main" id="{69FD5BD1-FF17-42A9-8B05-0C7462D353AC}"/>
+                <a16:creationId xmlns:a16="http://schemas.microsoft.com/office/drawing/2014/main" id="{BF2DD23F-D0FA-4E7D-81D2-F9B1A75EB25B}"/>
               </a:ext>
             </a:extLst>
           </p:cNvPr>
@@ -2934,7 +3180,7 @@
           <p:cNvPr id="5" name="Footer Placeholder 4">
             <a:extLst>
               <a:ext uri="{FF2B5EF4-FFF2-40B4-BE49-F238E27FC236}">
-                <a16:creationId xmlns:a16="http://schemas.microsoft.com/office/drawing/2014/main" id="{38AF9B12-C31A-41F4-A437-418DC8B59463}"/>
+                <a16:creationId xmlns:a16="http://schemas.microsoft.com/office/drawing/2014/main" id="{30AC4A56-6B35-477B-9423-9D77816DF8E9}"/>
               </a:ext>
             </a:extLst>
           </p:cNvPr>
@@ -2960,7 +3206,7 @@
           <p:cNvPr id="6" name="Slide Number Placeholder 5">
             <a:extLst>
               <a:ext uri="{FF2B5EF4-FFF2-40B4-BE49-F238E27FC236}">
-                <a16:creationId xmlns:a16="http://schemas.microsoft.com/office/drawing/2014/main" id="{855E3272-BEBD-4160-A647-0D7D1FDB1251}"/>
+                <a16:creationId xmlns:a16="http://schemas.microsoft.com/office/drawing/2014/main" id="{6C6824D4-1965-4029-9275-286716B726D8}"/>
               </a:ext>
             </a:extLst>
           </p:cNvPr>
@@ -2977,7 +3223,7 @@
           <a:lstStyle/>
           <a:p>
             <a:pPr lvl="0"/>
-            <a:fld id="{86CDA250-C056-44AB-ACBC-DE27F996EFFB}" type="slidenum">
+            <a:fld id="{54E95C9E-760B-4260-BBE2-5819F828CCCA}" type="slidenum">
               <a:t>‹#›</a:t>
             </a:fld>
             <a:endParaRPr lang="en-IN"/>
@@ -2987,7 +3233,7 @@
     </p:spTree>
     <p:extLst>
       <p:ext uri="{BB962C8B-B14F-4D97-AF65-F5344CB8AC3E}">
-        <p14:creationId xmlns:p14="http://schemas.microsoft.com/office/powerpoint/2010/main" val="3100842275"/>
+        <p14:creationId xmlns:p14="http://schemas.microsoft.com/office/powerpoint/2010/main" val="3338001565"/>
       </p:ext>
     </p:extLst>
   </p:cSld>
@@ -3019,7 +3265,7 @@
           <p:cNvPr id="2" name="Title 1">
             <a:extLst>
               <a:ext uri="{FF2B5EF4-FFF2-40B4-BE49-F238E27FC236}">
-                <a16:creationId xmlns:a16="http://schemas.microsoft.com/office/drawing/2014/main" id="{D143C16F-88F9-4C2C-9127-DBB76E3EE1D3}"/>
+                <a16:creationId xmlns:a16="http://schemas.microsoft.com/office/drawing/2014/main" id="{7CEBF5C7-B5F3-49DF-9228-5F1293E012B3}"/>
               </a:ext>
             </a:extLst>
           </p:cNvPr>
@@ -3056,7 +3302,7 @@
           <p:cNvPr id="3" name="Text Placeholder 2">
             <a:extLst>
               <a:ext uri="{FF2B5EF4-FFF2-40B4-BE49-F238E27FC236}">
-                <a16:creationId xmlns:a16="http://schemas.microsoft.com/office/drawing/2014/main" id="{9B90504F-8444-4BD4-AD95-5B413EFB8E45}"/>
+                <a16:creationId xmlns:a16="http://schemas.microsoft.com/office/drawing/2014/main" id="{6DAFE444-402A-48D4-9C78-D6EF5F6FC7D8}"/>
               </a:ext>
             </a:extLst>
           </p:cNvPr>
@@ -3181,7 +3427,7 @@
           <p:cNvPr id="4" name="Date Placeholder 3">
             <a:extLst>
               <a:ext uri="{FF2B5EF4-FFF2-40B4-BE49-F238E27FC236}">
-                <a16:creationId xmlns:a16="http://schemas.microsoft.com/office/drawing/2014/main" id="{E5C98D9A-EF16-41D0-A76A-E874FCCFD751}"/>
+                <a16:creationId xmlns:a16="http://schemas.microsoft.com/office/drawing/2014/main" id="{C175CC6F-5173-4DCB-9CA2-18CE961F85D0}"/>
               </a:ext>
             </a:extLst>
           </p:cNvPr>
@@ -3207,7 +3453,7 @@
           <p:cNvPr id="5" name="Footer Placeholder 4">
             <a:extLst>
               <a:ext uri="{FF2B5EF4-FFF2-40B4-BE49-F238E27FC236}">
-                <a16:creationId xmlns:a16="http://schemas.microsoft.com/office/drawing/2014/main" id="{42E9C113-68C5-4A6D-858A-E5CDB6CB6D0A}"/>
+                <a16:creationId xmlns:a16="http://schemas.microsoft.com/office/drawing/2014/main" id="{E2F0D642-C89D-4A6F-BD78-BD228ABD32C4}"/>
               </a:ext>
             </a:extLst>
           </p:cNvPr>
@@ -3233,7 +3479,7 @@
           <p:cNvPr id="6" name="Slide Number Placeholder 5">
             <a:extLst>
               <a:ext uri="{FF2B5EF4-FFF2-40B4-BE49-F238E27FC236}">
-                <a16:creationId xmlns:a16="http://schemas.microsoft.com/office/drawing/2014/main" id="{75A0A1CF-4BE7-438A-9F39-A4CA5A47B0EE}"/>
+                <a16:creationId xmlns:a16="http://schemas.microsoft.com/office/drawing/2014/main" id="{7FF28B59-C105-410D-A06B-E35EF942216D}"/>
               </a:ext>
             </a:extLst>
           </p:cNvPr>
@@ -3250,7 +3496,7 @@
           <a:lstStyle/>
           <a:p>
             <a:pPr lvl="0"/>
-            <a:fld id="{5F4A0657-9E09-410F-A188-D01D03A6CB6A}" type="slidenum">
+            <a:fld id="{C847D130-5950-49F1-947B-5D0CECDD4C0C}" type="slidenum">
               <a:t>‹#›</a:t>
             </a:fld>
             <a:endParaRPr lang="en-IN"/>
@@ -3260,7 +3506,7 @@
     </p:spTree>
     <p:extLst>
       <p:ext uri="{BB962C8B-B14F-4D97-AF65-F5344CB8AC3E}">
-        <p14:creationId xmlns:p14="http://schemas.microsoft.com/office/powerpoint/2010/main" val="1924265264"/>
+        <p14:creationId xmlns:p14="http://schemas.microsoft.com/office/powerpoint/2010/main" val="865341612"/>
       </p:ext>
     </p:extLst>
   </p:cSld>
@@ -3292,7 +3538,7 @@
           <p:cNvPr id="2" name="Title 1">
             <a:extLst>
               <a:ext uri="{FF2B5EF4-FFF2-40B4-BE49-F238E27FC236}">
-                <a16:creationId xmlns:a16="http://schemas.microsoft.com/office/drawing/2014/main" id="{A9DEDAAF-B5EF-4170-AC0A-7ADF21B74642}"/>
+                <a16:creationId xmlns:a16="http://schemas.microsoft.com/office/drawing/2014/main" id="{0D72B02F-0146-4AA0-8FB3-A02A9658418D}"/>
               </a:ext>
             </a:extLst>
           </p:cNvPr>
@@ -3320,7 +3566,7 @@
           <p:cNvPr id="3" name="Content Placeholder 2">
             <a:extLst>
               <a:ext uri="{FF2B5EF4-FFF2-40B4-BE49-F238E27FC236}">
-                <a16:creationId xmlns:a16="http://schemas.microsoft.com/office/drawing/2014/main" id="{43E0A617-26E1-42E7-8FDA-ECFDC0FE3C77}"/>
+                <a16:creationId xmlns:a16="http://schemas.microsoft.com/office/drawing/2014/main" id="{3206186B-06ED-4B85-AB6D-8A1F63F9C68B}"/>
               </a:ext>
             </a:extLst>
           </p:cNvPr>
@@ -3382,7 +3628,7 @@
           <p:cNvPr id="4" name="Content Placeholder 3">
             <a:extLst>
               <a:ext uri="{FF2B5EF4-FFF2-40B4-BE49-F238E27FC236}">
-                <a16:creationId xmlns:a16="http://schemas.microsoft.com/office/drawing/2014/main" id="{A6A95EE5-9644-4E46-8CF4-B90C12A85E01}"/>
+                <a16:creationId xmlns:a16="http://schemas.microsoft.com/office/drawing/2014/main" id="{A6996C1C-9D56-46A9-9454-5CAF692A1246}"/>
               </a:ext>
             </a:extLst>
           </p:cNvPr>
@@ -3444,7 +3690,7 @@
           <p:cNvPr id="5" name="Date Placeholder 4">
             <a:extLst>
               <a:ext uri="{FF2B5EF4-FFF2-40B4-BE49-F238E27FC236}">
-                <a16:creationId xmlns:a16="http://schemas.microsoft.com/office/drawing/2014/main" id="{728262ED-2C6B-4FA1-8BC6-072D3169AC69}"/>
+                <a16:creationId xmlns:a16="http://schemas.microsoft.com/office/drawing/2014/main" id="{67FCA97A-3B3D-4DE9-A3C8-7F27E936A919}"/>
               </a:ext>
             </a:extLst>
           </p:cNvPr>
@@ -3470,7 +3716,7 @@
           <p:cNvPr id="6" name="Footer Placeholder 5">
             <a:extLst>
               <a:ext uri="{FF2B5EF4-FFF2-40B4-BE49-F238E27FC236}">
-                <a16:creationId xmlns:a16="http://schemas.microsoft.com/office/drawing/2014/main" id="{9A80D029-6C0C-4917-A643-A014FEE67F89}"/>
+                <a16:creationId xmlns:a16="http://schemas.microsoft.com/office/drawing/2014/main" id="{12A47FA5-283D-4BBD-94DC-64731AD2EA00}"/>
               </a:ext>
             </a:extLst>
           </p:cNvPr>
@@ -3496,7 +3742,7 @@
           <p:cNvPr id="7" name="Slide Number Placeholder 6">
             <a:extLst>
               <a:ext uri="{FF2B5EF4-FFF2-40B4-BE49-F238E27FC236}">
-                <a16:creationId xmlns:a16="http://schemas.microsoft.com/office/drawing/2014/main" id="{64F2C855-703F-47BD-91FC-CFCAD2BC4B5E}"/>
+                <a16:creationId xmlns:a16="http://schemas.microsoft.com/office/drawing/2014/main" id="{A7DF08A6-7A47-4B6D-BD67-15E4CFC9018C}"/>
               </a:ext>
             </a:extLst>
           </p:cNvPr>
@@ -3513,7 +3759,7 @@
           <a:lstStyle/>
           <a:p>
             <a:pPr lvl="0"/>
-            <a:fld id="{E20F7BD9-B3E5-4DF5-AE6C-0C43AB0CB31B}" type="slidenum">
+            <a:fld id="{32A3422B-1D91-4286-980F-3682DDE894A6}" type="slidenum">
               <a:t>‹#›</a:t>
             </a:fld>
             <a:endParaRPr lang="en-IN"/>
@@ -3523,7 +3769,7 @@
     </p:spTree>
     <p:extLst>
       <p:ext uri="{BB962C8B-B14F-4D97-AF65-F5344CB8AC3E}">
-        <p14:creationId xmlns:p14="http://schemas.microsoft.com/office/powerpoint/2010/main" val="3765134900"/>
+        <p14:creationId xmlns:p14="http://schemas.microsoft.com/office/powerpoint/2010/main" val="741229751"/>
       </p:ext>
     </p:extLst>
   </p:cSld>
@@ -3555,7 +3801,7 @@
           <p:cNvPr id="2" name="Title 1">
             <a:extLst>
               <a:ext uri="{FF2B5EF4-FFF2-40B4-BE49-F238E27FC236}">
-                <a16:creationId xmlns:a16="http://schemas.microsoft.com/office/drawing/2014/main" id="{D07EE6C1-5390-4D7A-8D4D-04193C51F0E3}"/>
+                <a16:creationId xmlns:a16="http://schemas.microsoft.com/office/drawing/2014/main" id="{196B9F05-2B6A-4BF5-BB6E-49D2162C4C10}"/>
               </a:ext>
             </a:extLst>
           </p:cNvPr>
@@ -3588,7 +3834,7 @@
           <p:cNvPr id="3" name="Text Placeholder 2">
             <a:extLst>
               <a:ext uri="{FF2B5EF4-FFF2-40B4-BE49-F238E27FC236}">
-                <a16:creationId xmlns:a16="http://schemas.microsoft.com/office/drawing/2014/main" id="{42ED1DAF-E47E-4C1A-BB9C-2CE87AE5DFE1}"/>
+                <a16:creationId xmlns:a16="http://schemas.microsoft.com/office/drawing/2014/main" id="{4826E2D9-E3C9-4CCE-B539-532F0AF3939D}"/>
               </a:ext>
             </a:extLst>
           </p:cNvPr>
@@ -3659,7 +3905,7 @@
           <p:cNvPr id="4" name="Content Placeholder 3">
             <a:extLst>
               <a:ext uri="{FF2B5EF4-FFF2-40B4-BE49-F238E27FC236}">
-                <a16:creationId xmlns:a16="http://schemas.microsoft.com/office/drawing/2014/main" id="{2AA5FD21-4EB4-4815-9C0F-0D5CDE4EA8CD}"/>
+                <a16:creationId xmlns:a16="http://schemas.microsoft.com/office/drawing/2014/main" id="{EBD5B19B-C1CE-4461-9562-B685DEEA9516}"/>
               </a:ext>
             </a:extLst>
           </p:cNvPr>
@@ -3721,7 +3967,7 @@
           <p:cNvPr id="5" name="Text Placeholder 4">
             <a:extLst>
               <a:ext uri="{FF2B5EF4-FFF2-40B4-BE49-F238E27FC236}">
-                <a16:creationId xmlns:a16="http://schemas.microsoft.com/office/drawing/2014/main" id="{DDFC4421-94F0-44EC-BBE4-76CE9110FB14}"/>
+                <a16:creationId xmlns:a16="http://schemas.microsoft.com/office/drawing/2014/main" id="{1540DD8F-F1F5-4F29-9506-57FB036CF47E}"/>
               </a:ext>
             </a:extLst>
           </p:cNvPr>
@@ -3792,7 +4038,7 @@
           <p:cNvPr id="6" name="Content Placeholder 5">
             <a:extLst>
               <a:ext uri="{FF2B5EF4-FFF2-40B4-BE49-F238E27FC236}">
-                <a16:creationId xmlns:a16="http://schemas.microsoft.com/office/drawing/2014/main" id="{02ADF96B-AD9C-418D-BB76-A5B17BB35748}"/>
+                <a16:creationId xmlns:a16="http://schemas.microsoft.com/office/drawing/2014/main" id="{20795B89-9538-483B-9826-EB2FA4E8AF60}"/>
               </a:ext>
             </a:extLst>
           </p:cNvPr>
@@ -3854,7 +4100,7 @@
           <p:cNvPr id="7" name="Date Placeholder 6">
             <a:extLst>
               <a:ext uri="{FF2B5EF4-FFF2-40B4-BE49-F238E27FC236}">
-                <a16:creationId xmlns:a16="http://schemas.microsoft.com/office/drawing/2014/main" id="{9AF3F69B-E889-4BC5-9EEF-79337793C0DF}"/>
+                <a16:creationId xmlns:a16="http://schemas.microsoft.com/office/drawing/2014/main" id="{1D7129C3-F998-4B38-A31D-6E6F46FF2AF7}"/>
               </a:ext>
             </a:extLst>
           </p:cNvPr>
@@ -3880,7 +4126,7 @@
           <p:cNvPr id="8" name="Footer Placeholder 7">
             <a:extLst>
               <a:ext uri="{FF2B5EF4-FFF2-40B4-BE49-F238E27FC236}">
-                <a16:creationId xmlns:a16="http://schemas.microsoft.com/office/drawing/2014/main" id="{657B3850-DB81-43BB-81BB-0B381D1DD1D9}"/>
+                <a16:creationId xmlns:a16="http://schemas.microsoft.com/office/drawing/2014/main" id="{A7AEED61-BB3F-4CBA-B964-C6A729844741}"/>
               </a:ext>
             </a:extLst>
           </p:cNvPr>
@@ -3906,7 +4152,7 @@
           <p:cNvPr id="9" name="Slide Number Placeholder 8">
             <a:extLst>
               <a:ext uri="{FF2B5EF4-FFF2-40B4-BE49-F238E27FC236}">
-                <a16:creationId xmlns:a16="http://schemas.microsoft.com/office/drawing/2014/main" id="{360E42CE-1799-450A-A662-291DA8151366}"/>
+                <a16:creationId xmlns:a16="http://schemas.microsoft.com/office/drawing/2014/main" id="{F7797B7E-35C3-4B9B-861A-788F2E0BCD49}"/>
               </a:ext>
             </a:extLst>
           </p:cNvPr>
@@ -3923,7 +4169,7 @@
           <a:lstStyle/>
           <a:p>
             <a:pPr lvl="0"/>
-            <a:fld id="{5BE7A4BE-061F-49CA-9255-EDCB92121A2F}" type="slidenum">
+            <a:fld id="{7CBF36DB-5B20-4C33-A6E8-96716D92F182}" type="slidenum">
               <a:t>‹#›</a:t>
             </a:fld>
             <a:endParaRPr lang="en-IN"/>
@@ -3933,7 +4179,7 @@
     </p:spTree>
     <p:extLst>
       <p:ext uri="{BB962C8B-B14F-4D97-AF65-F5344CB8AC3E}">
-        <p14:creationId xmlns:p14="http://schemas.microsoft.com/office/powerpoint/2010/main" val="2108470496"/>
+        <p14:creationId xmlns:p14="http://schemas.microsoft.com/office/powerpoint/2010/main" val="1837230907"/>
       </p:ext>
     </p:extLst>
   </p:cSld>
@@ -3965,7 +4211,7 @@
           <p:cNvPr id="2" name="Title 1">
             <a:extLst>
               <a:ext uri="{FF2B5EF4-FFF2-40B4-BE49-F238E27FC236}">
-                <a16:creationId xmlns:a16="http://schemas.microsoft.com/office/drawing/2014/main" id="{9DA73E3F-39C3-47F1-A622-139CB1937879}"/>
+                <a16:creationId xmlns:a16="http://schemas.microsoft.com/office/drawing/2014/main" id="{9661475D-CF07-4558-B09C-CBA1C90665F2}"/>
               </a:ext>
             </a:extLst>
           </p:cNvPr>
@@ -3993,7 +4239,7 @@
           <p:cNvPr id="3" name="Date Placeholder 2">
             <a:extLst>
               <a:ext uri="{FF2B5EF4-FFF2-40B4-BE49-F238E27FC236}">
-                <a16:creationId xmlns:a16="http://schemas.microsoft.com/office/drawing/2014/main" id="{FFD0602D-64E6-4D1A-BBB2-1BC77EC77E81}"/>
+                <a16:creationId xmlns:a16="http://schemas.microsoft.com/office/drawing/2014/main" id="{B1A29DE8-2C9A-4E1B-9061-AB198F31228E}"/>
               </a:ext>
             </a:extLst>
           </p:cNvPr>
@@ -4019,7 +4265,7 @@
           <p:cNvPr id="4" name="Footer Placeholder 3">
             <a:extLst>
               <a:ext uri="{FF2B5EF4-FFF2-40B4-BE49-F238E27FC236}">
-                <a16:creationId xmlns:a16="http://schemas.microsoft.com/office/drawing/2014/main" id="{52EBFC07-834E-4342-90A6-E49E497AC8A0}"/>
+                <a16:creationId xmlns:a16="http://schemas.microsoft.com/office/drawing/2014/main" id="{1EC6583F-F836-4A8C-99BE-36CCA8BDC6CA}"/>
               </a:ext>
             </a:extLst>
           </p:cNvPr>
@@ -4045,7 +4291,7 @@
           <p:cNvPr id="5" name="Slide Number Placeholder 4">
             <a:extLst>
               <a:ext uri="{FF2B5EF4-FFF2-40B4-BE49-F238E27FC236}">
-                <a16:creationId xmlns:a16="http://schemas.microsoft.com/office/drawing/2014/main" id="{ED0116C5-038A-4798-A779-395F498B772E}"/>
+                <a16:creationId xmlns:a16="http://schemas.microsoft.com/office/drawing/2014/main" id="{D3CF3209-DD66-4FA3-826C-C8190FD74FC7}"/>
               </a:ext>
             </a:extLst>
           </p:cNvPr>
@@ -4062,7 +4308,7 @@
           <a:lstStyle/>
           <a:p>
             <a:pPr lvl="0"/>
-            <a:fld id="{33068350-5E00-4710-91AA-648A97826F74}" type="slidenum">
+            <a:fld id="{9171CDA3-8A3F-45EA-9CDD-BBA9E71DC79A}" type="slidenum">
               <a:t>‹#›</a:t>
             </a:fld>
             <a:endParaRPr lang="en-IN"/>
@@ -4072,7 +4318,7 @@
     </p:spTree>
     <p:extLst>
       <p:ext uri="{BB962C8B-B14F-4D97-AF65-F5344CB8AC3E}">
-        <p14:creationId xmlns:p14="http://schemas.microsoft.com/office/powerpoint/2010/main" val="2909126305"/>
+        <p14:creationId xmlns:p14="http://schemas.microsoft.com/office/powerpoint/2010/main" val="3854899434"/>
       </p:ext>
     </p:extLst>
   </p:cSld>
@@ -4104,7 +4350,7 @@
           <p:cNvPr id="2" name="Date Placeholder 1">
             <a:extLst>
               <a:ext uri="{FF2B5EF4-FFF2-40B4-BE49-F238E27FC236}">
-                <a16:creationId xmlns:a16="http://schemas.microsoft.com/office/drawing/2014/main" id="{DB72F0BB-D803-455D-985C-8236C153ECEA}"/>
+                <a16:creationId xmlns:a16="http://schemas.microsoft.com/office/drawing/2014/main" id="{732A37C5-38C1-4C1B-830E-7E28AEAEBFA3}"/>
               </a:ext>
             </a:extLst>
           </p:cNvPr>
@@ -4130,7 +4376,7 @@
           <p:cNvPr id="3" name="Footer Placeholder 2">
             <a:extLst>
               <a:ext uri="{FF2B5EF4-FFF2-40B4-BE49-F238E27FC236}">
-                <a16:creationId xmlns:a16="http://schemas.microsoft.com/office/drawing/2014/main" id="{D3C564F8-617B-4951-A29D-5C905BA75EC4}"/>
+                <a16:creationId xmlns:a16="http://schemas.microsoft.com/office/drawing/2014/main" id="{992AC133-02AD-4D5F-91EE-4D2959757D96}"/>
               </a:ext>
             </a:extLst>
           </p:cNvPr>
@@ -4156,7 +4402,7 @@
           <p:cNvPr id="4" name="Slide Number Placeholder 3">
             <a:extLst>
               <a:ext uri="{FF2B5EF4-FFF2-40B4-BE49-F238E27FC236}">
-                <a16:creationId xmlns:a16="http://schemas.microsoft.com/office/drawing/2014/main" id="{93210617-4736-4B4B-AA78-724CA9428F95}"/>
+                <a16:creationId xmlns:a16="http://schemas.microsoft.com/office/drawing/2014/main" id="{50424486-29E4-4C3F-B56E-E4F62B461CF5}"/>
               </a:ext>
             </a:extLst>
           </p:cNvPr>
@@ -4173,7 +4419,7 @@
           <a:lstStyle/>
           <a:p>
             <a:pPr lvl="0"/>
-            <a:fld id="{0CD51C5A-C590-4A45-A45F-8831C75C2ADF}" type="slidenum">
+            <a:fld id="{A5FB9281-376B-4B73-BB9D-2BD7D83E22DC}" type="slidenum">
               <a:t>‹#›</a:t>
             </a:fld>
             <a:endParaRPr lang="en-IN"/>
@@ -4183,7 +4429,7 @@
     </p:spTree>
     <p:extLst>
       <p:ext uri="{BB962C8B-B14F-4D97-AF65-F5344CB8AC3E}">
-        <p14:creationId xmlns:p14="http://schemas.microsoft.com/office/powerpoint/2010/main" val="1312790771"/>
+        <p14:creationId xmlns:p14="http://schemas.microsoft.com/office/powerpoint/2010/main" val="3222403725"/>
       </p:ext>
     </p:extLst>
   </p:cSld>
@@ -4216,7 +4462,7 @@
           <p:cNvPr id="2" name="Title 1">
             <a:extLst>
               <a:ext uri="{FF2B5EF4-FFF2-40B4-BE49-F238E27FC236}">
-                <a16:creationId xmlns:a16="http://schemas.microsoft.com/office/drawing/2014/main" id="{FAC9ACAF-1AA6-4B57-84E0-CE57FE8A5189}"/>
+                <a16:creationId xmlns:a16="http://schemas.microsoft.com/office/drawing/2014/main" id="{8A787458-84D8-408A-BB5C-727F50105350}"/>
               </a:ext>
             </a:extLst>
           </p:cNvPr>
@@ -4253,7 +4499,7 @@
           <p:cNvPr id="3" name="Content Placeholder 2">
             <a:extLst>
               <a:ext uri="{FF2B5EF4-FFF2-40B4-BE49-F238E27FC236}">
-                <a16:creationId xmlns:a16="http://schemas.microsoft.com/office/drawing/2014/main" id="{4A980F6E-FC05-4FCD-99B0-C417451F9F06}"/>
+                <a16:creationId xmlns:a16="http://schemas.microsoft.com/office/drawing/2014/main" id="{56E31714-274A-45FA-A8CE-85B513FD4D49}"/>
               </a:ext>
             </a:extLst>
           </p:cNvPr>
@@ -4343,7 +4589,7 @@
           <p:cNvPr id="4" name="Text Placeholder 3">
             <a:extLst>
               <a:ext uri="{FF2B5EF4-FFF2-40B4-BE49-F238E27FC236}">
-                <a16:creationId xmlns:a16="http://schemas.microsoft.com/office/drawing/2014/main" id="{B3114028-1729-4381-AA96-BF31ECC67924}"/>
+                <a16:creationId xmlns:a16="http://schemas.microsoft.com/office/drawing/2014/main" id="{D78C466F-9B63-4593-8D7A-97CC546AF5B6}"/>
               </a:ext>
             </a:extLst>
           </p:cNvPr>
@@ -4414,7 +4660,7 @@
           <p:cNvPr id="5" name="Date Placeholder 4">
             <a:extLst>
               <a:ext uri="{FF2B5EF4-FFF2-40B4-BE49-F238E27FC236}">
-                <a16:creationId xmlns:a16="http://schemas.microsoft.com/office/drawing/2014/main" id="{3D8DAE91-E053-4F91-95DA-C5537E08A308}"/>
+                <a16:creationId xmlns:a16="http://schemas.microsoft.com/office/drawing/2014/main" id="{E06433C1-BADE-456B-9209-1E7DF120B2C1}"/>
               </a:ext>
             </a:extLst>
           </p:cNvPr>
@@ -4440,7 +4686,7 @@
           <p:cNvPr id="6" name="Footer Placeholder 5">
             <a:extLst>
               <a:ext uri="{FF2B5EF4-FFF2-40B4-BE49-F238E27FC236}">
-                <a16:creationId xmlns:a16="http://schemas.microsoft.com/office/drawing/2014/main" id="{89455558-6E9D-4E9D-8037-B5C15F06F34A}"/>
+                <a16:creationId xmlns:a16="http://schemas.microsoft.com/office/drawing/2014/main" id="{C73466ED-B043-436E-817F-B1D1BC24AF43}"/>
               </a:ext>
             </a:extLst>
           </p:cNvPr>
@@ -4466,7 +4712,7 @@
           <p:cNvPr id="7" name="Slide Number Placeholder 6">
             <a:extLst>
               <a:ext uri="{FF2B5EF4-FFF2-40B4-BE49-F238E27FC236}">
-                <a16:creationId xmlns:a16="http://schemas.microsoft.com/office/drawing/2014/main" id="{F317F8F7-B8B2-4287-BFF8-7B460E82FF59}"/>
+                <a16:creationId xmlns:a16="http://schemas.microsoft.com/office/drawing/2014/main" id="{14BD3FEA-5772-4816-B9B3-CDA56EF8D946}"/>
               </a:ext>
             </a:extLst>
           </p:cNvPr>
@@ -4483,7 +4729,7 @@
           <a:lstStyle/>
           <a:p>
             <a:pPr lvl="0"/>
-            <a:fld id="{38D85886-5B42-49CA-956E-78DDDADE23CB}" type="slidenum">
+            <a:fld id="{13F87A64-561F-4777-B35C-A299809A6CA0}" type="slidenum">
               <a:t>‹#›</a:t>
             </a:fld>
             <a:endParaRPr lang="en-IN"/>
@@ -4493,7 +4739,7 @@
     </p:spTree>
     <p:extLst>
       <p:ext uri="{BB962C8B-B14F-4D97-AF65-F5344CB8AC3E}">
-        <p14:creationId xmlns:p14="http://schemas.microsoft.com/office/powerpoint/2010/main" val="3930830836"/>
+        <p14:creationId xmlns:p14="http://schemas.microsoft.com/office/powerpoint/2010/main" val="131863867"/>
       </p:ext>
     </p:extLst>
   </p:cSld>
@@ -4525,7 +4771,7 @@
           <p:cNvPr id="2" name="Title 1">
             <a:extLst>
               <a:ext uri="{FF2B5EF4-FFF2-40B4-BE49-F238E27FC236}">
-                <a16:creationId xmlns:a16="http://schemas.microsoft.com/office/drawing/2014/main" id="{34D3FC66-035B-4749-9B38-EE24EBC548F3}"/>
+                <a16:creationId xmlns:a16="http://schemas.microsoft.com/office/drawing/2014/main" id="{EB7C99D6-B74D-4250-BAE6-302B79BE5421}"/>
               </a:ext>
             </a:extLst>
           </p:cNvPr>
@@ -4562,7 +4808,7 @@
           <p:cNvPr id="3" name="Picture Placeholder 2">
             <a:extLst>
               <a:ext uri="{FF2B5EF4-FFF2-40B4-BE49-F238E27FC236}">
-                <a16:creationId xmlns:a16="http://schemas.microsoft.com/office/drawing/2014/main" id="{A1429724-F608-4E06-B6F2-B29CED9A6C0E}"/>
+                <a16:creationId xmlns:a16="http://schemas.microsoft.com/office/drawing/2014/main" id="{9AD96B82-254A-495C-8083-5A78EB1378C2}"/>
               </a:ext>
             </a:extLst>
           </p:cNvPr>
@@ -4629,7 +4875,7 @@
           <p:cNvPr id="4" name="Text Placeholder 3">
             <a:extLst>
               <a:ext uri="{FF2B5EF4-FFF2-40B4-BE49-F238E27FC236}">
-                <a16:creationId xmlns:a16="http://schemas.microsoft.com/office/drawing/2014/main" id="{B350677E-943A-465E-890A-6B030D18A2E9}"/>
+                <a16:creationId xmlns:a16="http://schemas.microsoft.com/office/drawing/2014/main" id="{A919C65A-0566-48E7-A769-D80DD4FD5B8F}"/>
               </a:ext>
             </a:extLst>
           </p:cNvPr>
@@ -4700,7 +4946,7 @@
           <p:cNvPr id="5" name="Date Placeholder 4">
             <a:extLst>
               <a:ext uri="{FF2B5EF4-FFF2-40B4-BE49-F238E27FC236}">
-                <a16:creationId xmlns:a16="http://schemas.microsoft.com/office/drawing/2014/main" id="{5DF3A126-262F-4C02-BBAC-27B225EEB951}"/>
+                <a16:creationId xmlns:a16="http://schemas.microsoft.com/office/drawing/2014/main" id="{77CACF22-967B-4784-8037-504B8ED7620C}"/>
               </a:ext>
             </a:extLst>
           </p:cNvPr>
@@ -4726,7 +4972,7 @@
           <p:cNvPr id="6" name="Footer Placeholder 5">
             <a:extLst>
               <a:ext uri="{FF2B5EF4-FFF2-40B4-BE49-F238E27FC236}">
-                <a16:creationId xmlns:a16="http://schemas.microsoft.com/office/drawing/2014/main" id="{4C46C872-878D-44D3-9B31-A89880F99CB8}"/>
+                <a16:creationId xmlns:a16="http://schemas.microsoft.com/office/drawing/2014/main" id="{7DB55F2D-4E18-4408-ACB8-897EF5DE629C}"/>
               </a:ext>
             </a:extLst>
           </p:cNvPr>
@@ -4752,7 +4998,7 @@
           <p:cNvPr id="7" name="Slide Number Placeholder 6">
             <a:extLst>
               <a:ext uri="{FF2B5EF4-FFF2-40B4-BE49-F238E27FC236}">
-                <a16:creationId xmlns:a16="http://schemas.microsoft.com/office/drawing/2014/main" id="{CC3B6293-BD1C-4151-AFCD-C59AC57150A3}"/>
+                <a16:creationId xmlns:a16="http://schemas.microsoft.com/office/drawing/2014/main" id="{DD0DD16A-9558-4BC7-BC48-AC6965A12B9F}"/>
               </a:ext>
             </a:extLst>
           </p:cNvPr>
@@ -4769,7 +5015,7 @@
           <a:lstStyle/>
           <a:p>
             <a:pPr lvl="0"/>
-            <a:fld id="{8A90FF46-AC87-4976-8EEA-5CD7B0F6DABD}" type="slidenum">
+            <a:fld id="{6D31EF72-408B-4FD1-BB2D-15D3C30E222D}" type="slidenum">
               <a:t>‹#›</a:t>
             </a:fld>
             <a:endParaRPr lang="en-IN"/>
@@ -4779,7 +5025,7 @@
     </p:spTree>
     <p:extLst>
       <p:ext uri="{BB962C8B-B14F-4D97-AF65-F5344CB8AC3E}">
-        <p14:creationId xmlns:p14="http://schemas.microsoft.com/office/powerpoint/2010/main" val="593680036"/>
+        <p14:creationId xmlns:p14="http://schemas.microsoft.com/office/powerpoint/2010/main" val="3447914017"/>
       </p:ext>
     </p:extLst>
   </p:cSld>
@@ -4817,7 +5063,7 @@
           <p:cNvPr id="2" name="Title Placeholder 1">
             <a:extLst>
               <a:ext uri="{FF2B5EF4-FFF2-40B4-BE49-F238E27FC236}">
-                <a16:creationId xmlns:a16="http://schemas.microsoft.com/office/drawing/2014/main" id="{2A5744DF-FAA5-41A3-8C60-DC83615A31C7}"/>
+                <a16:creationId xmlns:a16="http://schemas.microsoft.com/office/drawing/2014/main" id="{FFC22BFF-1A6A-4DBA-86F6-D504D6AF1D91}"/>
               </a:ext>
             </a:extLst>
           </p:cNvPr>
@@ -4854,7 +5100,7 @@
           <p:cNvPr id="3" name="Text Placeholder 2">
             <a:extLst>
               <a:ext uri="{FF2B5EF4-FFF2-40B4-BE49-F238E27FC236}">
-                <a16:creationId xmlns:a16="http://schemas.microsoft.com/office/drawing/2014/main" id="{34AF3F72-02BB-4A81-B74F-FA59B40C6B51}"/>
+                <a16:creationId xmlns:a16="http://schemas.microsoft.com/office/drawing/2014/main" id="{1AC2902A-2A38-40F8-B7FE-212A02D8BA8C}"/>
               </a:ext>
             </a:extLst>
           </p:cNvPr>
@@ -4926,7 +5172,7 @@
           <p:cNvPr id="4" name="Date Placeholder 3">
             <a:extLst>
               <a:ext uri="{FF2B5EF4-FFF2-40B4-BE49-F238E27FC236}">
-                <a16:creationId xmlns:a16="http://schemas.microsoft.com/office/drawing/2014/main" id="{6CBF2127-198A-45A5-AAF0-9F06BDF374C4}"/>
+                <a16:creationId xmlns:a16="http://schemas.microsoft.com/office/drawing/2014/main" id="{D8DF1635-9AD7-4334-AAC1-D7EAC745A1FC}"/>
               </a:ext>
             </a:extLst>
           </p:cNvPr>
@@ -4976,7 +5222,7 @@
           <p:cNvPr id="5" name="Footer Placeholder 4">
             <a:extLst>
               <a:ext uri="{FF2B5EF4-FFF2-40B4-BE49-F238E27FC236}">
-                <a16:creationId xmlns:a16="http://schemas.microsoft.com/office/drawing/2014/main" id="{AAAAEBBC-7347-45F2-B42A-BB2E14EC0E13}"/>
+                <a16:creationId xmlns:a16="http://schemas.microsoft.com/office/drawing/2014/main" id="{87C8CF2B-E19D-450A-B3EC-81A2B9E1EF5E}"/>
               </a:ext>
             </a:extLst>
           </p:cNvPr>
@@ -5026,7 +5272,7 @@
           <p:cNvPr id="6" name="Slide Number Placeholder 5">
             <a:extLst>
               <a:ext uri="{FF2B5EF4-FFF2-40B4-BE49-F238E27FC236}">
-                <a16:creationId xmlns:a16="http://schemas.microsoft.com/office/drawing/2014/main" id="{770ECDAA-561F-43EF-AD33-33B29D7C328F}"/>
+                <a16:creationId xmlns:a16="http://schemas.microsoft.com/office/drawing/2014/main" id="{BCDCF66A-69A2-44C7-ACBB-D65F349BF363}"/>
               </a:ext>
             </a:extLst>
           </p:cNvPr>
@@ -5067,7 +5313,7 @@
           </a:lstStyle>
           <a:p>
             <a:pPr lvl="0"/>
-            <a:fld id="{2CC66FD9-E200-408C-AC0B-9913A1991CE6}" type="slidenum">
+            <a:fld id="{B072048E-B921-41F9-85B2-0D354C304EDA}" type="slidenum">
               <a:t>‹#›</a:t>
             </a:fld>
             <a:endParaRPr lang="en-IN"/>
@@ -5092,7 +5338,7 @@
   </p:sldLayoutIdLst>
   <p:txStyles>
     <p:titleStyle>
-      <a:lvl1pPr algn="ctr" rtl="0" hangingPunct="0">
+      <a:lvl1pPr algn="ctr" hangingPunct="0">
         <a:tabLst/>
         <a:defRPr lang="en-IN" sz="4400" b="0" i="0" u="none" strike="noStrike" kern="1200" cap="none">
           <a:ln>
@@ -5108,7 +5354,7 @@
       </a:lvl1pPr>
     </p:titleStyle>
     <p:bodyStyle>
-      <a:lvl1pPr rtl="0" hangingPunct="0">
+      <a:lvl1pPr hangingPunct="0">
         <a:spcBef>
           <a:spcPts val="1417"/>
         </a:spcBef>
@@ -5394,7 +5640,7 @@
           <p:cNvPr id="2" name="Title 1">
             <a:extLst>
               <a:ext uri="{FF2B5EF4-FFF2-40B4-BE49-F238E27FC236}">
-                <a16:creationId xmlns:a16="http://schemas.microsoft.com/office/drawing/2014/main" id="{990556F9-925F-445A-9950-F787477C5390}"/>
+                <a16:creationId xmlns:a16="http://schemas.microsoft.com/office/drawing/2014/main" id="{11A50A8A-93D1-4616-A3F6-36F63DB8AC81}"/>
               </a:ext>
             </a:extLst>
           </p:cNvPr>
@@ -5417,7 +5663,7 @@
           </a:bodyPr>
           <a:lstStyle/>
           <a:p>
-            <a:pPr lvl="0"/>
+            <a:pPr lvl="0" rtl="0"/>
             <a:r>
               <a:rPr lang="en-IN" sz="3200" b="1">
                 <a:latin typeface="Times New Roman Cyr" pitchFamily="18"/>
@@ -5432,7 +5678,7 @@
           <p:cNvPr id="3" name="Text Placeholder 2">
             <a:extLst>
               <a:ext uri="{FF2B5EF4-FFF2-40B4-BE49-F238E27FC236}">
-                <a16:creationId xmlns:a16="http://schemas.microsoft.com/office/drawing/2014/main" id="{EBC04029-1744-4A31-A0F2-7684E81AA6E6}"/>
+                <a16:creationId xmlns:a16="http://schemas.microsoft.com/office/drawing/2014/main" id="{84BC7D17-5301-48CC-AF4B-7AF87E446985}"/>
               </a:ext>
             </a:extLst>
           </p:cNvPr>
@@ -5453,7 +5699,7 @@
           <a:bodyPr vert="horz"/>
           <a:lstStyle/>
           <a:p>
-            <a:pPr lvl="0"/>
+            <a:pPr lvl="0" rtl="0"/>
             <a:r>
               <a:rPr lang="en-IN" sz="2000" b="1" u="sng">
                 <a:latin typeface="Times New Roman Cyr" pitchFamily="18"/>
@@ -5462,7 +5708,7 @@
             </a:r>
           </a:p>
           <a:p>
-            <a:pPr lvl="0"/>
+            <a:pPr lvl="0" rtl="0"/>
             <a:r>
               <a:rPr lang="en-IN" sz="1400">
                 <a:latin typeface="Times New Roman Cyr" pitchFamily="18"/>
@@ -5471,7 +5717,7 @@
             </a:r>
           </a:p>
           <a:p>
-            <a:pPr lvl="0"/>
+            <a:pPr lvl="0" rtl="0"/>
             <a:r>
               <a:rPr lang="en-IN" sz="1400">
                 <a:latin typeface="Times New Roman Cyr" pitchFamily="18"/>
@@ -5480,7 +5726,7 @@
             </a:r>
           </a:p>
           <a:p>
-            <a:pPr lvl="0"/>
+            <a:pPr lvl="0" rtl="0"/>
             <a:r>
               <a:rPr lang="en-IN" sz="1400">
                 <a:latin typeface="Times New Roman Cyr" pitchFamily="18"/>
@@ -5495,7 +5741,7 @@
           <p:cNvPr id="4" name="Text Placeholder 3">
             <a:extLst>
               <a:ext uri="{FF2B5EF4-FFF2-40B4-BE49-F238E27FC236}">
-                <a16:creationId xmlns:a16="http://schemas.microsoft.com/office/drawing/2014/main" id="{658879AE-1687-4936-ACFF-2186F25128B2}"/>
+                <a16:creationId xmlns:a16="http://schemas.microsoft.com/office/drawing/2014/main" id="{EFDAF251-6E79-4AD6-A9A2-8FE0C05AE13D}"/>
               </a:ext>
             </a:extLst>
           </p:cNvPr>
@@ -5516,7 +5762,7 @@
           <a:bodyPr vert="horz"/>
           <a:lstStyle/>
           <a:p>
-            <a:pPr lvl="0"/>
+            <a:pPr lvl="0" rtl="0"/>
             <a:r>
               <a:rPr lang="en-IN" sz="2000" b="1" u="sng">
                 <a:latin typeface="Times New Roman Cyr" pitchFamily="18"/>
@@ -5525,7 +5771,7 @@
             </a:r>
           </a:p>
           <a:p>
-            <a:pPr lvl="0"/>
+            <a:pPr lvl="0" rtl="0"/>
             <a:r>
               <a:rPr lang="en-IN" sz="1400">
                 <a:latin typeface="Times New Roman Cyr" pitchFamily="18"/>
@@ -5534,7 +5780,7 @@
             </a:r>
           </a:p>
           <a:p>
-            <a:pPr lvl="0"/>
+            <a:pPr lvl="0" rtl="0"/>
             <a:r>
               <a:rPr lang="en-IN" sz="1400">
                 <a:latin typeface="Times New Roman Cyr" pitchFamily="18"/>
@@ -5543,7 +5789,7 @@
             </a:r>
           </a:p>
           <a:p>
-            <a:pPr lvl="0"/>
+            <a:pPr lvl="0" rtl="0"/>
             <a:r>
               <a:rPr lang="en-IN" sz="1400">
                 <a:latin typeface="Times New Roman Cyr" pitchFamily="18"/>
@@ -5552,7 +5798,7 @@
             </a:r>
           </a:p>
           <a:p>
-            <a:pPr lvl="0"/>
+            <a:pPr lvl="0" rtl="0"/>
             <a:r>
               <a:rPr lang="en-IN" sz="1400">
                 <a:latin typeface="Times New Roman Cyr" pitchFamily="18"/>
@@ -5592,7 +5838,7 @@
           <p:cNvPr id="2" name="TextBox 1">
             <a:extLst>
               <a:ext uri="{FF2B5EF4-FFF2-40B4-BE49-F238E27FC236}">
-                <a16:creationId xmlns:a16="http://schemas.microsoft.com/office/drawing/2014/main" id="{C9055090-46C1-494D-9DC1-0732BD2CDC6C}"/>
+                <a16:creationId xmlns:a16="http://schemas.microsoft.com/office/drawing/2014/main" id="{1B5495A6-B0CE-4EF9-8ED4-8DFA6014E921}"/>
               </a:ext>
             </a:extLst>
           </p:cNvPr>
@@ -5601,8 +5847,8 @@
         </p:nvSpPr>
         <p:spPr>
           <a:xfrm>
-            <a:off x="360000" y="360000"/>
-            <a:ext cx="2861280" cy="447120"/>
+            <a:off x="324000" y="360000"/>
+            <a:ext cx="2827800" cy="447120"/>
           </a:xfrm>
           <a:prstGeom prst="rect">
             <a:avLst/>
@@ -5623,7 +5869,7 @@
                 <a:spcPct val="100000"/>
               </a:lnSpc>
               <a:spcBef>
-                <a:spcPts val="0"/>
+                <a:spcPts val="1417"/>
               </a:spcBef>
               <a:spcAft>
                 <a:spcPts val="0"/>
@@ -5637,11 +5883,11 @@
                   <a:noFill/>
                 </a:ln>
                 <a:uFillTx/>
-                <a:latin typeface="OPTITimes-Roman" pitchFamily="18"/>
+                <a:latin typeface="Times New Roman" pitchFamily="18"/>
                 <a:ea typeface="DejaVu Sans" pitchFamily="2"/>
                 <a:cs typeface="FreeSans" pitchFamily="2"/>
               </a:rPr>
-              <a:t>PROPOSED  SYSTEM</a:t>
+              <a:t>EXISTING SYSTEMS</a:t>
             </a:r>
           </a:p>
         </p:txBody>
@@ -5651,7 +5897,7 @@
           <p:cNvPr id="3" name="TextBox 2">
             <a:extLst>
               <a:ext uri="{FF2B5EF4-FFF2-40B4-BE49-F238E27FC236}">
-                <a16:creationId xmlns:a16="http://schemas.microsoft.com/office/drawing/2014/main" id="{2E952780-235C-4B70-BE78-D527D6AF11AB}"/>
+                <a16:creationId xmlns:a16="http://schemas.microsoft.com/office/drawing/2014/main" id="{0F98A399-9450-4FBC-A8FD-4A923C92DD6E}"/>
               </a:ext>
             </a:extLst>
           </p:cNvPr>
@@ -5660,8 +5906,8 @@
         </p:nvSpPr>
         <p:spPr>
           <a:xfrm>
-            <a:off x="540000" y="900000"/>
-            <a:ext cx="1715400" cy="410400"/>
+            <a:off x="396720" y="913679"/>
+            <a:ext cx="2081160" cy="375480"/>
           </a:xfrm>
           <a:prstGeom prst="rect">
             <a:avLst/>
@@ -5691,15 +5937,15 @@
               <a:tabLst/>
             </a:pPr>
             <a:r>
-              <a:rPr lang="en-IN" sz="1800" b="1" i="0" u="none" strike="noStrike" kern="1200" cap="none">
+              <a:rPr lang="en-IN" sz="2000" b="1" i="0" u="none" strike="noStrike" kern="1200" cap="none">
                 <a:ln>
                   <a:noFill/>
                 </a:ln>
-                <a:latin typeface="OPTITimes-Roman" pitchFamily="18"/>
+                <a:latin typeface="Times New Roman Cyr" pitchFamily="18"/>
                 <a:ea typeface="DejaVu Sans" pitchFamily="2"/>
                 <a:cs typeface="FreeSans" pitchFamily="2"/>
               </a:rPr>
-              <a:t>CYBERWALL</a:t>
+              <a:t>CYBER B.A.A.P</a:t>
             </a:r>
           </a:p>
         </p:txBody>
@@ -5709,7 +5955,7 @@
           <p:cNvPr id="4" name="TextBox 3">
             <a:extLst>
               <a:ext uri="{FF2B5EF4-FFF2-40B4-BE49-F238E27FC236}">
-                <a16:creationId xmlns:a16="http://schemas.microsoft.com/office/drawing/2014/main" id="{5AB150DB-332B-42AD-A2EA-D97ADCC2B0F0}"/>
+                <a16:creationId xmlns:a16="http://schemas.microsoft.com/office/drawing/2014/main" id="{6CDA58C1-4595-4294-89C4-3BC30B7A3026}"/>
               </a:ext>
             </a:extLst>
           </p:cNvPr>
@@ -5718,8 +5964,8 @@
         </p:nvSpPr>
         <p:spPr>
           <a:xfrm>
-            <a:off x="180000" y="1440000"/>
-            <a:ext cx="9180000" cy="3780000"/>
+            <a:off x="360000" y="1440000"/>
+            <a:ext cx="9660960" cy="3673800"/>
           </a:xfrm>
           <a:prstGeom prst="rect">
             <a:avLst/>
@@ -5759,7 +6005,35 @@
                 <a:ea typeface="DejaVu Sans" pitchFamily="2"/>
                 <a:cs typeface="FreeSans" pitchFamily="2"/>
               </a:rPr>
-              <a:t>CyberWALL presents the development of an innovative mobile application that leverages artificial intelligence(AI) for detecting and mitigating cyberbullying incidents while providing mental health support to victims.</a:t>
+              <a:t>CyberB.A.A.P(Cyber Bullying Awareness,Action, and Prevention) is an initiative by the Nirali</a:t>
+            </a:r>
+          </a:p>
+          <a:p>
+            <a:pPr marL="0" marR="0" lvl="0" indent="0" rtl="0" hangingPunct="0">
+              <a:lnSpc>
+                <a:spcPct val="100000"/>
+              </a:lnSpc>
+              <a:spcBef>
+                <a:spcPts val="0"/>
+              </a:spcBef>
+              <a:spcAft>
+                <a:spcPts val="0"/>
+              </a:spcAft>
+              <a:buSzPct val="45000"/>
+              <a:buFont typeface="StarSymbol"/>
+              <a:buChar char="●"/>
+              <a:tabLst/>
+            </a:pPr>
+            <a:r>
+              <a:rPr lang="en-IN" sz="1800" b="0" i="0" u="none" strike="noStrike" kern="1200" cap="none">
+                <a:ln>
+                  <a:noFill/>
+                </a:ln>
+                <a:latin typeface="Times New Roman Cyr" pitchFamily="18"/>
+                <a:ea typeface="DejaVu Sans" pitchFamily="2"/>
+                <a:cs typeface="FreeSans" pitchFamily="2"/>
+              </a:rPr>
+              <a:t>Bhatia Cyber wellness foundation.</a:t>
             </a:r>
           </a:p>
           <a:p>
@@ -5812,7 +6086,7 @@
                 <a:ea typeface="DejaVu Sans" pitchFamily="2"/>
                 <a:cs typeface="FreeSans" pitchFamily="2"/>
               </a:rPr>
-              <a:t>It sends instant notification to users when potential cyberbullying is detected enabling immediate action such as blocking offenders or reporting incidents.</a:t>
+              <a:t>It is a comprehensive program to combat the growing menace of cyberbullying.</a:t>
             </a:r>
           </a:p>
           <a:p>
@@ -5865,7 +6139,35 @@
                 <a:ea typeface="DejaVu Sans" pitchFamily="2"/>
                 <a:cs typeface="FreeSans" pitchFamily="2"/>
               </a:rPr>
-              <a:t>Provides a secure, anonymous reporting system, ensuring victims can safely report incidents without revealing their identity, thus promoting a safer digital environment.</a:t>
+              <a:t>CyberB.A.A.P aims to create awareness, provide support and enable prevention strategies</a:t>
+            </a:r>
+          </a:p>
+          <a:p>
+            <a:pPr marL="0" marR="0" lvl="0" indent="0" rtl="0" hangingPunct="0">
+              <a:lnSpc>
+                <a:spcPct val="100000"/>
+              </a:lnSpc>
+              <a:spcBef>
+                <a:spcPts val="0"/>
+              </a:spcBef>
+              <a:spcAft>
+                <a:spcPts val="0"/>
+              </a:spcAft>
+              <a:buSzPct val="45000"/>
+              <a:buFont typeface="StarSymbol"/>
+              <a:buChar char="●"/>
+              <a:tabLst/>
+            </a:pPr>
+            <a:r>
+              <a:rPr lang="en-IN" sz="1800" b="0" i="0" u="none" strike="noStrike" kern="1200" cap="none">
+                <a:ln>
+                  <a:noFill/>
+                </a:ln>
+                <a:latin typeface="Times New Roman Cyr" pitchFamily="18"/>
+                <a:ea typeface="DejaVu Sans" pitchFamily="2"/>
+                <a:cs typeface="FreeSans" pitchFamily="2"/>
+              </a:rPr>
+              <a:t>for individuals affected by cyberbullying.</a:t>
             </a:r>
           </a:p>
           <a:p>
@@ -5918,7 +6220,144 @@
                 <a:ea typeface="DejaVu Sans" pitchFamily="2"/>
                 <a:cs typeface="FreeSans" pitchFamily="2"/>
               </a:rPr>
-              <a:t>Ensures end-to-end encryption and robust data protection, maintaining user confedentiality while offering effective solutions for online safety.</a:t>
+              <a:t>Its mission is to empower people with the knowledge and tools to foster a safer online</a:t>
+            </a:r>
+          </a:p>
+          <a:p>
+            <a:pPr marL="0" marR="0" lvl="0" indent="0" rtl="0" hangingPunct="0">
+              <a:lnSpc>
+                <a:spcPct val="100000"/>
+              </a:lnSpc>
+              <a:spcBef>
+                <a:spcPts val="0"/>
+              </a:spcBef>
+              <a:spcAft>
+                <a:spcPts val="0"/>
+              </a:spcAft>
+              <a:buSzPct val="45000"/>
+              <a:buFont typeface="StarSymbol"/>
+              <a:buChar char="●"/>
+              <a:tabLst/>
+            </a:pPr>
+            <a:r>
+              <a:rPr lang="en-IN" sz="1800" b="0" i="0" u="none" strike="noStrike" kern="1200" cap="none">
+                <a:ln>
+                  <a:noFill/>
+                </a:ln>
+                <a:latin typeface="Times New Roman Cyr" pitchFamily="18"/>
+                <a:ea typeface="DejaVu Sans" pitchFamily="2"/>
+                <a:cs typeface="FreeSans" pitchFamily="2"/>
+              </a:rPr>
+              <a:t>enviornment.</a:t>
+            </a:r>
+          </a:p>
+          <a:p>
+            <a:pPr marL="0" marR="0" lvl="0" indent="0" rtl="0" hangingPunct="0">
+              <a:lnSpc>
+                <a:spcPct val="100000"/>
+              </a:lnSpc>
+              <a:spcBef>
+                <a:spcPts val="0"/>
+              </a:spcBef>
+              <a:spcAft>
+                <a:spcPts val="0"/>
+              </a:spcAft>
+              <a:buSzPct val="45000"/>
+              <a:buFont typeface="StarSymbol"/>
+              <a:buChar char="●"/>
+              <a:tabLst/>
+            </a:pPr>
+            <a:endParaRPr lang="en-IN" sz="1800" b="0" i="0" u="none" strike="noStrike" kern="1200" cap="none">
+              <a:ln>
+                <a:noFill/>
+              </a:ln>
+              <a:latin typeface="Times New Roman Cyr" pitchFamily="18"/>
+              <a:ea typeface="DejaVu Sans" pitchFamily="2"/>
+              <a:cs typeface="FreeSans" pitchFamily="2"/>
+            </a:endParaRPr>
+          </a:p>
+          <a:p>
+            <a:pPr marL="0" marR="0" lvl="0" indent="0" rtl="0" hangingPunct="0">
+              <a:lnSpc>
+                <a:spcPct val="100000"/>
+              </a:lnSpc>
+              <a:spcBef>
+                <a:spcPts val="0"/>
+              </a:spcBef>
+              <a:spcAft>
+                <a:spcPts val="0"/>
+              </a:spcAft>
+              <a:buSzPct val="45000"/>
+              <a:buFont typeface="StarSymbol"/>
+              <a:buChar char="●"/>
+              <a:tabLst/>
+            </a:pPr>
+            <a:r>
+              <a:rPr lang="en-IN" sz="1800" b="0" i="0" u="none" strike="noStrike" kern="1200" cap="none">
+                <a:ln>
+                  <a:noFill/>
+                </a:ln>
+                <a:latin typeface="Times New Roman Cyr" pitchFamily="18"/>
+                <a:ea typeface="DejaVu Sans" pitchFamily="2"/>
+                <a:cs typeface="FreeSans" pitchFamily="2"/>
+              </a:rPr>
+              <a:t>The initiative addresses cyberbullying through various services including professional</a:t>
+            </a:r>
+          </a:p>
+          <a:p>
+            <a:pPr marL="0" marR="0" lvl="0" indent="0" rtl="0" hangingPunct="0">
+              <a:lnSpc>
+                <a:spcPct val="100000"/>
+              </a:lnSpc>
+              <a:spcBef>
+                <a:spcPts val="0"/>
+              </a:spcBef>
+              <a:spcAft>
+                <a:spcPts val="0"/>
+              </a:spcAft>
+              <a:buSzPct val="45000"/>
+              <a:buFont typeface="StarSymbol"/>
+              <a:buChar char="●"/>
+              <a:tabLst/>
+            </a:pPr>
+            <a:r>
+              <a:rPr lang="en-IN" sz="1800" b="0" i="0" u="none" strike="noStrike" kern="1200" cap="none">
+                <a:ln>
+                  <a:noFill/>
+                </a:ln>
+                <a:latin typeface="Times New Roman Cyr" pitchFamily="18"/>
+                <a:ea typeface="DejaVu Sans" pitchFamily="2"/>
+                <a:cs typeface="FreeSans" pitchFamily="2"/>
+              </a:rPr>
+              <a:t> counseling for victims, training programs on digital safety and resources for parents,</a:t>
+            </a:r>
+          </a:p>
+          <a:p>
+            <a:pPr marL="0" marR="0" lvl="0" indent="0" rtl="0" hangingPunct="0">
+              <a:lnSpc>
+                <a:spcPct val="100000"/>
+              </a:lnSpc>
+              <a:spcBef>
+                <a:spcPts val="0"/>
+              </a:spcBef>
+              <a:spcAft>
+                <a:spcPts val="0"/>
+              </a:spcAft>
+              <a:buSzPct val="45000"/>
+              <a:buFont typeface="StarSymbol"/>
+              <a:buChar char="●"/>
+              <a:tabLst/>
+            </a:pPr>
+            <a:r>
+              <a:rPr lang="en-IN" sz="1800" b="0" i="0" u="none" strike="noStrike" kern="1200" cap="none">
+                <a:ln>
+                  <a:noFill/>
+                </a:ln>
+                <a:latin typeface="Times New Roman Cyr" pitchFamily="18"/>
+                <a:ea typeface="DejaVu Sans" pitchFamily="2"/>
+                <a:cs typeface="FreeSans" pitchFamily="2"/>
+              </a:rPr>
+              <a:t> educators and students.</a:t>
             </a:r>
           </a:p>
         </p:txBody>
@@ -5953,7 +6392,7 @@
           <p:cNvPr id="2" name="TextBox 1">
             <a:extLst>
               <a:ext uri="{FF2B5EF4-FFF2-40B4-BE49-F238E27FC236}">
-                <a16:creationId xmlns:a16="http://schemas.microsoft.com/office/drawing/2014/main" id="{2B88DBEE-FABF-4DAA-A25C-11C30EB58956}"/>
+                <a16:creationId xmlns:a16="http://schemas.microsoft.com/office/drawing/2014/main" id="{89222A13-DFF0-440D-A281-C1AB5A66CC90}"/>
               </a:ext>
             </a:extLst>
           </p:cNvPr>
@@ -5962,8 +6401,8 @@
         </p:nvSpPr>
         <p:spPr>
           <a:xfrm>
-            <a:off x="521280" y="360000"/>
-            <a:ext cx="2107080" cy="447120"/>
+            <a:off x="540000" y="360000"/>
+            <a:ext cx="2571839" cy="282240"/>
           </a:xfrm>
           <a:prstGeom prst="rect">
             <a:avLst/>
@@ -5974,7 +6413,7 @@
           </a:ln>
         </p:spPr>
         <p:txBody>
-          <a:bodyPr vert="horz" wrap="square" lIns="90000" tIns="45000" rIns="90000" bIns="45000" anchorCtr="0" compatLnSpc="0">
+          <a:bodyPr vert="horz" wrap="none" lIns="0" tIns="0" rIns="0" bIns="0" anchorCtr="0" compatLnSpc="0">
             <a:spAutoFit/>
           </a:bodyPr>
           <a:lstStyle/>
@@ -5984,13 +6423,18 @@
                 <a:spcPct val="100000"/>
               </a:lnSpc>
               <a:spcBef>
-                <a:spcPts val="0"/>
+                <a:spcPts val="1417"/>
               </a:spcBef>
               <a:spcAft>
                 <a:spcPts val="0"/>
               </a:spcAft>
               <a:buNone/>
               <a:tabLst/>
+              <a:defRPr sz="2000" b="1" u="sng" kern="1200">
+                <a:uFillTx/>
+                <a:latin typeface="Times New Roman" pitchFamily="18"/>
+                <a:cs typeface="FreeSans" pitchFamily="2"/>
+              </a:defRPr>
             </a:pPr>
             <a:r>
               <a:rPr lang="en-IN" sz="2000" b="1" i="0" u="sng" strike="noStrike" kern="1200" cap="none">
@@ -5998,11 +6442,11 @@
                   <a:noFill/>
                 </a:ln>
                 <a:uFillTx/>
-                <a:latin typeface="OPTITimes-Roman" pitchFamily="18"/>
+                <a:latin typeface="Times New Roman" pitchFamily="18"/>
                 <a:ea typeface="DejaVu Sans" pitchFamily="2"/>
                 <a:cs typeface="FreeSans" pitchFamily="2"/>
               </a:rPr>
-              <a:t>ADVANTAGES</a:t>
+              <a:t>DISADVANTAGES</a:t>
             </a:r>
           </a:p>
         </p:txBody>
@@ -6012,7 +6456,7 @@
           <p:cNvPr id="3" name="TextBox 2">
             <a:extLst>
               <a:ext uri="{FF2B5EF4-FFF2-40B4-BE49-F238E27FC236}">
-                <a16:creationId xmlns:a16="http://schemas.microsoft.com/office/drawing/2014/main" id="{3A4CAEB3-E653-4252-87DD-3174C2E934E7}"/>
+                <a16:creationId xmlns:a16="http://schemas.microsoft.com/office/drawing/2014/main" id="{30EA6483-967B-47D7-A49C-DFF534063E81}"/>
               </a:ext>
             </a:extLst>
           </p:cNvPr>
@@ -6021,8 +6465,8 @@
         </p:nvSpPr>
         <p:spPr>
           <a:xfrm>
-            <a:off x="540000" y="1260000"/>
-            <a:ext cx="6120000" cy="3060000"/>
+            <a:off x="540000" y="1080000"/>
+            <a:ext cx="9000000" cy="4140000"/>
           </a:xfrm>
           <a:prstGeom prst="rect">
             <a:avLst/>
@@ -6052,17 +6496,20 @@
               <a:buFont typeface="StarSymbol"/>
               <a:buChar char="●"/>
               <a:tabLst/>
+              <a:defRPr sz="1800">
+                <a:latin typeface="Times New Roman" pitchFamily="18"/>
+              </a:defRPr>
             </a:pPr>
             <a:r>
               <a:rPr lang="en-IN" sz="1800" b="0" i="0" u="none" strike="noStrike" kern="1200" cap="none">
                 <a:ln>
                   <a:noFill/>
                 </a:ln>
-                <a:latin typeface="Times New Roman Cyr" pitchFamily="18"/>
+                <a:latin typeface="Times New Roman" pitchFamily="18"/>
                 <a:ea typeface="DejaVu Sans" pitchFamily="2"/>
                 <a:cs typeface="FreeSans" pitchFamily="2"/>
               </a:rPr>
-              <a:t>Wider reach and awareness</a:t>
+              <a:t>Dependency on user initiative</a:t>
             </a:r>
           </a:p>
           <a:p>
@@ -6080,12 +6527,15 @@
               <a:buFont typeface="StarSymbol"/>
               <a:buChar char="●"/>
               <a:tabLst/>
+              <a:defRPr sz="1800">
+                <a:latin typeface="Times New Roman" pitchFamily="18"/>
+              </a:defRPr>
             </a:pPr>
             <a:endParaRPr lang="en-IN" sz="1800" b="0" i="0" u="none" strike="noStrike" kern="1200" cap="none">
               <a:ln>
                 <a:noFill/>
               </a:ln>
-              <a:latin typeface="Times New Roman Cyr" pitchFamily="18"/>
+              <a:latin typeface="Times New Roman" pitchFamily="18"/>
               <a:ea typeface="DejaVu Sans" pitchFamily="2"/>
               <a:cs typeface="FreeSans" pitchFamily="2"/>
             </a:endParaRPr>
@@ -6105,17 +6555,20 @@
               <a:buFont typeface="StarSymbol"/>
               <a:buChar char="●"/>
               <a:tabLst/>
+              <a:defRPr sz="1800">
+                <a:latin typeface="Times New Roman" pitchFamily="18"/>
+              </a:defRPr>
             </a:pPr>
             <a:r>
               <a:rPr lang="en-IN" sz="1800" b="0" i="0" u="none" strike="noStrike" kern="1200" cap="none">
                 <a:ln>
                   <a:noFill/>
                 </a:ln>
-                <a:latin typeface="Times New Roman Cyr" pitchFamily="18"/>
+                <a:latin typeface="Times New Roman" pitchFamily="18"/>
                 <a:ea typeface="DejaVu Sans" pitchFamily="2"/>
                 <a:cs typeface="FreeSans" pitchFamily="2"/>
               </a:rPr>
-              <a:t>Scalability and Resource management</a:t>
+              <a:t>Reactive approaches</a:t>
             </a:r>
           </a:p>
           <a:p>
@@ -6133,12 +6586,15 @@
               <a:buFont typeface="StarSymbol"/>
               <a:buChar char="●"/>
               <a:tabLst/>
+              <a:defRPr sz="1800">
+                <a:latin typeface="Times New Roman" pitchFamily="18"/>
+              </a:defRPr>
             </a:pPr>
             <a:endParaRPr lang="en-IN" sz="1800" b="0" i="0" u="none" strike="noStrike" kern="1200" cap="none">
               <a:ln>
                 <a:noFill/>
               </a:ln>
-              <a:latin typeface="Times New Roman Cyr" pitchFamily="18"/>
+              <a:latin typeface="Times New Roman" pitchFamily="18"/>
               <a:ea typeface="DejaVu Sans" pitchFamily="2"/>
               <a:cs typeface="FreeSans" pitchFamily="2"/>
             </a:endParaRPr>
@@ -6158,123 +6614,20 @@
               <a:buFont typeface="StarSymbol"/>
               <a:buChar char="●"/>
               <a:tabLst/>
+              <a:defRPr sz="1800">
+                <a:latin typeface="Times New Roman" pitchFamily="18"/>
+              </a:defRPr>
             </a:pPr>
             <a:r>
               <a:rPr lang="en-IN" sz="1800" b="0" i="0" u="none" strike="noStrike" kern="1200" cap="none">
                 <a:ln>
                   <a:noFill/>
                 </a:ln>
-                <a:latin typeface="Times New Roman Cyr" pitchFamily="18"/>
+                <a:latin typeface="Times New Roman" pitchFamily="18"/>
                 <a:ea typeface="DejaVu Sans" pitchFamily="2"/>
                 <a:cs typeface="FreeSans" pitchFamily="2"/>
               </a:rPr>
-              <a:t>Increased Accessability</a:t>
-            </a:r>
-          </a:p>
-          <a:p>
-            <a:pPr marL="0" marR="0" lvl="0" indent="0" rtl="0" hangingPunct="0">
-              <a:lnSpc>
-                <a:spcPct val="100000"/>
-              </a:lnSpc>
-              <a:spcBef>
-                <a:spcPts val="0"/>
-              </a:spcBef>
-              <a:spcAft>
-                <a:spcPts val="0"/>
-              </a:spcAft>
-              <a:buSzPct val="45000"/>
-              <a:buFont typeface="StarSymbol"/>
-              <a:buChar char="●"/>
-              <a:tabLst/>
-            </a:pPr>
-            <a:endParaRPr lang="en-IN" sz="1800" b="0" i="0" u="none" strike="noStrike" kern="1200" cap="none">
-              <a:ln>
-                <a:noFill/>
-              </a:ln>
-              <a:latin typeface="Times New Roman Cyr" pitchFamily="18"/>
-              <a:ea typeface="DejaVu Sans" pitchFamily="2"/>
-              <a:cs typeface="FreeSans" pitchFamily="2"/>
-            </a:endParaRPr>
-          </a:p>
-          <a:p>
-            <a:pPr marL="0" marR="0" lvl="0" indent="0" rtl="0" hangingPunct="0">
-              <a:lnSpc>
-                <a:spcPct val="100000"/>
-              </a:lnSpc>
-              <a:spcBef>
-                <a:spcPts val="0"/>
-              </a:spcBef>
-              <a:spcAft>
-                <a:spcPts val="0"/>
-              </a:spcAft>
-              <a:buSzPct val="45000"/>
-              <a:buFont typeface="StarSymbol"/>
-              <a:buChar char="●"/>
-              <a:tabLst/>
-            </a:pPr>
-            <a:r>
-              <a:rPr lang="en-IN" sz="1800" b="0" i="0" u="none" strike="noStrike" kern="1200" cap="none">
-                <a:ln>
-                  <a:noFill/>
-                </a:ln>
-                <a:latin typeface="Times New Roman Cyr" pitchFamily="18"/>
-                <a:ea typeface="DejaVu Sans" pitchFamily="2"/>
-                <a:cs typeface="FreeSans" pitchFamily="2"/>
-              </a:rPr>
-              <a:t>Simplified reporting process</a:t>
-            </a:r>
-          </a:p>
-          <a:p>
-            <a:pPr marL="0" marR="0" lvl="0" indent="0" rtl="0" hangingPunct="0">
-              <a:lnSpc>
-                <a:spcPct val="100000"/>
-              </a:lnSpc>
-              <a:spcBef>
-                <a:spcPts val="0"/>
-              </a:spcBef>
-              <a:spcAft>
-                <a:spcPts val="0"/>
-              </a:spcAft>
-              <a:buSzPct val="45000"/>
-              <a:buFont typeface="StarSymbol"/>
-              <a:buChar char="●"/>
-              <a:tabLst/>
-            </a:pPr>
-            <a:endParaRPr lang="en-IN" sz="1800" b="0" i="0" u="none" strike="noStrike" kern="1200" cap="none">
-              <a:ln>
-                <a:noFill/>
-              </a:ln>
-              <a:latin typeface="Times New Roman Cyr" pitchFamily="18"/>
-              <a:ea typeface="DejaVu Sans" pitchFamily="2"/>
-              <a:cs typeface="FreeSans" pitchFamily="2"/>
-            </a:endParaRPr>
-          </a:p>
-          <a:p>
-            <a:pPr marL="0" marR="0" lvl="0" indent="0" rtl="0" hangingPunct="0">
-              <a:lnSpc>
-                <a:spcPct val="100000"/>
-              </a:lnSpc>
-              <a:spcBef>
-                <a:spcPts val="0"/>
-              </a:spcBef>
-              <a:spcAft>
-                <a:spcPts val="0"/>
-              </a:spcAft>
-              <a:buSzPct val="45000"/>
-              <a:buFont typeface="StarSymbol"/>
-              <a:buChar char="●"/>
-              <a:tabLst/>
-            </a:pPr>
-            <a:r>
-              <a:rPr lang="en-IN" sz="1800" b="0" i="0" u="none" strike="noStrike" kern="1200" cap="none">
-                <a:ln>
-                  <a:noFill/>
-                </a:ln>
-                <a:latin typeface="Times New Roman Cyr" pitchFamily="18"/>
-                <a:ea typeface="DejaVu Sans" pitchFamily="2"/>
-                <a:cs typeface="FreeSans" pitchFamily="2"/>
-              </a:rPr>
-              <a:t>Privacy and Security</a:t>
+              <a:t>Limited Awareness</a:t>
             </a:r>
           </a:p>
         </p:txBody>
@@ -6309,7 +6662,7 @@
           <p:cNvPr id="2" name="TextBox 1">
             <a:extLst>
               <a:ext uri="{FF2B5EF4-FFF2-40B4-BE49-F238E27FC236}">
-                <a16:creationId xmlns:a16="http://schemas.microsoft.com/office/drawing/2014/main" id="{DB188A75-684D-4E81-A43A-55FB5A636663}"/>
+                <a16:creationId xmlns:a16="http://schemas.microsoft.com/office/drawing/2014/main" id="{0568E59C-3CEB-4199-B2C3-C10797DDC023}"/>
               </a:ext>
             </a:extLst>
           </p:cNvPr>
@@ -6318,8 +6671,8 @@
         </p:nvSpPr>
         <p:spPr>
           <a:xfrm>
-            <a:off x="3420000" y="2269800"/>
-            <a:ext cx="4320000" cy="515520"/>
+            <a:off x="360000" y="360000"/>
+            <a:ext cx="2861280" cy="447120"/>
           </a:xfrm>
           <a:prstGeom prst="rect">
             <a:avLst/>
@@ -6340,7 +6693,7 @@
                 <a:spcPct val="100000"/>
               </a:lnSpc>
               <a:spcBef>
-                <a:spcPts val="0"/>
+                <a:spcPts val="1417"/>
               </a:spcBef>
               <a:spcAft>
                 <a:spcPts val="0"/>
@@ -6349,11 +6702,734 @@
               <a:tabLst/>
             </a:pPr>
             <a:r>
-              <a:rPr lang="en-IN" sz="2400" b="1" i="1" u="none" strike="noStrike" kern="1200" cap="none">
+              <a:rPr lang="en-IN" sz="2000" b="1" i="0" u="sng" strike="noStrike" kern="1200" cap="none">
+                <a:ln>
+                  <a:noFill/>
+                </a:ln>
+                <a:uFillTx/>
+                <a:latin typeface="Times New Roman" pitchFamily="18"/>
+                <a:ea typeface="DejaVu Sans" pitchFamily="2"/>
+                <a:cs typeface="FreeSans" pitchFamily="2"/>
+              </a:rPr>
+              <a:t>PROPOSED  SYSTEM</a:t>
+            </a:r>
+          </a:p>
+        </p:txBody>
+      </p:sp>
+      <p:sp>
+        <p:nvSpPr>
+          <p:cNvPr id="3" name="TextBox 2">
+            <a:extLst>
+              <a:ext uri="{FF2B5EF4-FFF2-40B4-BE49-F238E27FC236}">
+                <a16:creationId xmlns:a16="http://schemas.microsoft.com/office/drawing/2014/main" id="{2E149EAC-A2B9-49BE-9366-A72B357A4FAE}"/>
+              </a:ext>
+            </a:extLst>
+          </p:cNvPr>
+          <p:cNvSpPr txBox="1"/>
+          <p:nvPr/>
+        </p:nvSpPr>
+        <p:spPr>
+          <a:xfrm>
+            <a:off x="540000" y="900000"/>
+            <a:ext cx="1715400" cy="410400"/>
+          </a:xfrm>
+          <a:prstGeom prst="rect">
+            <a:avLst/>
+          </a:prstGeom>
+          <a:noFill/>
+          <a:ln>
+            <a:noFill/>
+          </a:ln>
+        </p:spPr>
+        <p:txBody>
+          <a:bodyPr vert="horz" wrap="square" lIns="90000" tIns="45000" rIns="90000" bIns="45000" anchorCtr="0" compatLnSpc="0">
+            <a:spAutoFit/>
+          </a:bodyPr>
+          <a:lstStyle/>
+          <a:p>
+            <a:pPr marL="0" marR="0" lvl="0" indent="0" rtl="0" hangingPunct="0">
+              <a:lnSpc>
+                <a:spcPct val="100000"/>
+              </a:lnSpc>
+              <a:spcBef>
+                <a:spcPts val="0"/>
+              </a:spcBef>
+              <a:spcAft>
+                <a:spcPts val="0"/>
+              </a:spcAft>
+              <a:buNone/>
+              <a:tabLst/>
+            </a:pPr>
+            <a:r>
+              <a:rPr lang="en-IN" sz="1800" b="1" i="0" u="none" strike="noStrike" kern="1200" cap="none">
                 <a:ln>
                   <a:noFill/>
                 </a:ln>
                 <a:latin typeface="OPTITimes-Roman" pitchFamily="18"/>
+                <a:ea typeface="DejaVu Sans" pitchFamily="2"/>
+                <a:cs typeface="FreeSans" pitchFamily="2"/>
+              </a:rPr>
+              <a:t>CYBERWALL</a:t>
+            </a:r>
+          </a:p>
+        </p:txBody>
+      </p:sp>
+      <p:sp>
+        <p:nvSpPr>
+          <p:cNvPr id="4" name="TextBox 3">
+            <a:extLst>
+              <a:ext uri="{FF2B5EF4-FFF2-40B4-BE49-F238E27FC236}">
+                <a16:creationId xmlns:a16="http://schemas.microsoft.com/office/drawing/2014/main" id="{466969FB-3D10-4F7F-9D8F-D4F3D0578309}"/>
+              </a:ext>
+            </a:extLst>
+          </p:cNvPr>
+          <p:cNvSpPr txBox="1"/>
+          <p:nvPr/>
+        </p:nvSpPr>
+        <p:spPr>
+          <a:xfrm>
+            <a:off x="180000" y="1440000"/>
+            <a:ext cx="9180000" cy="3780000"/>
+          </a:xfrm>
+          <a:prstGeom prst="rect">
+            <a:avLst/>
+          </a:prstGeom>
+          <a:noFill/>
+          <a:ln>
+            <a:noFill/>
+          </a:ln>
+        </p:spPr>
+        <p:txBody>
+          <a:bodyPr vert="horz" wrap="square" lIns="90000" tIns="45000" rIns="90000" bIns="45000" anchorCtr="0" compatLnSpc="0">
+            <a:spAutoFit/>
+          </a:bodyPr>
+          <a:lstStyle/>
+          <a:p>
+            <a:pPr marL="0" marR="0" lvl="0" indent="0" rtl="0" hangingPunct="0">
+              <a:lnSpc>
+                <a:spcPct val="100000"/>
+              </a:lnSpc>
+              <a:spcBef>
+                <a:spcPts val="0"/>
+              </a:spcBef>
+              <a:spcAft>
+                <a:spcPts val="0"/>
+              </a:spcAft>
+              <a:buSzPct val="45000"/>
+              <a:buFont typeface="StarSymbol"/>
+              <a:buChar char="●"/>
+              <a:tabLst/>
+            </a:pPr>
+            <a:r>
+              <a:rPr lang="en-IN" sz="1800" b="0" i="0" u="none" strike="noStrike" kern="1200" cap="none">
+                <a:ln>
+                  <a:noFill/>
+                </a:ln>
+                <a:latin typeface="Times New Roman Cyr" pitchFamily="18"/>
+                <a:ea typeface="DejaVu Sans" pitchFamily="2"/>
+                <a:cs typeface="FreeSans" pitchFamily="2"/>
+              </a:rPr>
+              <a:t>CyberWALL presents the development of an innovative mobile application that leverages artificial intelligence(AI) for detecting and mitigating cyberbullying incidents while providing mental health support to victims.</a:t>
+            </a:r>
+          </a:p>
+          <a:p>
+            <a:pPr marL="0" marR="0" lvl="0" indent="0" rtl="0" hangingPunct="0">
+              <a:lnSpc>
+                <a:spcPct val="100000"/>
+              </a:lnSpc>
+              <a:spcBef>
+                <a:spcPts val="0"/>
+              </a:spcBef>
+              <a:spcAft>
+                <a:spcPts val="0"/>
+              </a:spcAft>
+              <a:buSzPct val="45000"/>
+              <a:buFont typeface="StarSymbol"/>
+              <a:buChar char="●"/>
+              <a:tabLst/>
+            </a:pPr>
+            <a:endParaRPr lang="en-IN" sz="1800" b="0" i="0" u="none" strike="noStrike" kern="1200" cap="none">
+              <a:ln>
+                <a:noFill/>
+              </a:ln>
+              <a:latin typeface="Times New Roman Cyr" pitchFamily="18"/>
+              <a:ea typeface="DejaVu Sans" pitchFamily="2"/>
+              <a:cs typeface="FreeSans" pitchFamily="2"/>
+            </a:endParaRPr>
+          </a:p>
+          <a:p>
+            <a:pPr marL="0" marR="0" lvl="0" indent="0" rtl="0" hangingPunct="0">
+              <a:lnSpc>
+                <a:spcPct val="100000"/>
+              </a:lnSpc>
+              <a:spcBef>
+                <a:spcPts val="0"/>
+              </a:spcBef>
+              <a:spcAft>
+                <a:spcPts val="0"/>
+              </a:spcAft>
+              <a:buSzPct val="45000"/>
+              <a:buFont typeface="StarSymbol"/>
+              <a:buChar char="●"/>
+              <a:tabLst/>
+            </a:pPr>
+            <a:r>
+              <a:rPr lang="en-IN" sz="1800" b="0" i="0" u="none" strike="noStrike" kern="1200" cap="none">
+                <a:ln>
+                  <a:noFill/>
+                </a:ln>
+                <a:latin typeface="Times New Roman Cyr" pitchFamily="18"/>
+                <a:ea typeface="DejaVu Sans" pitchFamily="2"/>
+                <a:cs typeface="FreeSans" pitchFamily="2"/>
+              </a:rPr>
+              <a:t>It sends instant notification to users when potential cyberbullying is detected enabling immediate action such as blocking offenders or reporting incidents.</a:t>
+            </a:r>
+          </a:p>
+          <a:p>
+            <a:pPr marL="0" marR="0" lvl="0" indent="0" rtl="0" hangingPunct="0">
+              <a:lnSpc>
+                <a:spcPct val="100000"/>
+              </a:lnSpc>
+              <a:spcBef>
+                <a:spcPts val="0"/>
+              </a:spcBef>
+              <a:spcAft>
+                <a:spcPts val="0"/>
+              </a:spcAft>
+              <a:buSzPct val="45000"/>
+              <a:buFont typeface="StarSymbol"/>
+              <a:buChar char="●"/>
+              <a:tabLst/>
+            </a:pPr>
+            <a:endParaRPr lang="en-IN" sz="1800" b="0" i="0" u="none" strike="noStrike" kern="1200" cap="none">
+              <a:ln>
+                <a:noFill/>
+              </a:ln>
+              <a:latin typeface="Times New Roman Cyr" pitchFamily="18"/>
+              <a:ea typeface="DejaVu Sans" pitchFamily="2"/>
+              <a:cs typeface="FreeSans" pitchFamily="2"/>
+            </a:endParaRPr>
+          </a:p>
+          <a:p>
+            <a:pPr marL="0" marR="0" lvl="0" indent="0" rtl="0" hangingPunct="0">
+              <a:lnSpc>
+                <a:spcPct val="100000"/>
+              </a:lnSpc>
+              <a:spcBef>
+                <a:spcPts val="0"/>
+              </a:spcBef>
+              <a:spcAft>
+                <a:spcPts val="0"/>
+              </a:spcAft>
+              <a:buSzPct val="45000"/>
+              <a:buFont typeface="StarSymbol"/>
+              <a:buChar char="●"/>
+              <a:tabLst/>
+            </a:pPr>
+            <a:r>
+              <a:rPr lang="en-IN" sz="1800" b="0" i="0" u="none" strike="noStrike" kern="1200" cap="none">
+                <a:ln>
+                  <a:noFill/>
+                </a:ln>
+                <a:latin typeface="Times New Roman Cyr" pitchFamily="18"/>
+                <a:ea typeface="DejaVu Sans" pitchFamily="2"/>
+                <a:cs typeface="FreeSans" pitchFamily="2"/>
+              </a:rPr>
+              <a:t>Provides a secure, anonymous reporting system, ensuring victims can safely report incidents without revealing their identity, thus promoting a safer digital environment.</a:t>
+            </a:r>
+          </a:p>
+          <a:p>
+            <a:pPr marL="0" marR="0" lvl="0" indent="0" rtl="0" hangingPunct="0">
+              <a:lnSpc>
+                <a:spcPct val="100000"/>
+              </a:lnSpc>
+              <a:spcBef>
+                <a:spcPts val="0"/>
+              </a:spcBef>
+              <a:spcAft>
+                <a:spcPts val="0"/>
+              </a:spcAft>
+              <a:buSzPct val="45000"/>
+              <a:buFont typeface="StarSymbol"/>
+              <a:buChar char="●"/>
+              <a:tabLst/>
+            </a:pPr>
+            <a:endParaRPr lang="en-IN" sz="1800" b="0" i="0" u="none" strike="noStrike" kern="1200" cap="none">
+              <a:ln>
+                <a:noFill/>
+              </a:ln>
+              <a:latin typeface="Times New Roman Cyr" pitchFamily="18"/>
+              <a:ea typeface="DejaVu Sans" pitchFamily="2"/>
+              <a:cs typeface="FreeSans" pitchFamily="2"/>
+            </a:endParaRPr>
+          </a:p>
+          <a:p>
+            <a:pPr marL="0" marR="0" lvl="0" indent="0" rtl="0" hangingPunct="0">
+              <a:lnSpc>
+                <a:spcPct val="100000"/>
+              </a:lnSpc>
+              <a:spcBef>
+                <a:spcPts val="0"/>
+              </a:spcBef>
+              <a:spcAft>
+                <a:spcPts val="0"/>
+              </a:spcAft>
+              <a:buSzPct val="45000"/>
+              <a:buFont typeface="StarSymbol"/>
+              <a:buChar char="●"/>
+              <a:tabLst/>
+            </a:pPr>
+            <a:r>
+              <a:rPr lang="en-IN" sz="1800" b="0" i="0" u="none" strike="noStrike" kern="1200" cap="none">
+                <a:ln>
+                  <a:noFill/>
+                </a:ln>
+                <a:latin typeface="Times New Roman Cyr" pitchFamily="18"/>
+                <a:ea typeface="DejaVu Sans" pitchFamily="2"/>
+                <a:cs typeface="FreeSans" pitchFamily="2"/>
+              </a:rPr>
+              <a:t>Ensures end-to-end encryption and robust data protection, maintaining user confedentiality while offering effective solutions for online safety.</a:t>
+            </a:r>
+          </a:p>
+        </p:txBody>
+      </p:sp>
+    </p:spTree>
+  </p:cSld>
+  <p:clrMapOvr>
+    <a:masterClrMapping/>
+  </p:clrMapOvr>
+</p:sld>
+</file>
+
+<file path=ppt/slides/slide13.xml><?xml version="1.0" encoding="utf-8"?>
+<p:sld xmlns:a="http://schemas.openxmlformats.org/drawingml/2006/main" xmlns:r="http://schemas.openxmlformats.org/officeDocument/2006/relationships" xmlns:p="http://schemas.openxmlformats.org/presentationml/2006/main">
+  <p:cSld name="page13">
+    <p:spTree>
+      <p:nvGrpSpPr>
+        <p:cNvPr id="1" name=""/>
+        <p:cNvGrpSpPr/>
+        <p:nvPr/>
+      </p:nvGrpSpPr>
+      <p:grpSpPr>
+        <a:xfrm>
+          <a:off x="0" y="0"/>
+          <a:ext cx="0" cy="0"/>
+          <a:chOff x="0" y="0"/>
+          <a:chExt cx="0" cy="0"/>
+        </a:xfrm>
+      </p:grpSpPr>
+      <p:sp>
+        <p:nvSpPr>
+          <p:cNvPr id="2" name="TextBox 1">
+            <a:extLst>
+              <a:ext uri="{FF2B5EF4-FFF2-40B4-BE49-F238E27FC236}">
+                <a16:creationId xmlns:a16="http://schemas.microsoft.com/office/drawing/2014/main" id="{07896ED2-664A-4118-9632-2E8A19A5058D}"/>
+              </a:ext>
+            </a:extLst>
+          </p:cNvPr>
+          <p:cNvSpPr txBox="1"/>
+          <p:nvPr/>
+        </p:nvSpPr>
+        <p:spPr>
+          <a:xfrm>
+            <a:off x="521280" y="360000"/>
+            <a:ext cx="2107080" cy="447120"/>
+          </a:xfrm>
+          <a:prstGeom prst="rect">
+            <a:avLst/>
+          </a:prstGeom>
+          <a:noFill/>
+          <a:ln>
+            <a:noFill/>
+          </a:ln>
+        </p:spPr>
+        <p:txBody>
+          <a:bodyPr vert="horz" wrap="square" lIns="90000" tIns="45000" rIns="90000" bIns="45000" anchorCtr="0" compatLnSpc="0">
+            <a:spAutoFit/>
+          </a:bodyPr>
+          <a:lstStyle/>
+          <a:p>
+            <a:pPr marL="0" marR="0" lvl="0" indent="0" rtl="0" hangingPunct="0">
+              <a:lnSpc>
+                <a:spcPct val="100000"/>
+              </a:lnSpc>
+              <a:spcBef>
+                <a:spcPts val="0"/>
+              </a:spcBef>
+              <a:spcAft>
+                <a:spcPts val="0"/>
+              </a:spcAft>
+              <a:buNone/>
+              <a:tabLst/>
+              <a:defRPr>
+                <a:latin typeface="Times New Roman" pitchFamily="18"/>
+              </a:defRPr>
+            </a:pPr>
+            <a:r>
+              <a:rPr lang="en-IN" sz="2000" b="1" i="0" u="sng" strike="noStrike" kern="1200" cap="none">
+                <a:ln>
+                  <a:noFill/>
+                </a:ln>
+                <a:uFillTx/>
+                <a:latin typeface="Times New Roman" pitchFamily="18"/>
+                <a:ea typeface="DejaVu Sans" pitchFamily="2"/>
+                <a:cs typeface="FreeSans" pitchFamily="2"/>
+              </a:rPr>
+              <a:t>ADVANTAGES</a:t>
+            </a:r>
+          </a:p>
+        </p:txBody>
+      </p:sp>
+      <p:sp>
+        <p:nvSpPr>
+          <p:cNvPr id="3" name="TextBox 2">
+            <a:extLst>
+              <a:ext uri="{FF2B5EF4-FFF2-40B4-BE49-F238E27FC236}">
+                <a16:creationId xmlns:a16="http://schemas.microsoft.com/office/drawing/2014/main" id="{E0925404-14BE-4EB0-B0C2-95468D8DD8E2}"/>
+              </a:ext>
+            </a:extLst>
+          </p:cNvPr>
+          <p:cNvSpPr txBox="1"/>
+          <p:nvPr/>
+        </p:nvSpPr>
+        <p:spPr>
+          <a:xfrm>
+            <a:off x="540000" y="1260000"/>
+            <a:ext cx="6120000" cy="3060000"/>
+          </a:xfrm>
+          <a:prstGeom prst="rect">
+            <a:avLst/>
+          </a:prstGeom>
+          <a:noFill/>
+          <a:ln>
+            <a:noFill/>
+          </a:ln>
+        </p:spPr>
+        <p:txBody>
+          <a:bodyPr vert="horz" wrap="square" lIns="90000" tIns="45000" rIns="90000" bIns="45000" anchorCtr="0" compatLnSpc="0">
+            <a:spAutoFit/>
+          </a:bodyPr>
+          <a:lstStyle/>
+          <a:p>
+            <a:pPr marL="0" marR="0" lvl="0" indent="0" rtl="0" hangingPunct="0">
+              <a:lnSpc>
+                <a:spcPct val="100000"/>
+              </a:lnSpc>
+              <a:spcBef>
+                <a:spcPts val="0"/>
+              </a:spcBef>
+              <a:spcAft>
+                <a:spcPts val="0"/>
+              </a:spcAft>
+              <a:buSzPct val="45000"/>
+              <a:buFont typeface="StarSymbol"/>
+              <a:buChar char="●"/>
+              <a:tabLst/>
+            </a:pPr>
+            <a:r>
+              <a:rPr lang="en-IN" sz="1800" b="0" i="0" u="none" strike="noStrike" kern="1200" cap="none">
+                <a:ln>
+                  <a:noFill/>
+                </a:ln>
+                <a:latin typeface="Times New Roman Cyr" pitchFamily="18"/>
+                <a:ea typeface="DejaVu Sans" pitchFamily="2"/>
+                <a:cs typeface="FreeSans" pitchFamily="2"/>
+              </a:rPr>
+              <a:t>Wider reach and awareness</a:t>
+            </a:r>
+          </a:p>
+          <a:p>
+            <a:pPr marL="0" marR="0" lvl="0" indent="0" rtl="0" hangingPunct="0">
+              <a:lnSpc>
+                <a:spcPct val="100000"/>
+              </a:lnSpc>
+              <a:spcBef>
+                <a:spcPts val="0"/>
+              </a:spcBef>
+              <a:spcAft>
+                <a:spcPts val="0"/>
+              </a:spcAft>
+              <a:buSzPct val="45000"/>
+              <a:buFont typeface="StarSymbol"/>
+              <a:buChar char="●"/>
+              <a:tabLst/>
+            </a:pPr>
+            <a:endParaRPr lang="en-IN" sz="1800" b="0" i="0" u="none" strike="noStrike" kern="1200" cap="none">
+              <a:ln>
+                <a:noFill/>
+              </a:ln>
+              <a:latin typeface="Times New Roman Cyr" pitchFamily="18"/>
+              <a:ea typeface="DejaVu Sans" pitchFamily="2"/>
+              <a:cs typeface="FreeSans" pitchFamily="2"/>
+            </a:endParaRPr>
+          </a:p>
+          <a:p>
+            <a:pPr marL="0" marR="0" lvl="0" indent="0" rtl="0" hangingPunct="0">
+              <a:lnSpc>
+                <a:spcPct val="100000"/>
+              </a:lnSpc>
+              <a:spcBef>
+                <a:spcPts val="0"/>
+              </a:spcBef>
+              <a:spcAft>
+                <a:spcPts val="0"/>
+              </a:spcAft>
+              <a:buSzPct val="45000"/>
+              <a:buFont typeface="StarSymbol"/>
+              <a:buChar char="●"/>
+              <a:tabLst/>
+            </a:pPr>
+            <a:r>
+              <a:rPr lang="en-IN" sz="1800" b="0" i="0" u="none" strike="noStrike" kern="1200" cap="none">
+                <a:ln>
+                  <a:noFill/>
+                </a:ln>
+                <a:latin typeface="Times New Roman Cyr" pitchFamily="18"/>
+                <a:ea typeface="DejaVu Sans" pitchFamily="2"/>
+                <a:cs typeface="FreeSans" pitchFamily="2"/>
+              </a:rPr>
+              <a:t>Scalability and Resource management</a:t>
+            </a:r>
+          </a:p>
+          <a:p>
+            <a:pPr marL="0" marR="0" lvl="0" indent="0" rtl="0" hangingPunct="0">
+              <a:lnSpc>
+                <a:spcPct val="100000"/>
+              </a:lnSpc>
+              <a:spcBef>
+                <a:spcPts val="0"/>
+              </a:spcBef>
+              <a:spcAft>
+                <a:spcPts val="0"/>
+              </a:spcAft>
+              <a:buSzPct val="45000"/>
+              <a:buFont typeface="StarSymbol"/>
+              <a:buChar char="●"/>
+              <a:tabLst/>
+            </a:pPr>
+            <a:endParaRPr lang="en-IN" sz="1800" b="0" i="0" u="none" strike="noStrike" kern="1200" cap="none">
+              <a:ln>
+                <a:noFill/>
+              </a:ln>
+              <a:latin typeface="Times New Roman Cyr" pitchFamily="18"/>
+              <a:ea typeface="DejaVu Sans" pitchFamily="2"/>
+              <a:cs typeface="FreeSans" pitchFamily="2"/>
+            </a:endParaRPr>
+          </a:p>
+          <a:p>
+            <a:pPr marL="0" marR="0" lvl="0" indent="0" rtl="0" hangingPunct="0">
+              <a:lnSpc>
+                <a:spcPct val="100000"/>
+              </a:lnSpc>
+              <a:spcBef>
+                <a:spcPts val="0"/>
+              </a:spcBef>
+              <a:spcAft>
+                <a:spcPts val="0"/>
+              </a:spcAft>
+              <a:buSzPct val="45000"/>
+              <a:buFont typeface="StarSymbol"/>
+              <a:buChar char="●"/>
+              <a:tabLst/>
+            </a:pPr>
+            <a:r>
+              <a:rPr lang="en-IN" sz="1800" b="0" i="0" u="none" strike="noStrike" kern="1200" cap="none">
+                <a:ln>
+                  <a:noFill/>
+                </a:ln>
+                <a:latin typeface="Times New Roman Cyr" pitchFamily="18"/>
+                <a:ea typeface="DejaVu Sans" pitchFamily="2"/>
+                <a:cs typeface="FreeSans" pitchFamily="2"/>
+              </a:rPr>
+              <a:t>Increased Accessability</a:t>
+            </a:r>
+          </a:p>
+          <a:p>
+            <a:pPr marL="0" marR="0" lvl="0" indent="0" rtl="0" hangingPunct="0">
+              <a:lnSpc>
+                <a:spcPct val="100000"/>
+              </a:lnSpc>
+              <a:spcBef>
+                <a:spcPts val="0"/>
+              </a:spcBef>
+              <a:spcAft>
+                <a:spcPts val="0"/>
+              </a:spcAft>
+              <a:buSzPct val="45000"/>
+              <a:buFont typeface="StarSymbol"/>
+              <a:buChar char="●"/>
+              <a:tabLst/>
+            </a:pPr>
+            <a:endParaRPr lang="en-IN" sz="1800" b="0" i="0" u="none" strike="noStrike" kern="1200" cap="none">
+              <a:ln>
+                <a:noFill/>
+              </a:ln>
+              <a:latin typeface="Times New Roman Cyr" pitchFamily="18"/>
+              <a:ea typeface="DejaVu Sans" pitchFamily="2"/>
+              <a:cs typeface="FreeSans" pitchFamily="2"/>
+            </a:endParaRPr>
+          </a:p>
+          <a:p>
+            <a:pPr marL="0" marR="0" lvl="0" indent="0" rtl="0" hangingPunct="0">
+              <a:lnSpc>
+                <a:spcPct val="100000"/>
+              </a:lnSpc>
+              <a:spcBef>
+                <a:spcPts val="0"/>
+              </a:spcBef>
+              <a:spcAft>
+                <a:spcPts val="0"/>
+              </a:spcAft>
+              <a:buSzPct val="45000"/>
+              <a:buFont typeface="StarSymbol"/>
+              <a:buChar char="●"/>
+              <a:tabLst/>
+            </a:pPr>
+            <a:r>
+              <a:rPr lang="en-IN" sz="1800" b="0" i="0" u="none" strike="noStrike" kern="1200" cap="none">
+                <a:ln>
+                  <a:noFill/>
+                </a:ln>
+                <a:latin typeface="Times New Roman Cyr" pitchFamily="18"/>
+                <a:ea typeface="DejaVu Sans" pitchFamily="2"/>
+                <a:cs typeface="FreeSans" pitchFamily="2"/>
+              </a:rPr>
+              <a:t>Simplified reporting process</a:t>
+            </a:r>
+          </a:p>
+          <a:p>
+            <a:pPr marL="0" marR="0" lvl="0" indent="0" rtl="0" hangingPunct="0">
+              <a:lnSpc>
+                <a:spcPct val="100000"/>
+              </a:lnSpc>
+              <a:spcBef>
+                <a:spcPts val="0"/>
+              </a:spcBef>
+              <a:spcAft>
+                <a:spcPts val="0"/>
+              </a:spcAft>
+              <a:buSzPct val="45000"/>
+              <a:buFont typeface="StarSymbol"/>
+              <a:buChar char="●"/>
+              <a:tabLst/>
+            </a:pPr>
+            <a:endParaRPr lang="en-IN" sz="1800" b="0" i="0" u="none" strike="noStrike" kern="1200" cap="none">
+              <a:ln>
+                <a:noFill/>
+              </a:ln>
+              <a:latin typeface="Times New Roman Cyr" pitchFamily="18"/>
+              <a:ea typeface="DejaVu Sans" pitchFamily="2"/>
+              <a:cs typeface="FreeSans" pitchFamily="2"/>
+            </a:endParaRPr>
+          </a:p>
+          <a:p>
+            <a:pPr marL="0" marR="0" lvl="0" indent="0" rtl="0" hangingPunct="0">
+              <a:lnSpc>
+                <a:spcPct val="100000"/>
+              </a:lnSpc>
+              <a:spcBef>
+                <a:spcPts val="0"/>
+              </a:spcBef>
+              <a:spcAft>
+                <a:spcPts val="0"/>
+              </a:spcAft>
+              <a:buSzPct val="45000"/>
+              <a:buFont typeface="StarSymbol"/>
+              <a:buChar char="●"/>
+              <a:tabLst/>
+            </a:pPr>
+            <a:r>
+              <a:rPr lang="en-IN" sz="1800" b="0" i="0" u="none" strike="noStrike" kern="1200" cap="none">
+                <a:ln>
+                  <a:noFill/>
+                </a:ln>
+                <a:latin typeface="Times New Roman Cyr" pitchFamily="18"/>
+                <a:ea typeface="DejaVu Sans" pitchFamily="2"/>
+                <a:cs typeface="FreeSans" pitchFamily="2"/>
+              </a:rPr>
+              <a:t>Privacy and Security</a:t>
+            </a:r>
+          </a:p>
+        </p:txBody>
+      </p:sp>
+    </p:spTree>
+  </p:cSld>
+  <p:clrMapOvr>
+    <a:masterClrMapping/>
+  </p:clrMapOvr>
+</p:sld>
+</file>
+
+<file path=ppt/slides/slide14.xml><?xml version="1.0" encoding="utf-8"?>
+<p:sld xmlns:a="http://schemas.openxmlformats.org/drawingml/2006/main" xmlns:r="http://schemas.openxmlformats.org/officeDocument/2006/relationships" xmlns:p="http://schemas.openxmlformats.org/presentationml/2006/main">
+  <p:cSld name="page14">
+    <p:spTree>
+      <p:nvGrpSpPr>
+        <p:cNvPr id="1" name=""/>
+        <p:cNvGrpSpPr/>
+        <p:nvPr/>
+      </p:nvGrpSpPr>
+      <p:grpSpPr>
+        <a:xfrm>
+          <a:off x="0" y="0"/>
+          <a:ext cx="0" cy="0"/>
+          <a:chOff x="0" y="0"/>
+          <a:chExt cx="0" cy="0"/>
+        </a:xfrm>
+      </p:grpSpPr>
+      <p:sp>
+        <p:nvSpPr>
+          <p:cNvPr id="2" name="TextBox 1">
+            <a:extLst>
+              <a:ext uri="{FF2B5EF4-FFF2-40B4-BE49-F238E27FC236}">
+                <a16:creationId xmlns:a16="http://schemas.microsoft.com/office/drawing/2014/main" id="{E890A81E-B6DE-4C5D-A78F-D529F2FB5D4B}"/>
+              </a:ext>
+            </a:extLst>
+          </p:cNvPr>
+          <p:cNvSpPr txBox="1"/>
+          <p:nvPr/>
+        </p:nvSpPr>
+        <p:spPr>
+          <a:xfrm>
+            <a:off x="4500000" y="2340000"/>
+            <a:ext cx="4320000" cy="1260000"/>
+          </a:xfrm>
+          <a:prstGeom prst="rect">
+            <a:avLst/>
+          </a:prstGeom>
+          <a:noFill/>
+          <a:ln>
+            <a:noFill/>
+          </a:ln>
+        </p:spPr>
+        <p:txBody>
+          <a:bodyPr vert="horz" wrap="square" lIns="90000" tIns="45000" rIns="90000" bIns="45000" anchorCtr="0" compatLnSpc="0">
+            <a:spAutoFit/>
+          </a:bodyPr>
+          <a:lstStyle/>
+          <a:p>
+            <a:pPr marL="0" marR="0" lvl="0" indent="0" rtl="0" hangingPunct="0">
+              <a:lnSpc>
+                <a:spcPct val="100000"/>
+              </a:lnSpc>
+              <a:spcBef>
+                <a:spcPts val="0"/>
+              </a:spcBef>
+              <a:spcAft>
+                <a:spcPts val="0"/>
+              </a:spcAft>
+              <a:buNone/>
+              <a:tabLst/>
+              <a:defRPr sz="2000">
+                <a:latin typeface="Times New Roman" pitchFamily="18"/>
+              </a:defRPr>
+            </a:pPr>
+            <a:r>
+              <a:rPr lang="en-IN" sz="2000" b="1" i="1" u="none" strike="noStrike" kern="1200" cap="none">
+                <a:ln>
+                  <a:noFill/>
+                </a:ln>
+                <a:latin typeface="Times New Roman" pitchFamily="18"/>
                 <a:ea typeface="DejaVu Sans" pitchFamily="2"/>
                 <a:cs typeface="FreeSans" pitchFamily="2"/>
               </a:rPr>
@@ -6392,7 +7468,7 @@
           <p:cNvPr id="2" name="TextBox 1">
             <a:extLst>
               <a:ext uri="{FF2B5EF4-FFF2-40B4-BE49-F238E27FC236}">
-                <a16:creationId xmlns:a16="http://schemas.microsoft.com/office/drawing/2014/main" id="{484D33D7-8110-4484-B9A6-14513E4DF92C}"/>
+                <a16:creationId xmlns:a16="http://schemas.microsoft.com/office/drawing/2014/main" id="{1B7EE892-7A34-4D2D-816F-7272AF16A01C}"/>
               </a:ext>
             </a:extLst>
           </p:cNvPr>
@@ -6430,6 +7506,9 @@
               </a:spcAft>
               <a:buNone/>
               <a:tabLst/>
+              <a:defRPr sz="2000">
+                <a:latin typeface="Times New Roman" pitchFamily="18"/>
+              </a:defRPr>
             </a:pPr>
             <a:r>
               <a:rPr lang="en-IN" sz="2000" b="1" i="0" u="sng" strike="noStrike" kern="1200" cap="none">
@@ -6437,18 +7516,18 @@
                   <a:noFill/>
                 </a:ln>
                 <a:uFillTx/>
-                <a:latin typeface="OPTITimes-Roman" pitchFamily="18"/>
+                <a:latin typeface="Times New Roman" pitchFamily="18"/>
                 <a:ea typeface="DejaVu Sans" pitchFamily="2"/>
                 <a:cs typeface="FreeSans" pitchFamily="2"/>
               </a:rPr>
               <a:t>CONTENTS</a:t>
             </a:r>
             <a:r>
-              <a:rPr lang="en-IN" sz="1800" b="0" i="0" u="none" strike="noStrike" kern="1200" cap="none">
+              <a:rPr lang="en-IN" sz="2000" b="0" i="0" u="none" strike="noStrike" kern="1200" cap="none">
                 <a:ln>
                   <a:noFill/>
                 </a:ln>
-                <a:latin typeface="OPTITimes-Roman" pitchFamily="18"/>
+                <a:latin typeface="Times New Roman" pitchFamily="18"/>
                 <a:ea typeface="DejaVu Sans" pitchFamily="2"/>
                 <a:cs typeface="FreeSans" pitchFamily="2"/>
               </a:rPr>
@@ -6462,7 +7541,7 @@
           <p:cNvPr id="3" name="TextBox 2">
             <a:extLst>
               <a:ext uri="{FF2B5EF4-FFF2-40B4-BE49-F238E27FC236}">
-                <a16:creationId xmlns:a16="http://schemas.microsoft.com/office/drawing/2014/main" id="{CF17EA89-DD83-4426-B025-A59C9DAA4FD9}"/>
+                <a16:creationId xmlns:a16="http://schemas.microsoft.com/office/drawing/2014/main" id="{CAF81442-8FFC-4956-9911-71DBEF667C59}"/>
               </a:ext>
             </a:extLst>
           </p:cNvPr>
@@ -6502,13 +7581,16 @@
               <a:buFont typeface="StarSymbol"/>
               <a:buChar char="●"/>
               <a:tabLst/>
+              <a:defRPr>
+                <a:latin typeface="Times New Roman" pitchFamily="18"/>
+              </a:defRPr>
             </a:pPr>
             <a:r>
               <a:rPr lang="en-IN" sz="1800" b="0" i="0" u="none" strike="noStrike" kern="1200" cap="none">
                 <a:ln>
                   <a:noFill/>
                 </a:ln>
-                <a:latin typeface="OPTITimes-Roman" pitchFamily="18"/>
+                <a:latin typeface="Times New Roman" pitchFamily="18"/>
                 <a:ea typeface="DejaVu Sans" pitchFamily="2"/>
                 <a:cs typeface="FreeSans" pitchFamily="2"/>
               </a:rPr>
@@ -6530,13 +7612,16 @@
               <a:buFont typeface="StarSymbol"/>
               <a:buChar char="●"/>
               <a:tabLst/>
+              <a:defRPr>
+                <a:latin typeface="Times New Roman" pitchFamily="18"/>
+              </a:defRPr>
             </a:pPr>
             <a:r>
               <a:rPr lang="en-IN" sz="1800" b="0" i="0" u="none" strike="noStrike" kern="1200" cap="none">
                 <a:ln>
                   <a:noFill/>
                 </a:ln>
-                <a:latin typeface="OPTITimes-Roman" pitchFamily="18"/>
+                <a:latin typeface="Times New Roman" pitchFamily="18"/>
                 <a:ea typeface="DejaVu Sans" pitchFamily="2"/>
                 <a:cs typeface="FreeSans" pitchFamily="2"/>
               </a:rPr>
@@ -6558,13 +7643,16 @@
               <a:buFont typeface="StarSymbol"/>
               <a:buChar char="●"/>
               <a:tabLst/>
+              <a:defRPr>
+                <a:latin typeface="Times New Roman" pitchFamily="18"/>
+              </a:defRPr>
             </a:pPr>
             <a:r>
               <a:rPr lang="en-IN" sz="1800" b="0" i="0" u="none" strike="noStrike" kern="1200" cap="none">
                 <a:ln>
                   <a:noFill/>
                 </a:ln>
-                <a:latin typeface="OPTITimes-Roman" pitchFamily="18"/>
+                <a:latin typeface="Times New Roman" pitchFamily="18"/>
                 <a:ea typeface="DejaVu Sans" pitchFamily="2"/>
                 <a:cs typeface="FreeSans" pitchFamily="2"/>
               </a:rPr>
@@ -6603,7 +7691,7 @@
           <p:cNvPr id="2" name="TextBox 1">
             <a:extLst>
               <a:ext uri="{FF2B5EF4-FFF2-40B4-BE49-F238E27FC236}">
-                <a16:creationId xmlns:a16="http://schemas.microsoft.com/office/drawing/2014/main" id="{FD5B09E9-A302-45D3-A321-349123D17127}"/>
+                <a16:creationId xmlns:a16="http://schemas.microsoft.com/office/drawing/2014/main" id="{9CAA18E1-7DDF-46AD-AA42-B5D58A4AC5BC}"/>
               </a:ext>
             </a:extLst>
           </p:cNvPr>
@@ -6634,7 +7722,7 @@
                 <a:spcPct val="100000"/>
               </a:lnSpc>
               <a:spcBef>
-                <a:spcPts val="0"/>
+                <a:spcPts val="1417"/>
               </a:spcBef>
               <a:spcAft>
                 <a:spcPts val="0"/>
@@ -6647,22 +7735,34 @@
                 <a:ln>
                   <a:noFill/>
                 </a:ln>
-                <a:latin typeface="Liberation Sans" pitchFamily="18"/>
+                <a:latin typeface="Times New Roman" pitchFamily="18"/>
                 <a:ea typeface="DejaVu Sans" pitchFamily="2"/>
                 <a:cs typeface="FreeSans" pitchFamily="2"/>
               </a:rPr>
               <a:t>    </a:t>
             </a:r>
             <a:r>
-              <a:rPr lang="en-IN" sz="1800" b="1" i="0" u="none" strike="noStrike" kern="1200" cap="none">
+              <a:rPr lang="en-IN" sz="2000" b="1" i="0" u="sng" strike="noStrike" kern="1200" cap="none">
                 <a:ln>
                   <a:noFill/>
                 </a:ln>
-                <a:latin typeface="OPTITimes-Roman" pitchFamily="18"/>
+                <a:uFillTx/>
+                <a:latin typeface="Times New Roman" pitchFamily="18"/>
                 <a:ea typeface="DejaVu Sans" pitchFamily="2"/>
                 <a:cs typeface="FreeSans" pitchFamily="2"/>
               </a:rPr>
-              <a:t>Cyberbullying:</a:t>
+              <a:t>Cyberbullying</a:t>
+            </a:r>
+            <a:r>
+              <a:rPr lang="en-IN" sz="2000" b="1" i="0" u="none" strike="noStrike" kern="1200" cap="none">
+                <a:ln>
+                  <a:noFill/>
+                </a:ln>
+                <a:latin typeface="Times New Roman" pitchFamily="18"/>
+                <a:ea typeface="DejaVu Sans" pitchFamily="2"/>
+                <a:cs typeface="FreeSans" pitchFamily="2"/>
+              </a:rPr>
+              <a:t>:</a:t>
             </a:r>
           </a:p>
           <a:p>
@@ -6686,7 +7786,7 @@
                 <a:ln>
                   <a:noFill/>
                 </a:ln>
-                <a:latin typeface="Times New Roman Cyr" pitchFamily="18"/>
+                <a:latin typeface="Times New Roman" pitchFamily="18"/>
                 <a:ea typeface="DejaVu Sans" pitchFamily="2"/>
                 <a:cs typeface="FreeSans" pitchFamily="2"/>
               </a:rPr>
@@ -6714,7 +7814,7 @@
                 <a:ln>
                   <a:noFill/>
                 </a:ln>
-                <a:latin typeface="Times New Roman Cyr" pitchFamily="18"/>
+                <a:latin typeface="Times New Roman" pitchFamily="18"/>
                 <a:ea typeface="DejaVu Sans" pitchFamily="2"/>
                 <a:cs typeface="FreeSans" pitchFamily="2"/>
               </a:rPr>
@@ -6742,7 +7842,7 @@
                 <a:ln>
                   <a:noFill/>
                 </a:ln>
-                <a:latin typeface="Times New Roman Cyr" pitchFamily="18"/>
+                <a:latin typeface="Times New Roman" pitchFamily="18"/>
                 <a:ea typeface="DejaVu Sans" pitchFamily="2"/>
                 <a:cs typeface="FreeSans" pitchFamily="2"/>
               </a:rPr>
@@ -6770,7 +7870,7 @@
                 <a:ln>
                   <a:noFill/>
                 </a:ln>
-                <a:latin typeface="Times New Roman Cyr" pitchFamily="18"/>
+                <a:latin typeface="Times New Roman" pitchFamily="18"/>
                 <a:ea typeface="DejaVu Sans" pitchFamily="2"/>
                 <a:cs typeface="FreeSans" pitchFamily="2"/>
               </a:rPr>
@@ -6798,7 +7898,7 @@
                 <a:ln>
                   <a:noFill/>
                 </a:ln>
-                <a:latin typeface="Times New Roman Cyr" pitchFamily="18"/>
+                <a:latin typeface="Times New Roman" pitchFamily="18"/>
                 <a:ea typeface="DejaVu Sans" pitchFamily="2"/>
                 <a:cs typeface="FreeSans" pitchFamily="2"/>
               </a:rPr>
@@ -6826,7 +7926,7 @@
                 <a:ln>
                   <a:noFill/>
                 </a:ln>
-                <a:latin typeface="Times New Roman Cyr" pitchFamily="18"/>
+                <a:latin typeface="Times New Roman" pitchFamily="18"/>
                 <a:ea typeface="DejaVu Sans" pitchFamily="2"/>
                 <a:cs typeface="FreeSans" pitchFamily="2"/>
               </a:rPr>
@@ -6854,7 +7954,7 @@
                 <a:ln>
                   <a:noFill/>
                 </a:ln>
-                <a:latin typeface="Times New Roman Cyr" pitchFamily="18"/>
+                <a:latin typeface="Times New Roman" pitchFamily="18"/>
                 <a:ea typeface="DejaVu Sans" pitchFamily="2"/>
                 <a:cs typeface="FreeSans" pitchFamily="2"/>
               </a:rPr>
@@ -6882,7 +7982,7 @@
                 <a:ln>
                   <a:noFill/>
                 </a:ln>
-                <a:latin typeface="Times New Roman Cyr" pitchFamily="18"/>
+                <a:latin typeface="Times New Roman" pitchFamily="18"/>
                 <a:ea typeface="DejaVu Sans" pitchFamily="2"/>
                 <a:cs typeface="FreeSans" pitchFamily="2"/>
               </a:rPr>
@@ -6910,7 +8010,7 @@
                 <a:ln>
                   <a:noFill/>
                 </a:ln>
-                <a:latin typeface="Times New Roman Cyr" pitchFamily="18"/>
+                <a:latin typeface="Times New Roman" pitchFamily="18"/>
                 <a:ea typeface="DejaVu Sans" pitchFamily="2"/>
                 <a:cs typeface="FreeSans" pitchFamily="2"/>
               </a:rPr>
@@ -6938,7 +8038,7 @@
                 <a:ln>
                   <a:noFill/>
                 </a:ln>
-                <a:latin typeface="Times New Roman Cyr" pitchFamily="18"/>
+                <a:latin typeface="Times New Roman" pitchFamily="18"/>
                 <a:ea typeface="DejaVu Sans" pitchFamily="2"/>
                 <a:cs typeface="FreeSans" pitchFamily="2"/>
               </a:rPr>
@@ -6952,7 +8052,7 @@
           <p:cNvPr id="3" name="TextBox 2">
             <a:extLst>
               <a:ext uri="{FF2B5EF4-FFF2-40B4-BE49-F238E27FC236}">
-                <a16:creationId xmlns:a16="http://schemas.microsoft.com/office/drawing/2014/main" id="{A555252A-5534-4492-9D13-60FEE472051B}"/>
+                <a16:creationId xmlns:a16="http://schemas.microsoft.com/office/drawing/2014/main" id="{E22F01E8-F336-47CD-8F06-4AE953DBC99C}"/>
               </a:ext>
             </a:extLst>
           </p:cNvPr>
@@ -6990,24 +8090,29 @@
               </a:spcAft>
               <a:buNone/>
               <a:tabLst/>
+              <a:defRPr u="sng">
+                <a:uFillTx/>
+              </a:defRPr>
             </a:pPr>
             <a:r>
-              <a:rPr lang="en-IN" sz="2000" b="1" i="0" u="none" strike="noStrike" kern="1200" cap="none">
+              <a:rPr lang="en-IN" sz="2000" b="1" i="0" u="sng" strike="noStrike" kern="1200" cap="none">
                 <a:ln>
                   <a:noFill/>
                 </a:ln>
-                <a:latin typeface="OPTITimes-Roman" pitchFamily="18"/>
+                <a:uFillTx/>
+                <a:latin typeface="Times New Roman" pitchFamily="18"/>
                 <a:ea typeface="DejaVu Sans" pitchFamily="2"/>
                 <a:cs typeface="FreeSans" pitchFamily="2"/>
               </a:rPr>
               <a:t>INTRODUCTION</a:t>
             </a:r>
             <a:r>
-              <a:rPr lang="en-IN" sz="1800" b="1" i="0" u="none" strike="noStrike" kern="1200" cap="none">
+              <a:rPr lang="en-IN" sz="2000" b="0" i="0" u="sng" strike="noStrike" kern="1200" cap="none">
                 <a:ln>
                   <a:noFill/>
                 </a:ln>
-                <a:latin typeface="OPTITimes-Roman" pitchFamily="18"/>
+                <a:uFillTx/>
+                <a:latin typeface="Times New Roman" pitchFamily="18"/>
                 <a:ea typeface="DejaVu Sans" pitchFamily="2"/>
                 <a:cs typeface="FreeSans" pitchFamily="2"/>
               </a:rPr>
@@ -7046,7 +8151,7 @@
           <p:cNvPr id="2" name="TextBox 1">
             <a:extLst>
               <a:ext uri="{FF2B5EF4-FFF2-40B4-BE49-F238E27FC236}">
-                <a16:creationId xmlns:a16="http://schemas.microsoft.com/office/drawing/2014/main" id="{796C2A23-4EAE-43FA-931A-65566BE93C58}"/>
+                <a16:creationId xmlns:a16="http://schemas.microsoft.com/office/drawing/2014/main" id="{F6E1849A-4EA3-496E-A191-C702102032EE}"/>
               </a:ext>
             </a:extLst>
           </p:cNvPr>
@@ -7084,6 +8189,7 @@
               </a:spcAft>
               <a:buNone/>
               <a:tabLst/>
+              <a:defRPr b="1"/>
             </a:pPr>
             <a:r>
               <a:rPr lang="en-IN" sz="2000" b="1" i="0" u="sng" strike="noStrike" kern="1200" cap="none">
@@ -7091,7 +8197,7 @@
                   <a:noFill/>
                 </a:ln>
                 <a:uFillTx/>
-                <a:latin typeface="OPTITimes-Roman" pitchFamily="18"/>
+                <a:latin typeface="Times New Roman" pitchFamily="18"/>
                 <a:ea typeface="DejaVu Sans" pitchFamily="2"/>
                 <a:cs typeface="FreeSans" pitchFamily="2"/>
               </a:rPr>
@@ -7105,7 +8211,7 @@
           <p:cNvPr id="3" name="TextBox 2">
             <a:extLst>
               <a:ext uri="{FF2B5EF4-FFF2-40B4-BE49-F238E27FC236}">
-                <a16:creationId xmlns:a16="http://schemas.microsoft.com/office/drawing/2014/main" id="{6F613F79-7870-40FF-B045-D092DE16C020}"/>
+                <a16:creationId xmlns:a16="http://schemas.microsoft.com/office/drawing/2014/main" id="{B367D4B1-949E-4EFE-96F2-B772A1537DF0}"/>
               </a:ext>
             </a:extLst>
           </p:cNvPr>
@@ -7284,7 +8390,7 @@
               <a:ln>
                 <a:noFill/>
               </a:ln>
-              <a:latin typeface="Liberation Sans" pitchFamily="18"/>
+              <a:latin typeface="Times New Roman" pitchFamily="18"/>
               <a:ea typeface="DejaVu Sans" pitchFamily="2"/>
               <a:cs typeface="FreeSans" pitchFamily="2"/>
             </a:endParaRPr>
@@ -7321,7 +8427,7 @@
           <p:cNvPr id="2" name="Text Placeholder 1">
             <a:extLst>
               <a:ext uri="{FF2B5EF4-FFF2-40B4-BE49-F238E27FC236}">
-                <a16:creationId xmlns:a16="http://schemas.microsoft.com/office/drawing/2014/main" id="{330D510C-F3C6-4A3C-B676-35217F65C889}"/>
+                <a16:creationId xmlns:a16="http://schemas.microsoft.com/office/drawing/2014/main" id="{1F263143-B013-4FFE-A8B8-1E208AA9027E}"/>
               </a:ext>
             </a:extLst>
           </p:cNvPr>
@@ -7342,7 +8448,7 @@
           <a:bodyPr vert="horz"/>
           <a:lstStyle/>
           <a:p>
-            <a:pPr lvl="0"/>
+            <a:pPr lvl="0" rtl="0"/>
             <a:r>
               <a:rPr lang="en-IN" sz="2000" b="1" u="sng">
                 <a:latin typeface="Times New Roman" pitchFamily="18"/>
@@ -7357,7 +8463,7 @@
           <p:cNvPr id="3" name="Text Placeholder 2">
             <a:extLst>
               <a:ext uri="{FF2B5EF4-FFF2-40B4-BE49-F238E27FC236}">
-                <a16:creationId xmlns:a16="http://schemas.microsoft.com/office/drawing/2014/main" id="{018958EF-0380-4533-A300-C2424A5E2182}"/>
+                <a16:creationId xmlns:a16="http://schemas.microsoft.com/office/drawing/2014/main" id="{54D65BCD-A302-4FCF-B279-229BD5535840}"/>
               </a:ext>
             </a:extLst>
           </p:cNvPr>
@@ -7378,7 +8484,7 @@
           <a:bodyPr vert="horz"/>
           <a:lstStyle/>
           <a:p>
-            <a:pPr lvl="0"/>
+            <a:pPr lvl="0" rtl="0"/>
             <a:r>
               <a:rPr lang="en-IN" sz="2000" b="1">
                 <a:latin typeface="Times New Roman" pitchFamily="18"/>
@@ -7387,7 +8493,7 @@
             </a:r>
           </a:p>
           <a:p>
-            <a:pPr lvl="0">
+            <a:pPr lvl="0" rtl="0">
               <a:buSzPct val="45000"/>
               <a:buFont typeface="StarSymbol"/>
               <a:buChar char="●"/>
@@ -7400,7 +8506,7 @@
             </a:r>
           </a:p>
           <a:p>
-            <a:pPr lvl="0">
+            <a:pPr lvl="0" rtl="0">
               <a:buSzPct val="45000"/>
               <a:buFont typeface="StarSymbol"/>
               <a:buChar char="●"/>
@@ -7444,7 +8550,7 @@
           <p:cNvPr id="2" name="Title 1">
             <a:extLst>
               <a:ext uri="{FF2B5EF4-FFF2-40B4-BE49-F238E27FC236}">
-                <a16:creationId xmlns:a16="http://schemas.microsoft.com/office/drawing/2014/main" id="{85C6B151-A0E9-4975-95DD-46956A1B62A3}"/>
+                <a16:creationId xmlns:a16="http://schemas.microsoft.com/office/drawing/2014/main" id="{F2FF9B6D-26C2-4C1E-8B08-0D2483A9C246}"/>
               </a:ext>
             </a:extLst>
           </p:cNvPr>
@@ -7460,7 +8566,7 @@
           <a:bodyPr vert="horz"/>
           <a:lstStyle/>
           <a:p>
-            <a:pPr lvl="0" algn="l">
+            <a:pPr lvl="0" algn="l" rtl="0">
               <a:spcBef>
                 <a:spcPts val="1417"/>
               </a:spcBef>
@@ -7479,7 +8585,7 @@
           <p:cNvPr id="3" name="Subtitle 2">
             <a:extLst>
               <a:ext uri="{FF2B5EF4-FFF2-40B4-BE49-F238E27FC236}">
-                <a16:creationId xmlns:a16="http://schemas.microsoft.com/office/drawing/2014/main" id="{B169D311-885C-47C6-86C9-1E7C06D97F50}"/>
+                <a16:creationId xmlns:a16="http://schemas.microsoft.com/office/drawing/2014/main" id="{A17DB9F8-91C6-4929-8C46-2EB9B7F60837}"/>
               </a:ext>
             </a:extLst>
           </p:cNvPr>
@@ -7492,11 +8598,72 @@
         </p:nvSpPr>
         <p:spPr/>
         <p:txBody>
-          <a:bodyPr vert="horz" anchor="ctr"/>
-          <a:lstStyle/>
-          <a:p>
-            <a:pPr algn="ctr"/>
-            <a:endParaRPr lang="en-IN"/>
+          <a:bodyPr vert="horz" anchor="t"/>
+          <a:lstStyle/>
+          <a:p>
+            <a:pPr lvl="0" algn="l" rtl="0">
+              <a:spcBef>
+                <a:spcPts val="1191"/>
+              </a:spcBef>
+              <a:spcAft>
+                <a:spcPts val="992"/>
+              </a:spcAft>
+              <a:buSzPct val="45000"/>
+              <a:buFont typeface="StarSymbol"/>
+              <a:buChar char="●"/>
+            </a:pPr>
+            <a:r>
+              <a:rPr lang="en-IN" sz="1800">
+                <a:latin typeface="Times New Roman" pitchFamily="18"/>
+              </a:rPr>
+              <a:t>Require specialized expertise for extracting relevant features.</a:t>
+            </a:r>
+          </a:p>
+          <a:p>
+            <a:pPr lvl="0" algn="l" rtl="0">
+              <a:spcBef>
+                <a:spcPts val="1191"/>
+              </a:spcBef>
+              <a:spcAft>
+                <a:spcPts val="992"/>
+              </a:spcAft>
+              <a:buSzPct val="45000"/>
+              <a:buFont typeface="StarSymbol"/>
+              <a:buChar char="●"/>
+            </a:pPr>
+            <a:r>
+              <a:rPr lang="en-IN" sz="1800">
+                <a:latin typeface="Times New Roman" pitchFamily="18"/>
+              </a:rPr>
+              <a:t>Complex deep learning models.</a:t>
+            </a:r>
+          </a:p>
+          <a:p>
+            <a:pPr lvl="0" algn="l" rtl="0">
+              <a:spcBef>
+                <a:spcPts val="1191"/>
+              </a:spcBef>
+              <a:spcAft>
+                <a:spcPts val="992"/>
+              </a:spcAft>
+              <a:buSzPct val="45000"/>
+              <a:buFont typeface="StarSymbol"/>
+              <a:buChar char="●"/>
+            </a:pPr>
+            <a:endParaRPr lang="en-IN" sz="1800">
+              <a:latin typeface="Times New Roman" pitchFamily="18"/>
+            </a:endParaRPr>
+          </a:p>
+          <a:p>
+            <a:pPr lvl="0" algn="l" rtl="0">
+              <a:spcBef>
+                <a:spcPts val="1191"/>
+              </a:spcBef>
+              <a:spcAft>
+                <a:spcPts val="992"/>
+              </a:spcAft>
+            </a:pPr>
+            <a:endParaRPr lang="en-IN" sz="1000"/>
           </a:p>
         </p:txBody>
       </p:sp>
@@ -7530,7 +8697,7 @@
           <p:cNvPr id="2" name="Title 1">
             <a:extLst>
               <a:ext uri="{FF2B5EF4-FFF2-40B4-BE49-F238E27FC236}">
-                <a16:creationId xmlns:a16="http://schemas.microsoft.com/office/drawing/2014/main" id="{7CF54CE5-1269-4A63-A5E6-7F355A396727}"/>
+                <a16:creationId xmlns:a16="http://schemas.microsoft.com/office/drawing/2014/main" id="{71346B91-8618-4484-97FD-C2C088CC6413}"/>
               </a:ext>
             </a:extLst>
           </p:cNvPr>
@@ -7546,7 +8713,7 @@
           <a:bodyPr vert="horz"/>
           <a:lstStyle/>
           <a:p>
-            <a:pPr lvl="0" algn="l">
+            <a:pPr lvl="0" algn="l" rtl="0">
               <a:spcBef>
                 <a:spcPts val="1417"/>
               </a:spcBef>
@@ -7565,7 +8732,7 @@
           <p:cNvPr id="3" name="Subtitle 2">
             <a:extLst>
               <a:ext uri="{FF2B5EF4-FFF2-40B4-BE49-F238E27FC236}">
-                <a16:creationId xmlns:a16="http://schemas.microsoft.com/office/drawing/2014/main" id="{394A475D-3FF8-4229-A06D-FCFE2BDB5FEC}"/>
+                <a16:creationId xmlns:a16="http://schemas.microsoft.com/office/drawing/2014/main" id="{C3D02BAD-9AF9-47C6-94F4-BB4186DE9916}"/>
               </a:ext>
             </a:extLst>
           </p:cNvPr>
@@ -7586,21 +8753,69 @@
           <a:bodyPr vert="horz" anchor="t"/>
           <a:lstStyle/>
           <a:p>
-            <a:pPr lvl="0" algn="l"/>
+            <a:pPr lvl="0" algn="l" rtl="0"/>
             <a:r>
               <a:rPr lang="en-IN" sz="2000" b="1">
                 <a:latin typeface="Times New Roman" pitchFamily="18"/>
               </a:rPr>
-              <a:t>(1)Cyber Bullying Detection on Social Media using Machine Learning : Research Article (2021)</a:t>
-            </a:r>
-          </a:p>
-          <a:p>
-            <a:pPr lvl="0" algn="l"/>
-            <a:r>
-              <a:rPr lang="en-IN" sz="2000" b="1">
+              <a:t>(2)Cyber Bullying Detection on Social Media using Machine Learning : Research Article (2021)</a:t>
+            </a:r>
+          </a:p>
+          <a:p>
+            <a:pPr lvl="0" algn="l" rtl="0">
+              <a:spcBef>
+                <a:spcPts val="1191"/>
+              </a:spcBef>
+              <a:spcAft>
+                <a:spcPts val="992"/>
+              </a:spcAft>
+              <a:buSzPct val="45000"/>
+              <a:buFont typeface="StarSymbol"/>
+              <a:buChar char="●"/>
+            </a:pPr>
+            <a:r>
+              <a:rPr lang="en-IN" sz="1800">
                 <a:latin typeface="Times New Roman" pitchFamily="18"/>
               </a:rPr>
-              <a:t> </a:t>
+              <a:t> This paper demonstrates the feasibility and effectiveness of using machine learning algorithms to identify cyberbullying in social media text.</a:t>
+            </a:r>
+          </a:p>
+          <a:p>
+            <a:pPr lvl="0" algn="l" rtl="0">
+              <a:spcBef>
+                <a:spcPts val="1191"/>
+              </a:spcBef>
+              <a:spcAft>
+                <a:spcPts val="992"/>
+              </a:spcAft>
+              <a:buSzPct val="45000"/>
+              <a:buFont typeface="StarSymbol"/>
+              <a:buChar char="●"/>
+            </a:pPr>
+            <a:r>
+              <a:rPr lang="en-IN" sz="1800">
+                <a:latin typeface="Times New Roman" pitchFamily="18"/>
+              </a:rPr>
+              <a:t>The paper likely compares different machine learning models (e.g., logistic regression, SVM, Naive Bayes) for cyberbullying detection, providing valuable insights into their strengths and weaknesses.</a:t>
+            </a:r>
+          </a:p>
+          <a:p>
+            <a:pPr lvl="0" algn="l" rtl="0">
+              <a:spcBef>
+                <a:spcPts val="1191"/>
+              </a:spcBef>
+              <a:spcAft>
+                <a:spcPts val="992"/>
+              </a:spcAft>
+              <a:buSzPct val="45000"/>
+              <a:buFont typeface="StarSymbol"/>
+              <a:buChar char="●"/>
+            </a:pPr>
+            <a:r>
+              <a:rPr lang="en-IN" sz="1800">
+                <a:latin typeface="Times New Roman" pitchFamily="18"/>
+              </a:rPr>
+              <a:t>The paper likely discusses the challenges associated with detecting cyberbullying, such as the use of slang, sarcasm, and context-dependent language.</a:t>
             </a:r>
           </a:p>
         </p:txBody>
@@ -7632,530 +8847,102 @@
       </p:grpSpPr>
       <p:sp>
         <p:nvSpPr>
-          <p:cNvPr id="2" name="TextBox 1">
-            <a:extLst>
-              <a:ext uri="{FF2B5EF4-FFF2-40B4-BE49-F238E27FC236}">
-                <a16:creationId xmlns:a16="http://schemas.microsoft.com/office/drawing/2014/main" id="{C6BC7C60-6604-4FBF-AD72-16635C99004C}"/>
-              </a:ext>
-            </a:extLst>
-          </p:cNvPr>
-          <p:cNvSpPr txBox="1"/>
-          <p:nvPr/>
-        </p:nvSpPr>
-        <p:spPr>
-          <a:xfrm>
-            <a:off x="324000" y="360000"/>
-            <a:ext cx="2827800" cy="447120"/>
-          </a:xfrm>
-          <a:prstGeom prst="rect">
-            <a:avLst/>
-          </a:prstGeom>
-          <a:noFill/>
-          <a:ln>
-            <a:noFill/>
-          </a:ln>
-        </p:spPr>
-        <p:txBody>
-          <a:bodyPr vert="horz" wrap="square" lIns="90000" tIns="45000" rIns="90000" bIns="45000" anchorCtr="0" compatLnSpc="0">
-            <a:spAutoFit/>
-          </a:bodyPr>
-          <a:lstStyle/>
-          <a:p>
-            <a:pPr marL="0" marR="0" lvl="0" indent="0" rtl="0" hangingPunct="0">
-              <a:lnSpc>
-                <a:spcPct val="100000"/>
-              </a:lnSpc>
+          <p:cNvPr id="2" name="Title 1">
+            <a:extLst>
+              <a:ext uri="{FF2B5EF4-FFF2-40B4-BE49-F238E27FC236}">
+                <a16:creationId xmlns:a16="http://schemas.microsoft.com/office/drawing/2014/main" id="{118A5BCE-567B-428D-824F-95640581A11A}"/>
+              </a:ext>
+            </a:extLst>
+          </p:cNvPr>
+          <p:cNvSpPr txBox="1">
+            <a:spLocks noGrp="1"/>
+          </p:cNvSpPr>
+          <p:nvPr>
+            <p:ph type="title" idx="4294967295"/>
+          </p:nvPr>
+        </p:nvSpPr>
+        <p:spPr/>
+        <p:txBody>
+          <a:bodyPr vert="horz"/>
+          <a:lstStyle/>
+          <a:p>
+            <a:pPr lvl="0" algn="l" rtl="0"/>
+            <a:r>
+              <a:rPr lang="en-IN" sz="2000" b="1" u="sng">
+                <a:latin typeface="Times New Roman" pitchFamily="18"/>
+              </a:rPr>
+              <a:t>DISADVANTAGES</a:t>
+            </a:r>
+          </a:p>
+        </p:txBody>
+      </p:sp>
+      <p:sp>
+        <p:nvSpPr>
+          <p:cNvPr id="3" name="Text Placeholder 2">
+            <a:extLst>
+              <a:ext uri="{FF2B5EF4-FFF2-40B4-BE49-F238E27FC236}">
+                <a16:creationId xmlns:a16="http://schemas.microsoft.com/office/drawing/2014/main" id="{D29A4D5B-7694-4BB8-BEAA-A244AF801D6F}"/>
+              </a:ext>
+            </a:extLst>
+          </p:cNvPr>
+          <p:cNvSpPr txBox="1">
+            <a:spLocks noGrp="1"/>
+          </p:cNvSpPr>
+          <p:nvPr>
+            <p:ph type="body" idx="4294967295"/>
+          </p:nvPr>
+        </p:nvSpPr>
+        <p:spPr/>
+        <p:txBody>
+          <a:bodyPr vert="horz"/>
+          <a:lstStyle/>
+          <a:p>
+            <a:pPr lvl="0" rtl="0">
+              <a:buSzPct val="45000"/>
+              <a:buFont typeface="StarSymbol"/>
+              <a:buChar char="●"/>
+            </a:pPr>
+            <a:r>
+              <a:rPr lang="en-IN" sz="1800">
+                <a:latin typeface="Times New Roman" pitchFamily="18"/>
+              </a:rPr>
+              <a:t>Difficult to understand.</a:t>
+            </a:r>
+          </a:p>
+          <a:p>
+            <a:pPr lvl="0" rtl="0">
               <a:spcBef>
-                <a:spcPts val="0"/>
+                <a:spcPts val="1191"/>
               </a:spcBef>
               <a:spcAft>
-                <a:spcPts val="0"/>
-              </a:spcAft>
-              <a:buNone/>
-              <a:tabLst/>
-            </a:pPr>
-            <a:r>
-              <a:rPr lang="en-IN" sz="2000" b="1" i="0" u="sng" strike="noStrike" kern="1200" cap="none">
-                <a:ln>
-                  <a:noFill/>
-                </a:ln>
-                <a:uFillTx/>
-                <a:latin typeface="OPTITimes-Roman" pitchFamily="18"/>
-                <a:ea typeface="DejaVu Sans" pitchFamily="2"/>
-                <a:cs typeface="FreeSans" pitchFamily="2"/>
-              </a:rPr>
-              <a:t>EXISTING SYSTEMS</a:t>
-            </a:r>
-          </a:p>
-        </p:txBody>
-      </p:sp>
-      <p:sp>
-        <p:nvSpPr>
-          <p:cNvPr id="3" name="TextBox 2">
-            <a:extLst>
-              <a:ext uri="{FF2B5EF4-FFF2-40B4-BE49-F238E27FC236}">
-                <a16:creationId xmlns:a16="http://schemas.microsoft.com/office/drawing/2014/main" id="{5CFAE7EF-5BAC-4193-8999-FFD4B23452F3}"/>
-              </a:ext>
-            </a:extLst>
-          </p:cNvPr>
-          <p:cNvSpPr txBox="1"/>
-          <p:nvPr/>
-        </p:nvSpPr>
-        <p:spPr>
-          <a:xfrm>
-            <a:off x="396720" y="913679"/>
-            <a:ext cx="2081160" cy="375480"/>
-          </a:xfrm>
-          <a:prstGeom prst="rect">
-            <a:avLst/>
-          </a:prstGeom>
-          <a:noFill/>
-          <a:ln>
-            <a:noFill/>
-          </a:ln>
-        </p:spPr>
-        <p:txBody>
-          <a:bodyPr vert="horz" wrap="square" lIns="90000" tIns="45000" rIns="90000" bIns="45000" anchorCtr="0" compatLnSpc="0">
-            <a:spAutoFit/>
-          </a:bodyPr>
-          <a:lstStyle/>
-          <a:p>
-            <a:pPr marL="0" marR="0" lvl="0" indent="0" rtl="0" hangingPunct="0">
-              <a:lnSpc>
-                <a:spcPct val="100000"/>
-              </a:lnSpc>
-              <a:spcBef>
-                <a:spcPts val="0"/>
-              </a:spcBef>
-              <a:spcAft>
-                <a:spcPts val="0"/>
-              </a:spcAft>
-              <a:buNone/>
-              <a:tabLst/>
-            </a:pPr>
-            <a:r>
-              <a:rPr lang="en-IN" sz="2000" b="1" i="0" u="none" strike="noStrike" kern="1200" cap="none">
-                <a:ln>
-                  <a:noFill/>
-                </a:ln>
-                <a:latin typeface="Times New Roman Cyr" pitchFamily="18"/>
-                <a:ea typeface="DejaVu Sans" pitchFamily="2"/>
-                <a:cs typeface="FreeSans" pitchFamily="2"/>
-              </a:rPr>
-              <a:t>CYBER B.A.A.P</a:t>
-            </a:r>
-          </a:p>
-        </p:txBody>
-      </p:sp>
-      <p:sp>
-        <p:nvSpPr>
-          <p:cNvPr id="4" name="TextBox 3">
-            <a:extLst>
-              <a:ext uri="{FF2B5EF4-FFF2-40B4-BE49-F238E27FC236}">
-                <a16:creationId xmlns:a16="http://schemas.microsoft.com/office/drawing/2014/main" id="{53DED754-5742-4FFB-95E6-47BB60873AB4}"/>
-              </a:ext>
-            </a:extLst>
-          </p:cNvPr>
-          <p:cNvSpPr txBox="1"/>
-          <p:nvPr/>
-        </p:nvSpPr>
-        <p:spPr>
-          <a:xfrm>
-            <a:off x="360000" y="1440000"/>
-            <a:ext cx="9660960" cy="3673800"/>
-          </a:xfrm>
-          <a:prstGeom prst="rect">
-            <a:avLst/>
-          </a:prstGeom>
-          <a:noFill/>
-          <a:ln>
-            <a:noFill/>
-          </a:ln>
-        </p:spPr>
-        <p:txBody>
-          <a:bodyPr vert="horz" wrap="square" lIns="90000" tIns="45000" rIns="90000" bIns="45000" anchorCtr="0" compatLnSpc="0">
-            <a:spAutoFit/>
-          </a:bodyPr>
-          <a:lstStyle/>
-          <a:p>
-            <a:pPr marL="0" marR="0" lvl="0" indent="0" rtl="0" hangingPunct="0">
-              <a:lnSpc>
-                <a:spcPct val="100000"/>
-              </a:lnSpc>
-              <a:spcBef>
-                <a:spcPts val="0"/>
-              </a:spcBef>
-              <a:spcAft>
-                <a:spcPts val="0"/>
+                <a:spcPts val="992"/>
               </a:spcAft>
               <a:buSzPct val="45000"/>
               <a:buFont typeface="StarSymbol"/>
               <a:buChar char="●"/>
-              <a:tabLst/>
             </a:pPr>
             <a:r>
-              <a:rPr lang="en-IN" sz="1800" b="0" i="0" u="none" strike="noStrike" kern="1200" cap="none">
-                <a:ln>
-                  <a:noFill/>
-                </a:ln>
-                <a:latin typeface="Times New Roman Cyr" pitchFamily="18"/>
-                <a:ea typeface="DejaVu Sans" pitchFamily="2"/>
-                <a:cs typeface="FreeSans" pitchFamily="2"/>
+              <a:rPr lang="en-IN" sz="1800">
+                <a:latin typeface="Times New Roman" pitchFamily="18"/>
               </a:rPr>
-              <a:t>CyberB.A.A.P(Cyber Bullying Awareness,Action, and Prevention) is an initiative by the Nirali</a:t>
-            </a:r>
-          </a:p>
-          <a:p>
-            <a:pPr marL="0" marR="0" lvl="0" indent="0" rtl="0" hangingPunct="0">
-              <a:lnSpc>
-                <a:spcPct val="100000"/>
-              </a:lnSpc>
+              <a:t>often require retraining</a:t>
+            </a:r>
+          </a:p>
+          <a:p>
+            <a:pPr lvl="0" rtl="0">
               <a:spcBef>
-                <a:spcPts val="0"/>
+                <a:spcPts val="1191"/>
               </a:spcBef>
               <a:spcAft>
-                <a:spcPts val="0"/>
+                <a:spcPts val="992"/>
               </a:spcAft>
               <a:buSzPct val="45000"/>
               <a:buFont typeface="StarSymbol"/>
               <a:buChar char="●"/>
-              <a:tabLst/>
             </a:pPr>
-            <a:r>
-              <a:rPr lang="en-IN" sz="1800" b="0" i="0" u="none" strike="noStrike" kern="1200" cap="none">
-                <a:ln>
-                  <a:noFill/>
-                </a:ln>
-                <a:latin typeface="Times New Roman Cyr" pitchFamily="18"/>
-                <a:ea typeface="DejaVu Sans" pitchFamily="2"/>
-                <a:cs typeface="FreeSans" pitchFamily="2"/>
-              </a:rPr>
-              <a:t>Bhatia Cyber wellness foundation.</a:t>
-            </a:r>
-          </a:p>
-          <a:p>
-            <a:pPr marL="0" marR="0" lvl="0" indent="0" rtl="0" hangingPunct="0">
-              <a:lnSpc>
-                <a:spcPct val="100000"/>
-              </a:lnSpc>
-              <a:spcBef>
-                <a:spcPts val="0"/>
-              </a:spcBef>
-              <a:spcAft>
-                <a:spcPts val="0"/>
-              </a:spcAft>
-              <a:buSzPct val="45000"/>
-              <a:buFont typeface="StarSymbol"/>
-              <a:buChar char="●"/>
-              <a:tabLst/>
-            </a:pPr>
-            <a:endParaRPr lang="en-IN" sz="1800" b="0" i="0" u="none" strike="noStrike" kern="1200" cap="none">
-              <a:ln>
-                <a:noFill/>
-              </a:ln>
-              <a:latin typeface="Times New Roman Cyr" pitchFamily="18"/>
-              <a:ea typeface="DejaVu Sans" pitchFamily="2"/>
-              <a:cs typeface="FreeSans" pitchFamily="2"/>
+            <a:endParaRPr lang="en-IN" sz="1800">
+              <a:latin typeface="Times New Roman" pitchFamily="18"/>
             </a:endParaRPr>
-          </a:p>
-          <a:p>
-            <a:pPr marL="0" marR="0" lvl="0" indent="0" rtl="0" hangingPunct="0">
-              <a:lnSpc>
-                <a:spcPct val="100000"/>
-              </a:lnSpc>
-              <a:spcBef>
-                <a:spcPts val="0"/>
-              </a:spcBef>
-              <a:spcAft>
-                <a:spcPts val="0"/>
-              </a:spcAft>
-              <a:buSzPct val="45000"/>
-              <a:buFont typeface="StarSymbol"/>
-              <a:buChar char="●"/>
-              <a:tabLst/>
-            </a:pPr>
-            <a:r>
-              <a:rPr lang="en-IN" sz="1800" b="0" i="0" u="none" strike="noStrike" kern="1200" cap="none">
-                <a:ln>
-                  <a:noFill/>
-                </a:ln>
-                <a:latin typeface="Times New Roman Cyr" pitchFamily="18"/>
-                <a:ea typeface="DejaVu Sans" pitchFamily="2"/>
-                <a:cs typeface="FreeSans" pitchFamily="2"/>
-              </a:rPr>
-              <a:t>It is a comprehensive program to combat the growing menace of cyberbullying.</a:t>
-            </a:r>
-          </a:p>
-          <a:p>
-            <a:pPr marL="0" marR="0" lvl="0" indent="0" rtl="0" hangingPunct="0">
-              <a:lnSpc>
-                <a:spcPct val="100000"/>
-              </a:lnSpc>
-              <a:spcBef>
-                <a:spcPts val="0"/>
-              </a:spcBef>
-              <a:spcAft>
-                <a:spcPts val="0"/>
-              </a:spcAft>
-              <a:buSzPct val="45000"/>
-              <a:buFont typeface="StarSymbol"/>
-              <a:buChar char="●"/>
-              <a:tabLst/>
-            </a:pPr>
-            <a:endParaRPr lang="en-IN" sz="1800" b="0" i="0" u="none" strike="noStrike" kern="1200" cap="none">
-              <a:ln>
-                <a:noFill/>
-              </a:ln>
-              <a:latin typeface="Times New Roman Cyr" pitchFamily="18"/>
-              <a:ea typeface="DejaVu Sans" pitchFamily="2"/>
-              <a:cs typeface="FreeSans" pitchFamily="2"/>
-            </a:endParaRPr>
-          </a:p>
-          <a:p>
-            <a:pPr marL="0" marR="0" lvl="0" indent="0" rtl="0" hangingPunct="0">
-              <a:lnSpc>
-                <a:spcPct val="100000"/>
-              </a:lnSpc>
-              <a:spcBef>
-                <a:spcPts val="0"/>
-              </a:spcBef>
-              <a:spcAft>
-                <a:spcPts val="0"/>
-              </a:spcAft>
-              <a:buSzPct val="45000"/>
-              <a:buFont typeface="StarSymbol"/>
-              <a:buChar char="●"/>
-              <a:tabLst/>
-            </a:pPr>
-            <a:r>
-              <a:rPr lang="en-IN" sz="1800" b="0" i="0" u="none" strike="noStrike" kern="1200" cap="none">
-                <a:ln>
-                  <a:noFill/>
-                </a:ln>
-                <a:latin typeface="Times New Roman Cyr" pitchFamily="18"/>
-                <a:ea typeface="DejaVu Sans" pitchFamily="2"/>
-                <a:cs typeface="FreeSans" pitchFamily="2"/>
-              </a:rPr>
-              <a:t>CyberB.A.A.P aims to create awareness, provide support and enable prevention strategies</a:t>
-            </a:r>
-          </a:p>
-          <a:p>
-            <a:pPr marL="0" marR="0" lvl="0" indent="0" rtl="0" hangingPunct="0">
-              <a:lnSpc>
-                <a:spcPct val="100000"/>
-              </a:lnSpc>
-              <a:spcBef>
-                <a:spcPts val="0"/>
-              </a:spcBef>
-              <a:spcAft>
-                <a:spcPts val="0"/>
-              </a:spcAft>
-              <a:buSzPct val="45000"/>
-              <a:buFont typeface="StarSymbol"/>
-              <a:buChar char="●"/>
-              <a:tabLst/>
-            </a:pPr>
-            <a:r>
-              <a:rPr lang="en-IN" sz="1800" b="0" i="0" u="none" strike="noStrike" kern="1200" cap="none">
-                <a:ln>
-                  <a:noFill/>
-                </a:ln>
-                <a:latin typeface="Times New Roman Cyr" pitchFamily="18"/>
-                <a:ea typeface="DejaVu Sans" pitchFamily="2"/>
-                <a:cs typeface="FreeSans" pitchFamily="2"/>
-              </a:rPr>
-              <a:t>for individuals affected by cyberbullying.</a:t>
-            </a:r>
-          </a:p>
-          <a:p>
-            <a:pPr marL="0" marR="0" lvl="0" indent="0" rtl="0" hangingPunct="0">
-              <a:lnSpc>
-                <a:spcPct val="100000"/>
-              </a:lnSpc>
-              <a:spcBef>
-                <a:spcPts val="0"/>
-              </a:spcBef>
-              <a:spcAft>
-                <a:spcPts val="0"/>
-              </a:spcAft>
-              <a:buSzPct val="45000"/>
-              <a:buFont typeface="StarSymbol"/>
-              <a:buChar char="●"/>
-              <a:tabLst/>
-            </a:pPr>
-            <a:endParaRPr lang="en-IN" sz="1800" b="0" i="0" u="none" strike="noStrike" kern="1200" cap="none">
-              <a:ln>
-                <a:noFill/>
-              </a:ln>
-              <a:latin typeface="Times New Roman Cyr" pitchFamily="18"/>
-              <a:ea typeface="DejaVu Sans" pitchFamily="2"/>
-              <a:cs typeface="FreeSans" pitchFamily="2"/>
-            </a:endParaRPr>
-          </a:p>
-          <a:p>
-            <a:pPr marL="0" marR="0" lvl="0" indent="0" rtl="0" hangingPunct="0">
-              <a:lnSpc>
-                <a:spcPct val="100000"/>
-              </a:lnSpc>
-              <a:spcBef>
-                <a:spcPts val="0"/>
-              </a:spcBef>
-              <a:spcAft>
-                <a:spcPts val="0"/>
-              </a:spcAft>
-              <a:buSzPct val="45000"/>
-              <a:buFont typeface="StarSymbol"/>
-              <a:buChar char="●"/>
-              <a:tabLst/>
-            </a:pPr>
-            <a:r>
-              <a:rPr lang="en-IN" sz="1800" b="0" i="0" u="none" strike="noStrike" kern="1200" cap="none">
-                <a:ln>
-                  <a:noFill/>
-                </a:ln>
-                <a:latin typeface="Times New Roman Cyr" pitchFamily="18"/>
-                <a:ea typeface="DejaVu Sans" pitchFamily="2"/>
-                <a:cs typeface="FreeSans" pitchFamily="2"/>
-              </a:rPr>
-              <a:t>Its mission is to empower people with the knowledge and tools to foster a safer online</a:t>
-            </a:r>
-          </a:p>
-          <a:p>
-            <a:pPr marL="0" marR="0" lvl="0" indent="0" rtl="0" hangingPunct="0">
-              <a:lnSpc>
-                <a:spcPct val="100000"/>
-              </a:lnSpc>
-              <a:spcBef>
-                <a:spcPts val="0"/>
-              </a:spcBef>
-              <a:spcAft>
-                <a:spcPts val="0"/>
-              </a:spcAft>
-              <a:buSzPct val="45000"/>
-              <a:buFont typeface="StarSymbol"/>
-              <a:buChar char="●"/>
-              <a:tabLst/>
-            </a:pPr>
-            <a:r>
-              <a:rPr lang="en-IN" sz="1800" b="0" i="0" u="none" strike="noStrike" kern="1200" cap="none">
-                <a:ln>
-                  <a:noFill/>
-                </a:ln>
-                <a:latin typeface="Times New Roman Cyr" pitchFamily="18"/>
-                <a:ea typeface="DejaVu Sans" pitchFamily="2"/>
-                <a:cs typeface="FreeSans" pitchFamily="2"/>
-              </a:rPr>
-              <a:t>enviornment.</a:t>
-            </a:r>
-          </a:p>
-          <a:p>
-            <a:pPr marL="0" marR="0" lvl="0" indent="0" rtl="0" hangingPunct="0">
-              <a:lnSpc>
-                <a:spcPct val="100000"/>
-              </a:lnSpc>
-              <a:spcBef>
-                <a:spcPts val="0"/>
-              </a:spcBef>
-              <a:spcAft>
-                <a:spcPts val="0"/>
-              </a:spcAft>
-              <a:buSzPct val="45000"/>
-              <a:buFont typeface="StarSymbol"/>
-              <a:buChar char="●"/>
-              <a:tabLst/>
-            </a:pPr>
-            <a:endParaRPr lang="en-IN" sz="1800" b="0" i="0" u="none" strike="noStrike" kern="1200" cap="none">
-              <a:ln>
-                <a:noFill/>
-              </a:ln>
-              <a:latin typeface="Times New Roman Cyr" pitchFamily="18"/>
-              <a:ea typeface="DejaVu Sans" pitchFamily="2"/>
-              <a:cs typeface="FreeSans" pitchFamily="2"/>
-            </a:endParaRPr>
-          </a:p>
-          <a:p>
-            <a:pPr marL="0" marR="0" lvl="0" indent="0" rtl="0" hangingPunct="0">
-              <a:lnSpc>
-                <a:spcPct val="100000"/>
-              </a:lnSpc>
-              <a:spcBef>
-                <a:spcPts val="0"/>
-              </a:spcBef>
-              <a:spcAft>
-                <a:spcPts val="0"/>
-              </a:spcAft>
-              <a:buSzPct val="45000"/>
-              <a:buFont typeface="StarSymbol"/>
-              <a:buChar char="●"/>
-              <a:tabLst/>
-            </a:pPr>
-            <a:r>
-              <a:rPr lang="en-IN" sz="1800" b="0" i="0" u="none" strike="noStrike" kern="1200" cap="none">
-                <a:ln>
-                  <a:noFill/>
-                </a:ln>
-                <a:latin typeface="Times New Roman Cyr" pitchFamily="18"/>
-                <a:ea typeface="DejaVu Sans" pitchFamily="2"/>
-                <a:cs typeface="FreeSans" pitchFamily="2"/>
-              </a:rPr>
-              <a:t>The initiative addresses cyberbullying through various services including professional</a:t>
-            </a:r>
-          </a:p>
-          <a:p>
-            <a:pPr marL="0" marR="0" lvl="0" indent="0" rtl="0" hangingPunct="0">
-              <a:lnSpc>
-                <a:spcPct val="100000"/>
-              </a:lnSpc>
-              <a:spcBef>
-                <a:spcPts val="0"/>
-              </a:spcBef>
-              <a:spcAft>
-                <a:spcPts val="0"/>
-              </a:spcAft>
-              <a:buSzPct val="45000"/>
-              <a:buFont typeface="StarSymbol"/>
-              <a:buChar char="●"/>
-              <a:tabLst/>
-            </a:pPr>
-            <a:r>
-              <a:rPr lang="en-IN" sz="1800" b="0" i="0" u="none" strike="noStrike" kern="1200" cap="none">
-                <a:ln>
-                  <a:noFill/>
-                </a:ln>
-                <a:latin typeface="Times New Roman Cyr" pitchFamily="18"/>
-                <a:ea typeface="DejaVu Sans" pitchFamily="2"/>
-                <a:cs typeface="FreeSans" pitchFamily="2"/>
-              </a:rPr>
-              <a:t> counseling for victims, training programs on digital safety and resources for parents,</a:t>
-            </a:r>
-          </a:p>
-          <a:p>
-            <a:pPr marL="0" marR="0" lvl="0" indent="0" rtl="0" hangingPunct="0">
-              <a:lnSpc>
-                <a:spcPct val="100000"/>
-              </a:lnSpc>
-              <a:spcBef>
-                <a:spcPts val="0"/>
-              </a:spcBef>
-              <a:spcAft>
-                <a:spcPts val="0"/>
-              </a:spcAft>
-              <a:buSzPct val="45000"/>
-              <a:buFont typeface="StarSymbol"/>
-              <a:buChar char="●"/>
-              <a:tabLst/>
-            </a:pPr>
-            <a:r>
-              <a:rPr lang="en-IN" sz="1800" b="0" i="0" u="none" strike="noStrike" kern="1200" cap="none">
-                <a:ln>
-                  <a:noFill/>
-                </a:ln>
-                <a:latin typeface="Times New Roman Cyr" pitchFamily="18"/>
-                <a:ea typeface="DejaVu Sans" pitchFamily="2"/>
-                <a:cs typeface="FreeSans" pitchFamily="2"/>
-              </a:rPr>
-              <a:t> educators and students.</a:t>
-            </a:r>
           </a:p>
         </p:txBody>
       </p:sp>
@@ -8186,226 +8973,79 @@
       </p:grpSpPr>
       <p:sp>
         <p:nvSpPr>
-          <p:cNvPr id="2" name="TextBox 1">
-            <a:extLst>
-              <a:ext uri="{FF2B5EF4-FFF2-40B4-BE49-F238E27FC236}">
-                <a16:creationId xmlns:a16="http://schemas.microsoft.com/office/drawing/2014/main" id="{E1DDAA0B-566B-4393-B4E3-470CAEF6D8BD}"/>
-              </a:ext>
-            </a:extLst>
-          </p:cNvPr>
-          <p:cNvSpPr txBox="1"/>
-          <p:nvPr/>
+          <p:cNvPr id="2" name="Title 1">
+            <a:extLst>
+              <a:ext uri="{FF2B5EF4-FFF2-40B4-BE49-F238E27FC236}">
+                <a16:creationId xmlns:a16="http://schemas.microsoft.com/office/drawing/2014/main" id="{59630BAB-0EF4-4F7D-930A-AFFE5880D740}"/>
+              </a:ext>
+            </a:extLst>
+          </p:cNvPr>
+          <p:cNvSpPr txBox="1">
+            <a:spLocks noGrp="1"/>
+          </p:cNvSpPr>
+          <p:nvPr>
+            <p:ph type="title" idx="4294967295"/>
+          </p:nvPr>
         </p:nvSpPr>
         <p:spPr>
           <a:xfrm>
-            <a:off x="540000" y="360000"/>
-            <a:ext cx="2571839" cy="447120"/>
+            <a:off x="540000" y="406080"/>
+            <a:ext cx="8856000" cy="493920"/>
           </a:xfrm>
-          <a:prstGeom prst="rect">
-            <a:avLst/>
-          </a:prstGeom>
-          <a:noFill/>
-          <a:ln>
-            <a:noFill/>
-          </a:ln>
         </p:spPr>
         <p:txBody>
-          <a:bodyPr vert="horz" wrap="square" lIns="90000" tIns="45000" rIns="90000" bIns="45000" anchorCtr="0" compatLnSpc="0">
-            <a:spAutoFit/>
-          </a:bodyPr>
-          <a:lstStyle/>
-          <a:p>
-            <a:pPr marL="0" marR="0" lvl="0" indent="0" rtl="0" hangingPunct="0">
-              <a:lnSpc>
-                <a:spcPct val="100000"/>
-              </a:lnSpc>
-              <a:spcBef>
-                <a:spcPts val="0"/>
-              </a:spcBef>
-              <a:spcAft>
-                <a:spcPts val="0"/>
-              </a:spcAft>
-              <a:buNone/>
-              <a:tabLst/>
-            </a:pPr>
-            <a:r>
-              <a:rPr lang="en-IN" sz="2000" b="1" i="0" u="sng" strike="noStrike" kern="1200" cap="none">
-                <a:ln>
-                  <a:noFill/>
-                </a:ln>
-                <a:uFillTx/>
-                <a:latin typeface="OPTITimes-Roman" pitchFamily="18"/>
-                <a:ea typeface="DejaVu Sans" pitchFamily="2"/>
-                <a:cs typeface="FreeSans" pitchFamily="2"/>
+          <a:bodyPr vert="horz" anchor="t"/>
+          <a:lstStyle/>
+          <a:p>
+            <a:pPr lvl="0" algn="l" rtl="0"/>
+            <a:r>
+              <a:rPr lang="en-IN" sz="2000" b="1" u="sng">
+                <a:latin typeface="Times New Roman" pitchFamily="18"/>
               </a:rPr>
-              <a:t>DISADVANTAGES</a:t>
-            </a:r>
-          </a:p>
-        </p:txBody>
-      </p:sp>
-      <p:sp>
-        <p:nvSpPr>
-          <p:cNvPr id="3" name="TextBox 2">
-            <a:extLst>
-              <a:ext uri="{FF2B5EF4-FFF2-40B4-BE49-F238E27FC236}">
-                <a16:creationId xmlns:a16="http://schemas.microsoft.com/office/drawing/2014/main" id="{71A7837A-F376-4418-93E3-09F3FD729948}"/>
-              </a:ext>
-            </a:extLst>
-          </p:cNvPr>
-          <p:cNvSpPr txBox="1"/>
-          <p:nvPr/>
+              <a:t>LITERATURE</a:t>
+            </a:r>
+          </a:p>
+        </p:txBody>
+      </p:sp>
+      <p:sp>
+        <p:nvSpPr>
+          <p:cNvPr id="3" name="Text Placeholder 2">
+            <a:extLst>
+              <a:ext uri="{FF2B5EF4-FFF2-40B4-BE49-F238E27FC236}">
+                <a16:creationId xmlns:a16="http://schemas.microsoft.com/office/drawing/2014/main" id="{A26AD317-9F93-4288-9D98-8DB30B6E6F33}"/>
+              </a:ext>
+            </a:extLst>
+          </p:cNvPr>
+          <p:cNvSpPr txBox="1">
+            <a:spLocks noGrp="1"/>
+          </p:cNvSpPr>
+          <p:nvPr>
+            <p:ph type="body" idx="4294967295"/>
+          </p:nvPr>
         </p:nvSpPr>
         <p:spPr>
           <a:xfrm>
-            <a:off x="540000" y="1080000"/>
-            <a:ext cx="9000000" cy="4140000"/>
+            <a:off x="288360" y="900000"/>
+            <a:ext cx="9071640" cy="3288239"/>
           </a:xfrm>
-          <a:prstGeom prst="rect">
-            <a:avLst/>
-          </a:prstGeom>
-          <a:noFill/>
-          <a:ln>
-            <a:noFill/>
-          </a:ln>
         </p:spPr>
         <p:txBody>
-          <a:bodyPr vert="horz" wrap="square" lIns="90000" tIns="45000" rIns="90000" bIns="45000" anchorCtr="0" compatLnSpc="0">
-            <a:spAutoFit/>
-          </a:bodyPr>
-          <a:lstStyle/>
-          <a:p>
-            <a:pPr marL="0" marR="0" lvl="0" indent="0" rtl="0" hangingPunct="0">
-              <a:lnSpc>
-                <a:spcPct val="100000"/>
-              </a:lnSpc>
-              <a:spcBef>
-                <a:spcPts val="0"/>
-              </a:spcBef>
-              <a:spcAft>
-                <a:spcPts val="0"/>
-              </a:spcAft>
-              <a:buSzPct val="45000"/>
-              <a:buFont typeface="StarSymbol"/>
-              <a:buChar char="●"/>
-              <a:tabLst/>
-            </a:pPr>
-            <a:r>
-              <a:rPr lang="en-IN" sz="1600" b="0" i="0" u="none" strike="noStrike" kern="1200" cap="none">
-                <a:ln>
-                  <a:noFill/>
-                </a:ln>
-                <a:latin typeface="OPTITimes-Roman" pitchFamily="18"/>
-                <a:ea typeface="DejaVu Sans" pitchFamily="2"/>
-                <a:cs typeface="FreeSans" pitchFamily="2"/>
+          <a:bodyPr vert="horz"/>
+          <a:lstStyle/>
+          <a:p>
+            <a:pPr lvl="0" algn="l" rtl="0"/>
+            <a:r>
+              <a:rPr lang="en-IN" sz="2000" b="1">
+                <a:latin typeface="Times New Roman" pitchFamily="18"/>
               </a:rPr>
-              <a:t>Dependency on user initiative</a:t>
-            </a:r>
-          </a:p>
-          <a:p>
-            <a:pPr marL="0" marR="0" lvl="0" indent="0" rtl="0" hangingPunct="0">
-              <a:lnSpc>
-                <a:spcPct val="100000"/>
-              </a:lnSpc>
-              <a:spcBef>
-                <a:spcPts val="0"/>
-              </a:spcBef>
-              <a:spcAft>
-                <a:spcPts val="0"/>
-              </a:spcAft>
-              <a:buSzPct val="45000"/>
-              <a:buFont typeface="StarSymbol"/>
-              <a:buChar char="●"/>
-              <a:tabLst/>
-            </a:pPr>
-            <a:endParaRPr lang="en-IN" sz="1600" b="0" i="0" u="none" strike="noStrike" kern="1200" cap="none">
-              <a:ln>
-                <a:noFill/>
-              </a:ln>
-              <a:latin typeface="OPTITimes-Roman" pitchFamily="18"/>
-              <a:ea typeface="DejaVu Sans" pitchFamily="2"/>
-              <a:cs typeface="FreeSans" pitchFamily="2"/>
+              <a:t>SocialBullyAlert: A Web Application for Cyberbullying Detection on Minors' Social Media,(2024)</a:t>
+            </a:r>
+          </a:p>
+          <a:p>
+            <a:pPr lvl="0" algn="l" rtl="0"/>
+            <a:endParaRPr lang="en-IN" sz="1800" b="1">
+              <a:latin typeface="Times New Roman" pitchFamily="18"/>
             </a:endParaRPr>
-          </a:p>
-          <a:p>
-            <a:pPr marL="0" marR="0" lvl="0" indent="0" rtl="0" hangingPunct="0">
-              <a:lnSpc>
-                <a:spcPct val="100000"/>
-              </a:lnSpc>
-              <a:spcBef>
-                <a:spcPts val="0"/>
-              </a:spcBef>
-              <a:spcAft>
-                <a:spcPts val="0"/>
-              </a:spcAft>
-              <a:buSzPct val="45000"/>
-              <a:buFont typeface="StarSymbol"/>
-              <a:buChar char="●"/>
-              <a:tabLst/>
-            </a:pPr>
-            <a:r>
-              <a:rPr lang="en-IN" sz="1600" b="0" i="0" u="none" strike="noStrike" kern="1200" cap="none">
-                <a:ln>
-                  <a:noFill/>
-                </a:ln>
-                <a:latin typeface="OPTITimes-Roman" pitchFamily="18"/>
-                <a:ea typeface="DejaVu Sans" pitchFamily="2"/>
-                <a:cs typeface="FreeSans" pitchFamily="2"/>
-              </a:rPr>
-              <a:t>Reactive approaches</a:t>
-            </a:r>
-          </a:p>
-          <a:p>
-            <a:pPr marL="0" marR="0" lvl="0" indent="0" rtl="0" hangingPunct="0">
-              <a:lnSpc>
-                <a:spcPct val="100000"/>
-              </a:lnSpc>
-              <a:spcBef>
-                <a:spcPts val="0"/>
-              </a:spcBef>
-              <a:spcAft>
-                <a:spcPts val="0"/>
-              </a:spcAft>
-              <a:buSzPct val="45000"/>
-              <a:buFont typeface="StarSymbol"/>
-              <a:buChar char="●"/>
-              <a:tabLst/>
-            </a:pPr>
-            <a:endParaRPr lang="en-IN" sz="1600" b="0" i="0" u="none" strike="noStrike" kern="1200" cap="none">
-              <a:ln>
-                <a:noFill/>
-              </a:ln>
-              <a:latin typeface="OPTITimes-Roman" pitchFamily="18"/>
-              <a:ea typeface="DejaVu Sans" pitchFamily="2"/>
-              <a:cs typeface="FreeSans" pitchFamily="2"/>
-            </a:endParaRPr>
-          </a:p>
-          <a:p>
-            <a:pPr marL="0" marR="0" lvl="0" indent="0" rtl="0" hangingPunct="0">
-              <a:lnSpc>
-                <a:spcPct val="100000"/>
-              </a:lnSpc>
-              <a:spcBef>
-                <a:spcPts val="0"/>
-              </a:spcBef>
-              <a:spcAft>
-                <a:spcPts val="0"/>
-              </a:spcAft>
-              <a:buSzPct val="45000"/>
-              <a:buFont typeface="StarSymbol"/>
-              <a:buChar char="●"/>
-              <a:tabLst/>
-            </a:pPr>
-            <a:r>
-              <a:rPr lang="en-IN" sz="1600" b="0" i="0" u="none" strike="noStrike" kern="1200" cap="none">
-                <a:ln>
-                  <a:noFill/>
-                </a:ln>
-                <a:latin typeface="OPTITimes-Roman" pitchFamily="18"/>
-                <a:ea typeface="DejaVu Sans" pitchFamily="2"/>
-                <a:cs typeface="FreeSans" pitchFamily="2"/>
-              </a:rPr>
-              <a:t>Limited Awareness</a:t>
-            </a:r>
           </a:p>
         </p:txBody>
       </p:sp>

</xml_diff>